<commit_message>
j'ai ajouté un titre au powerpoint
</commit_message>
<xml_diff>
--- a/SERVEUR ET FICHIERS D’IMPRESSION.pptx
+++ b/SERVEUR ET FICHIERS D’IMPRESSION.pptx
@@ -602,7 +602,6 @@
     </c:plotArea>
     <c:legend>
       <c:legendPos val="b"/>
-      <c:layout/>
       <c:overlay val="0"/>
       <c:spPr>
         <a:noFill/>
@@ -9559,11 +9558,11 @@
   <p:clrMapOvr>
     <a:masterClrMapping/>
   </p:clrMapOvr>
-  <mc:AlternateContent xmlns:mc="http://schemas.openxmlformats.org/markup-compatibility/2006">
-    <mc:Choice xmlns:p14="http://schemas.microsoft.com/office/powerpoint/2010/main" Requires="p14">
+  <mc:AlternateContent xmlns:mc="http://schemas.openxmlformats.org/markup-compatibility/2006" xmlns:p14="http://schemas.microsoft.com/office/powerpoint/2010/main">
+    <mc:Choice Requires="p14">
       <p:transition p14:dur="10"/>
     </mc:Choice>
-    <mc:Fallback>
+    <mc:Fallback xmlns="">
       <p:transition/>
     </mc:Fallback>
   </mc:AlternateContent>
@@ -9604,16 +9603,24 @@
             <p:ph type="title"/>
           </p:nvPr>
         </p:nvSpPr>
-        <p:spPr/>
+        <p:spPr>
+          <a:xfrm>
+            <a:off x="3952428" y="836712"/>
+            <a:ext cx="4274360" cy="504056"/>
+          </a:xfrm>
+        </p:spPr>
         <p:txBody>
-          <a:bodyPr rtlCol="0"/>
+          <a:bodyPr rtlCol="0" anchor="ctr">
+            <a:normAutofit fontScale="90000"/>
+          </a:bodyPr>
           <a:lstStyle/>
           <a:p>
-            <a:pPr rtl="0"/>
+            <a:pPr algn="ctr" rtl="0"/>
             <a:r>
-              <a:rPr lang="fr-FR" dirty="0"/>
-              <a:t>Disposition Titre et contenu avec liste</a:t>
+              <a:rPr lang="fr-FR" dirty="0" smtClean="0"/>
+              <a:t>TABLES DES MATIÈRES</a:t>
             </a:r>
+            <a:endParaRPr lang="fr-FR" dirty="0"/>
           </a:p>
         </p:txBody>
       </p:sp>
@@ -9633,38 +9640,7 @@
           <a:lstStyle/>
           <a:p>
             <a:pPr lvl="0" rtl="0"/>
-            <a:r>
-              <a:rPr lang="fr-FR" dirty="0"/>
-              <a:t>Cliquez pour modifier les styles du texte du masque</a:t>
-            </a:r>
-          </a:p>
-          <a:p>
-            <a:pPr lvl="1" rtl="0"/>
-            <a:r>
-              <a:rPr lang="fr-FR" dirty="0"/>
-              <a:t>Deuxième niveau</a:t>
-            </a:r>
-          </a:p>
-          <a:p>
-            <a:pPr lvl="2" rtl="0"/>
-            <a:r>
-              <a:rPr lang="fr-FR" dirty="0"/>
-              <a:t>Troisième niveau</a:t>
-            </a:r>
-          </a:p>
-          <a:p>
-            <a:pPr lvl="3" rtl="0"/>
-            <a:r>
-              <a:rPr lang="fr-FR" dirty="0"/>
-              <a:t>Quatrième niveau</a:t>
-            </a:r>
-          </a:p>
-          <a:p>
-            <a:pPr lvl="4" rtl="0"/>
-            <a:r>
-              <a:rPr lang="fr-FR" dirty="0"/>
-              <a:t>Cinquième niveau</a:t>
-            </a:r>
+            <a:endParaRPr lang="fr-FR" dirty="0" smtClean="0"/>
           </a:p>
         </p:txBody>
       </p:sp>
@@ -11084,6 +11060,15 @@
 </file>
 
 <file path=customXml/item1.xml><?xml version="1.0" encoding="utf-8"?>
+<?mso-contentType ?>
+<FormTemplates xmlns="http://schemas.microsoft.com/sharepoint/v3/contenttype/forms">
+  <Display>DocumentLibraryForm</Display>
+  <Edit>DocumentLibraryForm</Edit>
+  <New>DocumentLibraryForm</New>
+</FormTemplates>
+</file>
+
+<file path=customXml/item2.xml><?xml version="1.0" encoding="utf-8"?>
 <ct:contentTypeSchema xmlns:ct="http://schemas.microsoft.com/office/2006/metadata/contentType" xmlns:ma="http://schemas.microsoft.com/office/2006/metadata/properties/metaAttributes" ct:_="" ma:_="" ma:contentTypeName="Document" ma:contentTypeID="0x010100AA3F7D94069FF64A86F7DFF56D60E3BE" ma:contentTypeVersion="6" ma:contentTypeDescription="Create a new document." ma:contentTypeScope="" ma:versionID="c32302c77d4085ecf495bdddb7f5e889">
   <xsd:schema xmlns:xsd="http://www.w3.org/2001/XMLSchema" xmlns:xs="http://www.w3.org/2001/XMLSchema" xmlns:p="http://schemas.microsoft.com/office/2006/metadata/properties" xmlns:ns2="a4f35948-e619-41b3-aa29-22878b09cfd2" xmlns:ns3="40262f94-9f35-4ac3-9a90-690165a166b7" targetNamespace="http://schemas.microsoft.com/office/2006/metadata/properties" ma:root="true" ma:fieldsID="4ab5ae46be95f9d0be6107e8200be7a2" ns2:_="" ns3:_="">
     <xsd:import namespace="a4f35948-e619-41b3-aa29-22878b09cfd2"/>
@@ -11264,15 +11249,6 @@
 </ct:contentTypeSchema>
 </file>
 
-<file path=customXml/item2.xml><?xml version="1.0" encoding="utf-8"?>
-<?mso-contentType ?>
-<FormTemplates xmlns="http://schemas.microsoft.com/sharepoint/v3/contenttype/forms">
-  <Display>DocumentLibraryForm</Display>
-  <Edit>DocumentLibraryForm</Edit>
-  <New>DocumentLibraryForm</New>
-</FormTemplates>
-</file>
-
 <file path=customXml/item3.xml><?xml version="1.0" encoding="utf-8"?>
 <p:properties xmlns:p="http://schemas.microsoft.com/office/2006/metadata/properties" xmlns:xsi="http://www.w3.org/2001/XMLSchema-instance" xmlns:pc="http://schemas.microsoft.com/office/infopath/2007/PartnerControls">
   <documentManagement>
@@ -11285,6 +11261,14 @@
 </file>
 
 <file path=customXml/itemProps1.xml><?xml version="1.0" encoding="utf-8"?>
+<ds:datastoreItem xmlns:ds="http://schemas.openxmlformats.org/officeDocument/2006/customXml" ds:itemID="{0875BD71-4A33-4FB7-88CA-777C4D9E6EE5}">
+  <ds:schemaRefs>
+    <ds:schemaRef ds:uri="http://schemas.microsoft.com/sharepoint/v3/contenttype/forms"/>
+  </ds:schemaRefs>
+</ds:datastoreItem>
+</file>
+
+<file path=customXml/itemProps2.xml><?xml version="1.0" encoding="utf-8"?>
 <ds:datastoreItem xmlns:ds="http://schemas.openxmlformats.org/officeDocument/2006/customXml" ds:itemID="{51F78577-2839-4BFF-9EC7-673BD8FEBD87}">
   <ds:schemaRefs>
     <ds:schemaRef ds:uri="http://schemas.microsoft.com/office/2006/metadata/contentType"/>
@@ -11299,14 +11283,6 @@
     <ds:schemaRef ds:uri="http://purl.org/dc/elements/1.1/"/>
     <ds:schemaRef ds:uri="http://purl.org/dc/terms/"/>
     <ds:schemaRef ds:uri="http://schemas.microsoft.com/internal/obd"/>
-  </ds:schemaRefs>
-</ds:datastoreItem>
-</file>
-
-<file path=customXml/itemProps2.xml><?xml version="1.0" encoding="utf-8"?>
-<ds:datastoreItem xmlns:ds="http://schemas.openxmlformats.org/officeDocument/2006/customXml" ds:itemID="{0875BD71-4A33-4FB7-88CA-777C4D9E6EE5}">
-  <ds:schemaRefs>
-    <ds:schemaRef ds:uri="http://schemas.microsoft.com/sharepoint/v3/contenttype/forms"/>
   </ds:schemaRefs>
 </ds:datastoreItem>
 </file>

</xml_diff>

<commit_message>
ajouter la table des matières
</commit_message>
<xml_diff>
--- a/SERVEUR ET FICHIERS D’IMPRESSION.pptx
+++ b/SERVEUR ET FICHIERS D’IMPRESSION.pptx
@@ -9636,11 +9636,87 @@
         </p:nvSpPr>
         <p:spPr/>
         <p:txBody>
-          <a:bodyPr rtlCol="0"/>
+          <a:bodyPr rtlCol="0">
+            <a:normAutofit/>
+          </a:bodyPr>
           <a:lstStyle/>
           <a:p>
-            <a:pPr lvl="0" rtl="0"/>
-            <a:endParaRPr lang="fr-FR" dirty="0" smtClean="0"/>
+            <a:r>
+              <a:rPr lang="fr-CH" dirty="0"/>
+              <a:t>Serveur de fichiers </a:t>
+            </a:r>
+            <a:r>
+              <a:rPr lang="fr-CH" dirty="0" smtClean="0"/>
+              <a:t>:</a:t>
+            </a:r>
+            <a:endParaRPr lang="fr-CH" dirty="0"/>
+          </a:p>
+          <a:p>
+            <a:pPr lvl="1"/>
+            <a:r>
+              <a:rPr lang="fr-CH" dirty="0"/>
+              <a:t>Arborescences</a:t>
+            </a:r>
+          </a:p>
+          <a:p>
+            <a:pPr lvl="1"/>
+            <a:r>
+              <a:rPr lang="fr-CH" dirty="0"/>
+              <a:t>Explication des partages</a:t>
+            </a:r>
+          </a:p>
+          <a:p>
+            <a:pPr lvl="2"/>
+            <a:r>
+              <a:rPr lang="fr-CH" dirty="0"/>
+              <a:t>Type de droit</a:t>
+            </a:r>
+          </a:p>
+          <a:p>
+            <a:pPr lvl="2"/>
+            <a:r>
+              <a:rPr lang="fr-CH" dirty="0"/>
+              <a:t>Partage avancé</a:t>
+            </a:r>
+          </a:p>
+          <a:p>
+            <a:pPr lvl="1"/>
+            <a:r>
+              <a:rPr lang="fr-CH" dirty="0"/>
+              <a:t>Explication des droits NTFS</a:t>
+            </a:r>
+          </a:p>
+          <a:p>
+            <a:pPr lvl="2"/>
+            <a:r>
+              <a:rPr lang="fr-CH" dirty="0"/>
+              <a:t>Type de droit</a:t>
+            </a:r>
+          </a:p>
+          <a:p>
+            <a:r>
+              <a:rPr lang="fr-CH" dirty="0"/>
+              <a:t>Serveur d'impression :</a:t>
+            </a:r>
+          </a:p>
+          <a:p>
+            <a:pPr lvl="1"/>
+            <a:r>
+              <a:rPr lang="fr-CH" dirty="0"/>
+              <a:t>Différence entre serveur d'impression et imprimante réseau standard</a:t>
+            </a:r>
+          </a:p>
+          <a:p>
+            <a:pPr lvl="1"/>
+            <a:r>
+              <a:rPr lang="fr-CH" dirty="0"/>
+              <a:t>Files </a:t>
+            </a:r>
+            <a:r>
+              <a:rPr lang="fr-CH" dirty="0" smtClean="0"/>
+              <a:t>d'impression</a:t>
+            </a:r>
+            <a:endParaRPr lang="fr-CH" dirty="0"/>
           </a:p>
         </p:txBody>
       </p:sp>

</xml_diff>

<commit_message>
update de la photo en arrière plan
</commit_message>
<xml_diff>
--- a/SERVEUR ET FICHIERS D’IMPRESSION.pptx
+++ b/SERVEUR ET FICHIERS D’IMPRESSION.pptx
@@ -9529,7 +9529,7 @@
         </p:nvSpPr>
         <p:spPr>
           <a:xfrm>
-            <a:off x="3286100" y="6501408"/>
+            <a:off x="3432870" y="6501408"/>
             <a:ext cx="5355134" cy="356592"/>
           </a:xfrm>
         </p:spPr>
@@ -9579,6 +9579,21 @@
 <file path=ppt/slides/slide2.xml><?xml version="1.0" encoding="utf-8"?>
 <p:sld xmlns:a="http://schemas.openxmlformats.org/drawingml/2006/main" xmlns:r="http://schemas.openxmlformats.org/officeDocument/2006/relationships" xmlns:p="http://schemas.openxmlformats.org/presentationml/2006/main">
   <p:cSld>
+    <p:bg>
+      <p:bgPr>
+        <a:blipFill dpi="0" rotWithShape="1">
+          <a:blip r:embed="rId3">
+            <a:alphaModFix amt="66000"/>
+            <a:lum/>
+          </a:blip>
+          <a:srcRect/>
+          <a:stretch>
+            <a:fillRect l="-8000" r="-8000"/>
+          </a:stretch>
+        </a:blipFill>
+        <a:effectLst/>
+      </p:bgPr>
+    </p:bg>
     <p:spTree>
       <p:nvGrpSpPr>
         <p:cNvPr id="1" name=""/>
@@ -9605,22 +9620,30 @@
         </p:nvSpPr>
         <p:spPr>
           <a:xfrm>
-            <a:off x="3952428" y="836712"/>
-            <a:ext cx="4274360" cy="504056"/>
+            <a:off x="4006180" y="764704"/>
+            <a:ext cx="4274360" cy="576064"/>
           </a:xfrm>
         </p:spPr>
         <p:txBody>
           <a:bodyPr rtlCol="0" anchor="ctr">
-            <a:normAutofit fontScale="90000"/>
+            <a:noAutofit/>
           </a:bodyPr>
           <a:lstStyle/>
           <a:p>
             <a:pPr algn="ctr" rtl="0"/>
             <a:r>
-              <a:rPr lang="fr-FR" dirty="0" smtClean="0"/>
+              <a:rPr lang="fr-FR" sz="4400" dirty="0" smtClean="0">
+                <a:solidFill>
+                  <a:schemeClr val="bg1"/>
+                </a:solidFill>
+              </a:rPr>
               <a:t>TABLES DES MATIÈRES</a:t>
             </a:r>
-            <a:endParaRPr lang="fr-FR" dirty="0"/>
+            <a:endParaRPr lang="fr-FR" sz="4400" dirty="0">
+              <a:solidFill>
+                <a:schemeClr val="bg1"/>
+              </a:solidFill>
+            </a:endParaRPr>
           </a:p>
         </p:txBody>
       </p:sp>
@@ -9634,7 +9657,12 @@
             <p:ph idx="1"/>
           </p:nvPr>
         </p:nvSpPr>
-        <p:spPr/>
+        <p:spPr>
+          <a:xfrm>
+            <a:off x="477788" y="1340768"/>
+            <a:ext cx="9134391" cy="4114801"/>
+          </a:xfrm>
+        </p:spPr>
         <p:txBody>
           <a:bodyPr rtlCol="0">
             <a:normAutofit/>
@@ -9642,81 +9670,137 @@
           <a:lstStyle/>
           <a:p>
             <a:r>
-              <a:rPr lang="fr-CH" dirty="0"/>
+              <a:rPr lang="fr-CH" b="1" dirty="0">
+                <a:solidFill>
+                  <a:schemeClr val="bg1"/>
+                </a:solidFill>
+              </a:rPr>
               <a:t>Serveur de fichiers </a:t>
             </a:r>
             <a:r>
-              <a:rPr lang="fr-CH" dirty="0" smtClean="0"/>
+              <a:rPr lang="fr-CH" b="1" dirty="0" smtClean="0">
+                <a:solidFill>
+                  <a:schemeClr val="bg1"/>
+                </a:solidFill>
+              </a:rPr>
               <a:t>:</a:t>
             </a:r>
-            <a:endParaRPr lang="fr-CH" dirty="0"/>
+            <a:endParaRPr lang="fr-CH" b="1" dirty="0">
+              <a:solidFill>
+                <a:schemeClr val="bg1"/>
+              </a:solidFill>
+            </a:endParaRPr>
           </a:p>
           <a:p>
             <a:pPr lvl="1"/>
             <a:r>
-              <a:rPr lang="fr-CH" dirty="0"/>
+              <a:rPr lang="fr-CH" b="1" dirty="0">
+                <a:solidFill>
+                  <a:schemeClr val="bg1"/>
+                </a:solidFill>
+              </a:rPr>
               <a:t>Arborescences</a:t>
             </a:r>
           </a:p>
           <a:p>
             <a:pPr lvl="1"/>
             <a:r>
-              <a:rPr lang="fr-CH" dirty="0"/>
+              <a:rPr lang="fr-CH" b="1" dirty="0">
+                <a:solidFill>
+                  <a:schemeClr val="bg1"/>
+                </a:solidFill>
+              </a:rPr>
               <a:t>Explication des partages</a:t>
             </a:r>
           </a:p>
           <a:p>
             <a:pPr lvl="2"/>
             <a:r>
-              <a:rPr lang="fr-CH" dirty="0"/>
+              <a:rPr lang="fr-CH" b="1" dirty="0">
+                <a:solidFill>
+                  <a:schemeClr val="bg1"/>
+                </a:solidFill>
+              </a:rPr>
               <a:t>Type de droit</a:t>
             </a:r>
           </a:p>
           <a:p>
             <a:pPr lvl="2"/>
             <a:r>
-              <a:rPr lang="fr-CH" dirty="0"/>
+              <a:rPr lang="fr-CH" b="1" dirty="0">
+                <a:solidFill>
+                  <a:schemeClr val="bg1"/>
+                </a:solidFill>
+              </a:rPr>
               <a:t>Partage avancé</a:t>
             </a:r>
           </a:p>
           <a:p>
             <a:pPr lvl="1"/>
             <a:r>
-              <a:rPr lang="fr-CH" dirty="0"/>
+              <a:rPr lang="fr-CH" b="1" dirty="0">
+                <a:solidFill>
+                  <a:schemeClr val="bg1"/>
+                </a:solidFill>
+              </a:rPr>
               <a:t>Explication des droits NTFS</a:t>
             </a:r>
           </a:p>
           <a:p>
             <a:pPr lvl="2"/>
             <a:r>
-              <a:rPr lang="fr-CH" dirty="0"/>
+              <a:rPr lang="fr-CH" b="1" dirty="0">
+                <a:solidFill>
+                  <a:schemeClr val="bg1"/>
+                </a:solidFill>
+              </a:rPr>
               <a:t>Type de droit</a:t>
             </a:r>
           </a:p>
           <a:p>
             <a:r>
-              <a:rPr lang="fr-CH" dirty="0"/>
+              <a:rPr lang="fr-CH" b="1" dirty="0">
+                <a:solidFill>
+                  <a:schemeClr val="bg1"/>
+                </a:solidFill>
+              </a:rPr>
               <a:t>Serveur d'impression :</a:t>
             </a:r>
           </a:p>
           <a:p>
             <a:pPr lvl="1"/>
             <a:r>
-              <a:rPr lang="fr-CH" dirty="0"/>
+              <a:rPr lang="fr-CH" b="1" dirty="0">
+                <a:solidFill>
+                  <a:schemeClr val="bg1"/>
+                </a:solidFill>
+              </a:rPr>
               <a:t>Différence entre serveur d'impression et imprimante réseau standard</a:t>
             </a:r>
           </a:p>
           <a:p>
             <a:pPr lvl="1"/>
             <a:r>
-              <a:rPr lang="fr-CH" dirty="0"/>
+              <a:rPr lang="fr-CH" b="1" dirty="0">
+                <a:solidFill>
+                  <a:schemeClr val="bg1"/>
+                </a:solidFill>
+              </a:rPr>
               <a:t>Files </a:t>
             </a:r>
             <a:r>
-              <a:rPr lang="fr-CH" dirty="0" smtClean="0"/>
+              <a:rPr lang="fr-CH" b="1" dirty="0" smtClean="0">
+                <a:solidFill>
+                  <a:schemeClr val="bg1"/>
+                </a:solidFill>
+              </a:rPr>
               <a:t>d'impression</a:t>
             </a:r>
-            <a:endParaRPr lang="fr-CH" dirty="0"/>
+            <a:endParaRPr lang="fr-CH" b="1" dirty="0">
+              <a:solidFill>
+                <a:schemeClr val="bg1"/>
+              </a:solidFill>
+            </a:endParaRPr>
           </a:p>
         </p:txBody>
       </p:sp>

</xml_diff>

<commit_message>
ajouter le texte pour arbo
</commit_message>
<xml_diff>
--- a/SERVEUR ET FICHIERS D’IMPRESSION.pptx
+++ b/SERVEUR ET FICHIERS D’IMPRESSION.pptx
@@ -5979,8 +5979,8 @@
         </p:nvSpPr>
         <p:spPr>
           <a:xfrm>
-            <a:off x="4582244" y="3645024"/>
-            <a:ext cx="6552728" cy="369332"/>
+            <a:off x="4582244" y="2780928"/>
+            <a:ext cx="6552728" cy="2585323"/>
           </a:xfrm>
           <a:prstGeom prst="rect">
             <a:avLst/>
@@ -6001,9 +6001,39 @@
             <a:pPr algn="ctr"/>
             <a:r>
               <a:rPr lang="fr-CH" dirty="0" smtClean="0"/>
-              <a:t>BLABLA INSERER ICI </a:t>
-            </a:r>
-            <a:endParaRPr lang="fr-CH" dirty="0" smtClean="0"/>
+              <a:t>C’EST UNE DÉVELOPPEMENT DE HI</a:t>
+            </a:r>
+            <a:r>
+              <a:rPr lang="fr-CH" sz="1600" dirty="0" smtClean="0"/>
+              <a:t>ÉRARCHIE DE FICHIERS ER DE DOSSIERS DANS LE BUT DE TRANSMETTRE DE MANIÈRE SYNCHRONISÉE DES DONNÉES DE DIFFÉRENTS TYPES. </a:t>
+            </a:r>
+          </a:p>
+          <a:p>
+            <a:pPr algn="ctr"/>
+            <a:endParaRPr lang="fr-CH" sz="1600" dirty="0"/>
+          </a:p>
+          <a:p>
+            <a:pPr algn="ctr"/>
+            <a:r>
+              <a:rPr lang="fr-CH" sz="1600" dirty="0" smtClean="0"/>
+              <a:t>LES UTILISATEUR AYANT ACCÈS AU SERVEUR, SONT SOUVENT SOUMIS À DES CONTRAINTES ÉMISES SUR CELUI-CI AU DÉTRIMENT DE L’HÔTE.</a:t>
+            </a:r>
+          </a:p>
+          <a:p>
+            <a:pPr algn="ctr"/>
+            <a:endParaRPr lang="fr-CH" sz="1600" dirty="0"/>
+          </a:p>
+          <a:p>
+            <a:pPr algn="ctr"/>
+            <a:r>
+              <a:rPr lang="fr-CH" sz="1600" dirty="0" smtClean="0"/>
+              <a:t>CES RESTRICTIONS SONT INFRANCHISSABLE ET DOIVENT ÊTRE RESPECTÉES. ELLES SONT REPRÉSENTÉES PAR DES DROITS </a:t>
+            </a:r>
+            <a:r>
+              <a:rPr lang="fr-CH" sz="1600" b="1" dirty="0" smtClean="0"/>
+              <a:t>NTFS</a:t>
+            </a:r>
+            <a:endParaRPr lang="fr-CH" b="1" dirty="0" smtClean="0"/>
           </a:p>
         </p:txBody>
       </p:sp>
@@ -6206,7 +6236,6 @@
               <a:rPr lang="fr-CH" sz="2800" dirty="0" smtClean="0"/>
               <a:t>TYPE DE DROIT</a:t>
             </a:r>
-            <a:endParaRPr lang="fr-CH" sz="2800" dirty="0" smtClean="0"/>
           </a:p>
         </p:txBody>
       </p:sp>
@@ -6242,7 +6271,6 @@
               <a:rPr lang="fr-CH" sz="2800" dirty="0" smtClean="0"/>
               <a:t>PARTAGE AVANCÉ</a:t>
             </a:r>
-            <a:endParaRPr lang="fr-CH" sz="2800" dirty="0" smtClean="0"/>
           </a:p>
         </p:txBody>
       </p:sp>
@@ -6443,7 +6471,6 @@
               <a:rPr lang="fr-CH" sz="2800" dirty="0" smtClean="0"/>
               <a:t>TYPE DE DROIT</a:t>
             </a:r>
-            <a:endParaRPr lang="fr-CH" sz="2800" dirty="0" smtClean="0"/>
           </a:p>
         </p:txBody>
       </p:sp>
@@ -6479,7 +6506,6 @@
               <a:rPr lang="fr-CH" sz="2800" dirty="0" smtClean="0"/>
               <a:t>BLABLA</a:t>
             </a:r>
-            <a:endParaRPr lang="fr-CH" sz="2800" dirty="0" smtClean="0"/>
           </a:p>
         </p:txBody>
       </p:sp>
@@ -6515,7 +6541,6 @@
               <a:rPr lang="fr-CH" sz="2800" dirty="0" smtClean="0"/>
               <a:t>IMAGES OU EXEMPLES</a:t>
             </a:r>
-            <a:endParaRPr lang="fr-CH" sz="2800" dirty="0" smtClean="0"/>
           </a:p>
         </p:txBody>
       </p:sp>
@@ -6823,7 +6848,6 @@
               <a:rPr lang="fr-CH" dirty="0" smtClean="0"/>
               <a:t>SERVEUR IMPRESSION</a:t>
             </a:r>
-            <a:endParaRPr lang="fr-CH" dirty="0" smtClean="0"/>
           </a:p>
         </p:txBody>
       </p:sp>
@@ -6859,7 +6883,6 @@
               <a:rPr lang="fr-CH" dirty="0" smtClean="0"/>
               <a:t>IMPRIMANTE RÉSEAU STANDARD</a:t>
             </a:r>
-            <a:endParaRPr lang="fr-CH" dirty="0" smtClean="0"/>
           </a:p>
         </p:txBody>
       </p:sp>
@@ -7757,15 +7780,6 @@
 </file>
 
 <file path=customXml/item2.xml><?xml version="1.0" encoding="utf-8"?>
-<?mso-contentType ?>
-<FormTemplates xmlns="http://schemas.microsoft.com/sharepoint/v3/contenttype/forms">
-  <Display>DocumentLibraryForm</Display>
-  <Edit>DocumentLibraryForm</Edit>
-  <New>DocumentLibraryForm</New>
-</FormTemplates>
-</file>
-
-<file path=customXml/item3.xml><?xml version="1.0" encoding="utf-8"?>
 <ct:contentTypeSchema xmlns:ct="http://schemas.microsoft.com/office/2006/metadata/contentType" xmlns:ma="http://schemas.microsoft.com/office/2006/metadata/properties/metaAttributes" ct:_="" ma:_="" ma:contentTypeName="Document" ma:contentTypeID="0x010100AA3F7D94069FF64A86F7DFF56D60E3BE" ma:contentTypeVersion="6" ma:contentTypeDescription="Create a new document." ma:contentTypeScope="" ma:versionID="c32302c77d4085ecf495bdddb7f5e889">
   <xsd:schema xmlns:xsd="http://www.w3.org/2001/XMLSchema" xmlns:xs="http://www.w3.org/2001/XMLSchema" xmlns:p="http://schemas.microsoft.com/office/2006/metadata/properties" xmlns:ns2="a4f35948-e619-41b3-aa29-22878b09cfd2" xmlns:ns3="40262f94-9f35-4ac3-9a90-690165a166b7" targetNamespace="http://schemas.microsoft.com/office/2006/metadata/properties" ma:root="true" ma:fieldsID="4ab5ae46be95f9d0be6107e8200be7a2" ns2:_="" ns3:_="">
     <xsd:import namespace="a4f35948-e619-41b3-aa29-22878b09cfd2"/>
@@ -7946,6 +7960,15 @@
 </ct:contentTypeSchema>
 </file>
 
+<file path=customXml/item3.xml><?xml version="1.0" encoding="utf-8"?>
+<?mso-contentType ?>
+<FormTemplates xmlns="http://schemas.microsoft.com/sharepoint/v3/contenttype/forms">
+  <Display>DocumentLibraryForm</Display>
+  <Edit>DocumentLibraryForm</Edit>
+  <New>DocumentLibraryForm</New>
+</FormTemplates>
+</file>
+
 <file path=customXml/itemProps1.xml><?xml version="1.0" encoding="utf-8"?>
 <ds:datastoreItem xmlns:ds="http://schemas.openxmlformats.org/officeDocument/2006/customXml" ds:itemID="{3049C11C-71DC-49B6-ACD8-27E3AE088D14}">
   <ds:schemaRefs>
@@ -7964,14 +7987,6 @@
 </file>
 
 <file path=customXml/itemProps2.xml><?xml version="1.0" encoding="utf-8"?>
-<ds:datastoreItem xmlns:ds="http://schemas.openxmlformats.org/officeDocument/2006/customXml" ds:itemID="{0875BD71-4A33-4FB7-88CA-777C4D9E6EE5}">
-  <ds:schemaRefs>
-    <ds:schemaRef ds:uri="http://schemas.microsoft.com/sharepoint/v3/contenttype/forms"/>
-  </ds:schemaRefs>
-</ds:datastoreItem>
-</file>
-
-<file path=customXml/itemProps3.xml><?xml version="1.0" encoding="utf-8"?>
 <ds:datastoreItem xmlns:ds="http://schemas.openxmlformats.org/officeDocument/2006/customXml" ds:itemID="{51F78577-2839-4BFF-9EC7-673BD8FEBD87}">
   <ds:schemaRefs>
     <ds:schemaRef ds:uri="http://schemas.microsoft.com/office/2006/metadata/contentType"/>
@@ -7988,4 +8003,12 @@
     <ds:schemaRef ds:uri="http://schemas.microsoft.com/internal/obd"/>
   </ds:schemaRefs>
 </ds:datastoreItem>
+</file>
+
+<file path=customXml/itemProps3.xml><?xml version="1.0" encoding="utf-8"?>
+<ds:datastoreItem xmlns:ds="http://schemas.openxmlformats.org/officeDocument/2006/customXml" ds:itemID="{0875BD71-4A33-4FB7-88CA-777C4D9E6EE5}">
+  <ds:schemaRefs>
+    <ds:schemaRef ds:uri="http://schemas.microsoft.com/sharepoint/v3/contenttype/forms"/>
+  </ds:schemaRefs>
+</ds:datastoreItem>
 </file>
</xml_diff>

<commit_message>
supprimer dossier + modifications powerpoint
</commit_message>
<xml_diff>
--- a/SERVEUR ET FICHIERS D’IMPRESSION.pptx
+++ b/SERVEUR ET FICHIERS D’IMPRESSION.pptx
@@ -5,10 +5,10 @@
     <p:sldMasterId id="2147483672" r:id="rId4"/>
   </p:sldMasterIdLst>
   <p:notesMasterIdLst>
-    <p:notesMasterId r:id="rId13"/>
+    <p:notesMasterId r:id="rId14"/>
   </p:notesMasterIdLst>
   <p:handoutMasterIdLst>
-    <p:handoutMasterId r:id="rId14"/>
+    <p:handoutMasterId r:id="rId15"/>
   </p:handoutMasterIdLst>
   <p:sldIdLst>
     <p:sldId id="322" r:id="rId5"/>
@@ -17,13 +17,14 @@
     <p:sldId id="313" r:id="rId8"/>
     <p:sldId id="324" r:id="rId9"/>
     <p:sldId id="325" r:id="rId10"/>
-    <p:sldId id="326" r:id="rId11"/>
-    <p:sldId id="327" r:id="rId12"/>
+    <p:sldId id="328" r:id="rId11"/>
+    <p:sldId id="326" r:id="rId12"/>
+    <p:sldId id="327" r:id="rId13"/>
   </p:sldIdLst>
   <p:sldSz cx="12188825" cy="6858000"/>
   <p:notesSz cx="6858000" cy="9144000"/>
   <p:custDataLst>
-    <p:tags r:id="rId15"/>
+    <p:tags r:id="rId16"/>
   </p:custDataLst>
   <p:defaultTextStyle>
     <a:defPPr rtl="0">
@@ -1359,7 +1360,7 @@
     </p:spTree>
     <p:extLst>
       <p:ext uri="{BB962C8B-B14F-4D97-AF65-F5344CB8AC3E}">
-        <p14:creationId xmlns:p14="http://schemas.microsoft.com/office/powerpoint/2010/main" val="3382611344"/>
+        <p14:creationId xmlns:p14="http://schemas.microsoft.com/office/powerpoint/2010/main" val="1754128439"/>
       </p:ext>
     </p:extLst>
   </p:cSld>
@@ -1436,6 +1437,91 @@
             <a:fld id="{F93199CD-3E1B-4AE6-990F-76F925F5EA9F}" type="slidenum">
               <a:rPr lang="fr-FR" smtClean="0"/>
               <a:t>8</a:t>
+            </a:fld>
+            <a:endParaRPr lang="fr-FR" dirty="0"/>
+          </a:p>
+        </p:txBody>
+      </p:sp>
+    </p:spTree>
+    <p:extLst>
+      <p:ext uri="{BB962C8B-B14F-4D97-AF65-F5344CB8AC3E}">
+        <p14:creationId xmlns:p14="http://schemas.microsoft.com/office/powerpoint/2010/main" val="3382611344"/>
+      </p:ext>
+    </p:extLst>
+  </p:cSld>
+  <p:clrMapOvr>
+    <a:masterClrMapping/>
+  </p:clrMapOvr>
+</p:notes>
+</file>
+
+<file path=ppt/notesSlides/notesSlide9.xml><?xml version="1.0" encoding="utf-8"?>
+<p:notes xmlns:a="http://schemas.openxmlformats.org/drawingml/2006/main" xmlns:r="http://schemas.openxmlformats.org/officeDocument/2006/relationships" xmlns:p="http://schemas.openxmlformats.org/presentationml/2006/main">
+  <p:cSld>
+    <p:spTree>
+      <p:nvGrpSpPr>
+        <p:cNvPr id="1" name=""/>
+        <p:cNvGrpSpPr/>
+        <p:nvPr/>
+      </p:nvGrpSpPr>
+      <p:grpSpPr>
+        <a:xfrm>
+          <a:off x="0" y="0"/>
+          <a:ext cx="0" cy="0"/>
+          <a:chOff x="0" y="0"/>
+          <a:chExt cx="0" cy="0"/>
+        </a:xfrm>
+      </p:grpSpPr>
+      <p:sp>
+        <p:nvSpPr>
+          <p:cNvPr id="2" name="Espace réservé d’image de diapositive 1"/>
+          <p:cNvSpPr>
+            <a:spLocks noGrp="1" noRot="1" noChangeAspect="1"/>
+          </p:cNvSpPr>
+          <p:nvPr>
+            <p:ph type="sldImg"/>
+          </p:nvPr>
+        </p:nvSpPr>
+        <p:spPr/>
+      </p:sp>
+      <p:sp>
+        <p:nvSpPr>
+          <p:cNvPr id="3" name="Espace réservé des notes 2"/>
+          <p:cNvSpPr>
+            <a:spLocks noGrp="1"/>
+          </p:cNvSpPr>
+          <p:nvPr>
+            <p:ph type="body" idx="1"/>
+          </p:nvPr>
+        </p:nvSpPr>
+        <p:spPr/>
+        <p:txBody>
+          <a:bodyPr/>
+          <a:lstStyle/>
+          <a:p>
+            <a:endParaRPr lang="fr-FR" dirty="0"/>
+          </a:p>
+        </p:txBody>
+      </p:sp>
+      <p:sp>
+        <p:nvSpPr>
+          <p:cNvPr id="4" name="Espace réservé du numéro de diapositive 3"/>
+          <p:cNvSpPr>
+            <a:spLocks noGrp="1"/>
+          </p:cNvSpPr>
+          <p:nvPr>
+            <p:ph type="sldNum" sz="quarter" idx="10"/>
+          </p:nvPr>
+        </p:nvSpPr>
+        <p:spPr/>
+        <p:txBody>
+          <a:bodyPr/>
+          <a:lstStyle/>
+          <a:p>
+            <a:pPr rtl="0"/>
+            <a:fld id="{F93199CD-3E1B-4AE6-990F-76F925F5EA9F}" type="slidenum">
+              <a:rPr lang="fr-FR" smtClean="0"/>
+              <a:t>9</a:t>
             </a:fld>
             <a:endParaRPr lang="fr-FR" dirty="0"/>
           </a:p>
@@ -5849,7 +5935,7 @@
         </p:nvSpPr>
         <p:spPr>
           <a:xfrm>
-            <a:off x="1485900" y="1988840"/>
+            <a:off x="1413892" y="2060848"/>
             <a:ext cx="9601201" cy="2514600"/>
           </a:xfrm>
         </p:spPr>
@@ -6030,8 +6116,8 @@
         </p:nvSpPr>
         <p:spPr>
           <a:xfrm>
-            <a:off x="9118748" y="6453336"/>
-            <a:ext cx="2904457" cy="216024"/>
+            <a:off x="8830716" y="6453336"/>
+            <a:ext cx="3192489" cy="216024"/>
           </a:xfrm>
           <a:solidFill>
             <a:srgbClr val="B6CABF"/>
@@ -6104,8 +6190,8 @@
         </p:nvSpPr>
         <p:spPr>
           <a:xfrm>
-            <a:off x="4582244" y="2780928"/>
-            <a:ext cx="6552728" cy="2585323"/>
+            <a:off x="4582244" y="2415371"/>
+            <a:ext cx="6552728" cy="3139321"/>
           </a:xfrm>
           <a:prstGeom prst="rect">
             <a:avLst/>
@@ -6123,27 +6209,28 @@
           </a:bodyPr>
           <a:lstStyle/>
           <a:p>
-            <a:pPr algn="ctr"/>
+            <a:pPr algn="ctr">
+              <a:tabLst>
+                <a:tab pos="5384800" algn="l"/>
+              </a:tabLst>
+            </a:pPr>
             <a:r>
               <a:rPr lang="fr-CH" dirty="0" smtClean="0">
                 <a:latin typeface="Tahoma" panose="020B0604030504040204" pitchFamily="34" charset="0"/>
                 <a:ea typeface="Tahoma" panose="020B0604030504040204" pitchFamily="34" charset="0"/>
                 <a:cs typeface="Tahoma" panose="020B0604030504040204" pitchFamily="34" charset="0"/>
               </a:rPr>
-              <a:t>C’EST UNE DÉVELOPPEMENT DE HI</a:t>
-            </a:r>
-            <a:r>
-              <a:rPr lang="fr-CH" sz="1600" dirty="0" smtClean="0">
+              <a:t>C’est un développement de hiérarchie de fichiers et de dossiers dans le but de transmettre de manière synchronisée des données de différents types</a:t>
+            </a:r>
+            <a:r>
+              <a:rPr lang="fr-CH" smtClean="0">
                 <a:latin typeface="Tahoma" panose="020B0604030504040204" pitchFamily="34" charset="0"/>
                 <a:ea typeface="Tahoma" panose="020B0604030504040204" pitchFamily="34" charset="0"/>
                 <a:cs typeface="Tahoma" panose="020B0604030504040204" pitchFamily="34" charset="0"/>
               </a:rPr>
-              <a:t>ÉRARCHIE DE FICHIERS ER DE DOSSIERS DANS LE BUT DE TRANSMETTRE DE MANIÈRE SYNCHRONISÉE DES DONNÉES DE DIFFÉRENTS TYPES. </a:t>
-            </a:r>
-          </a:p>
-          <a:p>
-            <a:pPr algn="ctr"/>
-            <a:endParaRPr lang="fr-CH" sz="1600" dirty="0">
+              <a:t>. </a:t>
+            </a:r>
+            <a:endParaRPr lang="fr-CH" dirty="0" smtClean="0">
               <a:latin typeface="Tahoma" panose="020B0604030504040204" pitchFamily="34" charset="0"/>
               <a:ea typeface="Tahoma" panose="020B0604030504040204" pitchFamily="34" charset="0"/>
               <a:cs typeface="Tahoma" panose="020B0604030504040204" pitchFamily="34" charset="0"/>
@@ -6151,8 +6238,16 @@
           </a:p>
           <a:p>
             <a:pPr algn="ctr"/>
-            <a:r>
-              <a:rPr lang="fr-CH" sz="1600" dirty="0" smtClean="0">
+            <a:endParaRPr lang="fr-CH" dirty="0" smtClean="0">
+              <a:latin typeface="Tahoma" panose="020B0604030504040204" pitchFamily="34" charset="0"/>
+              <a:ea typeface="Tahoma" panose="020B0604030504040204" pitchFamily="34" charset="0"/>
+              <a:cs typeface="Tahoma" panose="020B0604030504040204" pitchFamily="34" charset="0"/>
+            </a:endParaRPr>
+          </a:p>
+          <a:p>
+            <a:pPr algn="ctr"/>
+            <a:r>
+              <a:rPr lang="fr-CH" dirty="0" smtClean="0">
                 <a:latin typeface="Tahoma" panose="020B0604030504040204" pitchFamily="34" charset="0"/>
                 <a:ea typeface="Tahoma" panose="020B0604030504040204" pitchFamily="34" charset="0"/>
                 <a:cs typeface="Tahoma" panose="020B0604030504040204" pitchFamily="34" charset="0"/>
@@ -6162,7 +6257,7 @@
           </a:p>
           <a:p>
             <a:pPr algn="ctr"/>
-            <a:endParaRPr lang="fr-CH" sz="1600" dirty="0">
+            <a:endParaRPr lang="fr-CH" dirty="0" smtClean="0">
               <a:latin typeface="Tahoma" panose="020B0604030504040204" pitchFamily="34" charset="0"/>
               <a:ea typeface="Tahoma" panose="020B0604030504040204" pitchFamily="34" charset="0"/>
               <a:cs typeface="Tahoma" panose="020B0604030504040204" pitchFamily="34" charset="0"/>
@@ -6171,7 +6266,7 @@
           <a:p>
             <a:pPr algn="ctr"/>
             <a:r>
-              <a:rPr lang="fr-CH" sz="1600" dirty="0" smtClean="0">
+              <a:rPr lang="fr-CH" dirty="0" smtClean="0">
                 <a:latin typeface="Tahoma" panose="020B0604030504040204" pitchFamily="34" charset="0"/>
                 <a:ea typeface="Tahoma" panose="020B0604030504040204" pitchFamily="34" charset="0"/>
                 <a:cs typeface="Tahoma" panose="020B0604030504040204" pitchFamily="34" charset="0"/>
@@ -6179,7 +6274,7 @@
               <a:t>CES RESTRICTIONS SONT INFRANCHISSABLE ET DOIVENT ÊTRE RESPECTÉES. ELLES SONT REPRÉSENTÉES PAR DES DROITS </a:t>
             </a:r>
             <a:r>
-              <a:rPr lang="fr-CH" sz="1600" b="1" dirty="0" smtClean="0">
+              <a:rPr lang="fr-CH" b="1" dirty="0" smtClean="0">
                 <a:latin typeface="Tahoma" panose="020B0604030504040204" pitchFamily="34" charset="0"/>
                 <a:ea typeface="Tahoma" panose="020B0604030504040204" pitchFamily="34" charset="0"/>
                 <a:cs typeface="Tahoma" panose="020B0604030504040204" pitchFamily="34" charset="0"/>
@@ -6337,8 +6432,8 @@
         </p:nvSpPr>
         <p:spPr>
           <a:xfrm>
-            <a:off x="9118748" y="6453336"/>
-            <a:ext cx="2904457" cy="216024"/>
+            <a:off x="8974732" y="6453336"/>
+            <a:ext cx="3048473" cy="216024"/>
           </a:xfrm>
           <a:solidFill>
             <a:srgbClr val="B6CABF"/>
@@ -6592,8 +6687,8 @@
         </p:nvSpPr>
         <p:spPr>
           <a:xfrm>
-            <a:off x="9118748" y="6453336"/>
-            <a:ext cx="2904457" cy="216024"/>
+            <a:off x="8974732" y="6453336"/>
+            <a:ext cx="3048473" cy="216024"/>
           </a:xfrm>
           <a:solidFill>
             <a:srgbClr val="B6CABF"/>
@@ -6636,8 +6731,8 @@
         </p:nvSpPr>
         <p:spPr>
           <a:xfrm>
-            <a:off x="549796" y="3140968"/>
-            <a:ext cx="4968552" cy="1754326"/>
+            <a:off x="261764" y="2852936"/>
+            <a:ext cx="4968552" cy="3046988"/>
           </a:xfrm>
           <a:prstGeom prst="rect">
             <a:avLst/>
@@ -6655,54 +6750,19 @@
           </a:bodyPr>
           <a:lstStyle/>
           <a:p>
-            <a:pPr algn="ctr"/>
-            <a:r>
-              <a:rPr lang="fr-CH" dirty="0" smtClean="0">
+            <a:r>
+              <a:rPr lang="fr-CH" sz="2400" dirty="0" smtClean="0">
                 <a:latin typeface="Tahoma" panose="020B0604030504040204" pitchFamily="34" charset="0"/>
                 <a:ea typeface="Tahoma" panose="020B0604030504040204" pitchFamily="34" charset="0"/>
                 <a:cs typeface="Tahoma" panose="020B0604030504040204" pitchFamily="34" charset="0"/>
               </a:rPr>
               <a:t>NTFS ( OU NEW TECHNOLOGIE FILE SYSTEM), PROCÈDUREQUE WINDOWS NT SYSTÈME UTILISÉ POUR STOCKER, ORGANISER ET TROUVER FICHIERS DANS DISQUE DUR. NTFS EXISTE DEPUIS 1993 ET EST SYSTÈME LE PLUS EFFICACE DE NOTRE GÉNÉRATION</a:t>
             </a:r>
-          </a:p>
-        </p:txBody>
-      </p:sp>
-      <p:sp>
-        <p:nvSpPr>
-          <p:cNvPr id="9" name="ZoneTexte 8"/>
-          <p:cNvSpPr txBox="1"/>
-          <p:nvPr/>
-        </p:nvSpPr>
-        <p:spPr>
-          <a:xfrm>
-            <a:off x="7606580" y="3140968"/>
-            <a:ext cx="2448272" cy="954107"/>
-          </a:xfrm>
-          <a:prstGeom prst="rect">
-            <a:avLst/>
-          </a:prstGeom>
-          <a:noFill/>
-          <a:ln>
-            <a:solidFill>
-              <a:schemeClr val="bg2"/>
-            </a:solidFill>
-          </a:ln>
-        </p:spPr>
-        <p:txBody>
-          <a:bodyPr wrap="square" rtlCol="0" anchor="ctr" anchorCtr="1">
-            <a:spAutoFit/>
-          </a:bodyPr>
-          <a:lstStyle/>
-          <a:p>
-            <a:pPr algn="ctr"/>
-            <a:r>
-              <a:rPr lang="fr-CH" sz="2800" dirty="0" smtClean="0">
-                <a:latin typeface="Tahoma" panose="020B0604030504040204" pitchFamily="34" charset="0"/>
-                <a:ea typeface="Tahoma" panose="020B0604030504040204" pitchFamily="34" charset="0"/>
-                <a:cs typeface="Tahoma" panose="020B0604030504040204" pitchFamily="34" charset="0"/>
-              </a:rPr>
-              <a:t>IMAGES OU EXEMPLES</a:t>
-            </a:r>
+            <a:endParaRPr lang="fr-CH" sz="2400" dirty="0" smtClean="0">
+              <a:latin typeface="Tahoma" panose="020B0604030504040204" pitchFamily="34" charset="0"/>
+              <a:ea typeface="Tahoma" panose="020B0604030504040204" pitchFamily="34" charset="0"/>
+              <a:cs typeface="Tahoma" panose="020B0604030504040204" pitchFamily="34" charset="0"/>
+            </a:endParaRPr>
           </a:p>
         </p:txBody>
       </p:sp>
@@ -6714,7 +6774,7 @@
         </p:nvSpPr>
         <p:spPr>
           <a:xfrm>
-            <a:off x="549796" y="2348880"/>
+            <a:off x="261764" y="1988840"/>
             <a:ext cx="4968552" cy="523220"/>
           </a:xfrm>
           <a:prstGeom prst="rect">
@@ -6735,7 +6795,7 @@
           <a:p>
             <a:pPr algn="ctr"/>
             <a:r>
-              <a:rPr lang="fr-CH" sz="2800" dirty="0" smtClean="0">
+              <a:rPr lang="fr-CH" sz="2800" b="1" u="sng" dirty="0" smtClean="0">
                 <a:latin typeface="Tahoma" panose="020B0604030504040204" pitchFamily="34" charset="0"/>
                 <a:ea typeface="Tahoma" panose="020B0604030504040204" pitchFamily="34" charset="0"/>
                 <a:cs typeface="Tahoma" panose="020B0604030504040204" pitchFamily="34" charset="0"/>
@@ -6745,6 +6805,52 @@
           </a:p>
         </p:txBody>
       </p:sp>
+      <p:pic>
+        <p:nvPicPr>
+          <p:cNvPr id="3" name="Image 2"/>
+          <p:cNvPicPr>
+            <a:picLocks noChangeAspect="1"/>
+          </p:cNvPicPr>
+          <p:nvPr/>
+        </p:nvPicPr>
+        <p:blipFill>
+          <a:blip r:embed="rId3">
+            <a:duotone>
+              <a:schemeClr val="accent5">
+                <a:shade val="45000"/>
+                <a:satMod val="135000"/>
+              </a:schemeClr>
+              <a:prstClr val="white"/>
+            </a:duotone>
+            <a:extLst>
+              <a:ext uri="{BEBA8EAE-BF5A-486C-A8C5-ECC9F3942E4B}">
+                <a14:imgProps xmlns:a14="http://schemas.microsoft.com/office/drawing/2010/main">
+                  <a14:imgLayer r:embed="rId4">
+                    <a14:imgEffect>
+                      <a14:backgroundRemoval t="0" b="98370" l="3000" r="100000"/>
+                    </a14:imgEffect>
+                  </a14:imgLayer>
+                </a14:imgProps>
+              </a:ext>
+              <a:ext uri="{28A0092B-C50C-407E-A947-70E740481C1C}">
+                <a14:useLocalDpi xmlns:a14="http://schemas.microsoft.com/office/drawing/2010/main" val="0"/>
+              </a:ext>
+            </a:extLst>
+          </a:blip>
+          <a:stretch>
+            <a:fillRect/>
+          </a:stretch>
+        </p:blipFill>
+        <p:spPr>
+          <a:xfrm>
+            <a:off x="7174532" y="2492896"/>
+            <a:ext cx="2974244" cy="2736304"/>
+          </a:xfrm>
+          <a:prstGeom prst="rect">
+            <a:avLst/>
+          </a:prstGeom>
+        </p:spPr>
+      </p:pic>
     </p:spTree>
     <p:extLst>
       <p:ext uri="{BB962C8B-B14F-4D97-AF65-F5344CB8AC3E}">
@@ -6804,29 +6910,56 @@
       </p:grpSpPr>
       <p:sp>
         <p:nvSpPr>
-          <p:cNvPr id="13" name="Titre 12"/>
-          <p:cNvSpPr>
-            <a:spLocks noGrp="1"/>
-          </p:cNvSpPr>
-          <p:nvPr>
-            <p:ph type="title"/>
-          </p:nvPr>
+          <p:cNvPr id="5" name="Titre 12"/>
+          <p:cNvSpPr txBox="1">
+            <a:spLocks/>
+          </p:cNvSpPr>
+          <p:nvPr/>
         </p:nvSpPr>
         <p:spPr>
           <a:xfrm>
-            <a:off x="1485900" y="1988840"/>
-            <a:ext cx="9601201" cy="2514600"/>
+            <a:off x="2205980" y="548680"/>
+            <a:ext cx="7772401" cy="875928"/>
           </a:xfrm>
+          <a:prstGeom prst="rect">
+            <a:avLst/>
+          </a:prstGeom>
+          <a:ln>
+            <a:noFill/>
+          </a:ln>
         </p:spPr>
         <p:txBody>
-          <a:bodyPr rtlCol="0" anchor="ctr">
+          <a:bodyPr vert="horz" lIns="91440" tIns="45720" rIns="91440" bIns="45720" rtlCol="0" anchor="ctr">
             <a:noAutofit/>
           </a:bodyPr>
-          <a:lstStyle/>
-          <a:p>
-            <a:pPr algn="ctr" rtl="0"/>
-            <a:r>
-              <a:rPr lang="fr-FR" sz="6600" dirty="0" smtClean="0">
+          <a:lstStyle>
+            <a:lvl1pPr algn="l" defTabSz="914400" rtl="0" eaLnBrk="1" latinLnBrk="0" hangingPunct="1">
+              <a:lnSpc>
+                <a:spcPct val="90000"/>
+              </a:lnSpc>
+              <a:spcBef>
+                <a:spcPct val="0"/>
+              </a:spcBef>
+              <a:buNone/>
+              <a:defRPr sz="3600" b="1" kern="1200" cap="none" spc="0" baseline="0">
+                <a:ln w="9525">
+                  <a:noFill/>
+                  <a:prstDash val="solid"/>
+                </a:ln>
+                <a:solidFill>
+                  <a:schemeClr val="accent5"/>
+                </a:solidFill>
+                <a:effectLst/>
+                <a:latin typeface="+mj-lt"/>
+                <a:ea typeface="+mj-ea"/>
+                <a:cs typeface="+mj-cs"/>
+              </a:defRPr>
+            </a:lvl1pPr>
+          </a:lstStyle>
+          <a:p>
+            <a:pPr algn="ctr"/>
+            <a:r>
+              <a:rPr lang="fr-FR" sz="4800" dirty="0" smtClean="0">
                 <a:solidFill>
                   <a:srgbClr val="87A896"/>
                 </a:solidFill>
@@ -6834,9 +6967,9 @@
                 <a:ea typeface="Tahoma" panose="020B0604030504040204" pitchFamily="34" charset="0"/>
                 <a:cs typeface="Tahoma" panose="020B0604030504040204" pitchFamily="34" charset="0"/>
               </a:rPr>
-              <a:t>SERVEURS D’IMPRESSION</a:t>
-            </a:r>
-            <a:endParaRPr lang="fr-FR" sz="6600" dirty="0">
+              <a:t>EXPLICATIONS DES AUTORISATIONS NTFS</a:t>
+            </a:r>
+            <a:endParaRPr lang="fr-FR" sz="4800" dirty="0">
               <a:solidFill>
                 <a:srgbClr val="87A896"/>
               </a:solidFill>
@@ -6847,10 +6980,310 @@
           </a:p>
         </p:txBody>
       </p:sp>
+      <p:sp>
+        <p:nvSpPr>
+          <p:cNvPr id="8" name="Titre 12"/>
+          <p:cNvSpPr>
+            <a:spLocks noGrp="1"/>
+          </p:cNvSpPr>
+          <p:nvPr>
+            <p:ph type="title"/>
+          </p:nvPr>
+        </p:nvSpPr>
+        <p:spPr>
+          <a:xfrm>
+            <a:off x="8902724" y="6453336"/>
+            <a:ext cx="3120481" cy="216024"/>
+          </a:xfrm>
+          <a:solidFill>
+            <a:srgbClr val="B6CABF"/>
+          </a:solidFill>
+        </p:spPr>
+        <p:txBody>
+          <a:bodyPr rtlCol="0" anchor="ctr">
+            <a:noAutofit/>
+          </a:bodyPr>
+          <a:lstStyle/>
+          <a:p>
+            <a:pPr algn="ctr" rtl="0"/>
+            <a:r>
+              <a:rPr lang="fr-FR" sz="1800" dirty="0" smtClean="0">
+                <a:solidFill>
+                  <a:srgbClr val="87A896"/>
+                </a:solidFill>
+                <a:latin typeface="Tahoma" panose="020B0604030504040204" pitchFamily="34" charset="0"/>
+                <a:ea typeface="Tahoma" panose="020B0604030504040204" pitchFamily="34" charset="0"/>
+                <a:cs typeface="Tahoma" panose="020B0604030504040204" pitchFamily="34" charset="0"/>
+              </a:rPr>
+              <a:t>SERVEURS DE FICHIERS</a:t>
+            </a:r>
+            <a:endParaRPr lang="fr-FR" sz="1800" dirty="0">
+              <a:solidFill>
+                <a:srgbClr val="87A896"/>
+              </a:solidFill>
+              <a:latin typeface="Tahoma" panose="020B0604030504040204" pitchFamily="34" charset="0"/>
+              <a:ea typeface="Tahoma" panose="020B0604030504040204" pitchFamily="34" charset="0"/>
+              <a:cs typeface="Tahoma" panose="020B0604030504040204" pitchFamily="34" charset="0"/>
+            </a:endParaRPr>
+          </a:p>
+        </p:txBody>
+      </p:sp>
+      <p:sp>
+        <p:nvSpPr>
+          <p:cNvPr id="7" name="ZoneTexte 6"/>
+          <p:cNvSpPr txBox="1"/>
+          <p:nvPr/>
+        </p:nvSpPr>
+        <p:spPr>
+          <a:xfrm>
+            <a:off x="333772" y="2708920"/>
+            <a:ext cx="4968552" cy="3046988"/>
+          </a:xfrm>
+          <a:prstGeom prst="rect">
+            <a:avLst/>
+          </a:prstGeom>
+          <a:noFill/>
+          <a:ln>
+            <a:solidFill>
+              <a:schemeClr val="bg2"/>
+            </a:solidFill>
+          </a:ln>
+        </p:spPr>
+        <p:txBody>
+          <a:bodyPr wrap="square" rtlCol="0" anchor="ctr" anchorCtr="1">
+            <a:spAutoFit/>
+          </a:bodyPr>
+          <a:lstStyle/>
+          <a:p>
+            <a:r>
+              <a:rPr lang="fr-CH" sz="2400" cap="all" dirty="0">
+                <a:latin typeface="Tahoma" panose="020B0604030504040204" pitchFamily="34" charset="0"/>
+                <a:ea typeface="Tahoma" panose="020B0604030504040204" pitchFamily="34" charset="0"/>
+                <a:cs typeface="Tahoma" panose="020B0604030504040204" pitchFamily="34" charset="0"/>
+              </a:rPr>
+              <a:t>1. </a:t>
+            </a:r>
+            <a:r>
+              <a:rPr lang="fr-CH" sz="2400" cap="all" dirty="0" smtClean="0">
+                <a:latin typeface="Tahoma" panose="020B0604030504040204" pitchFamily="34" charset="0"/>
+                <a:ea typeface="Tahoma" panose="020B0604030504040204" pitchFamily="34" charset="0"/>
+                <a:cs typeface="Tahoma" panose="020B0604030504040204" pitchFamily="34" charset="0"/>
+              </a:rPr>
+              <a:t>explorateur fichiers</a:t>
+            </a:r>
+            <a:r>
+              <a:rPr lang="fr-CH" sz="2400" cap="all" dirty="0">
+                <a:latin typeface="Tahoma" panose="020B0604030504040204" pitchFamily="34" charset="0"/>
+                <a:ea typeface="Tahoma" panose="020B0604030504040204" pitchFamily="34" charset="0"/>
+                <a:cs typeface="Tahoma" panose="020B0604030504040204" pitchFamily="34" charset="0"/>
+              </a:rPr>
+              <a:t>, clique droit sur </a:t>
+            </a:r>
+            <a:r>
+              <a:rPr lang="fr-CH" sz="2400" cap="all" dirty="0" smtClean="0">
+                <a:latin typeface="Tahoma" panose="020B0604030504040204" pitchFamily="34" charset="0"/>
+                <a:ea typeface="Tahoma" panose="020B0604030504040204" pitchFamily="34" charset="0"/>
+                <a:cs typeface="Tahoma" panose="020B0604030504040204" pitchFamily="34" charset="0"/>
+              </a:rPr>
+              <a:t>fichier. </a:t>
+            </a:r>
+            <a:r>
+              <a:rPr lang="fr-CH" sz="2400" cap="all" dirty="0" err="1" smtClean="0">
+                <a:latin typeface="Tahoma" panose="020B0604030504040204" pitchFamily="34" charset="0"/>
+                <a:ea typeface="Tahoma" panose="020B0604030504040204" pitchFamily="34" charset="0"/>
+                <a:cs typeface="Tahoma" panose="020B0604030504040204" pitchFamily="34" charset="0"/>
+              </a:rPr>
+              <a:t>selectionnER</a:t>
+            </a:r>
+            <a:r>
+              <a:rPr lang="fr-CH" sz="2400" cap="all" dirty="0" smtClean="0">
+                <a:latin typeface="Tahoma" panose="020B0604030504040204" pitchFamily="34" charset="0"/>
+                <a:ea typeface="Tahoma" panose="020B0604030504040204" pitchFamily="34" charset="0"/>
+                <a:cs typeface="Tahoma" panose="020B0604030504040204" pitchFamily="34" charset="0"/>
+              </a:rPr>
+              <a:t> </a:t>
+            </a:r>
+            <a:r>
+              <a:rPr lang="fr-CH" sz="2400" cap="all" dirty="0">
+                <a:latin typeface="Tahoma" panose="020B0604030504040204" pitchFamily="34" charset="0"/>
+                <a:ea typeface="Tahoma" panose="020B0604030504040204" pitchFamily="34" charset="0"/>
+                <a:cs typeface="Tahoma" panose="020B0604030504040204" pitchFamily="34" charset="0"/>
+              </a:rPr>
+              <a:t>l'option "</a:t>
+            </a:r>
+            <a:r>
+              <a:rPr lang="fr-CH" sz="2400" cap="all" dirty="0" err="1">
+                <a:latin typeface="Tahoma" panose="020B0604030504040204" pitchFamily="34" charset="0"/>
+                <a:ea typeface="Tahoma" panose="020B0604030504040204" pitchFamily="34" charset="0"/>
+                <a:cs typeface="Tahoma" panose="020B0604030504040204" pitchFamily="34" charset="0"/>
+              </a:rPr>
+              <a:t>Proprietés</a:t>
+            </a:r>
+            <a:r>
+              <a:rPr lang="fr-CH" sz="2400" cap="all" dirty="0">
+                <a:latin typeface="Tahoma" panose="020B0604030504040204" pitchFamily="34" charset="0"/>
+                <a:ea typeface="Tahoma" panose="020B0604030504040204" pitchFamily="34" charset="0"/>
+                <a:cs typeface="Tahoma" panose="020B0604030504040204" pitchFamily="34" charset="0"/>
+              </a:rPr>
+              <a:t>"</a:t>
+            </a:r>
+          </a:p>
+          <a:p>
+            <a:r>
+              <a:rPr lang="fr-CH" sz="2400" cap="all" dirty="0">
+                <a:latin typeface="Tahoma" panose="020B0604030504040204" pitchFamily="34" charset="0"/>
+                <a:ea typeface="Tahoma" panose="020B0604030504040204" pitchFamily="34" charset="0"/>
+                <a:cs typeface="Tahoma" panose="020B0604030504040204" pitchFamily="34" charset="0"/>
+              </a:rPr>
+              <a:t>2. Cliquer sur "</a:t>
+            </a:r>
+            <a:r>
+              <a:rPr lang="fr-CH" sz="2400" cap="all" dirty="0" err="1">
+                <a:latin typeface="Tahoma" panose="020B0604030504040204" pitchFamily="34" charset="0"/>
+                <a:ea typeface="Tahoma" panose="020B0604030504040204" pitchFamily="34" charset="0"/>
+                <a:cs typeface="Tahoma" panose="020B0604030504040204" pitchFamily="34" charset="0"/>
+              </a:rPr>
+              <a:t>Securité</a:t>
+            </a:r>
+            <a:r>
+              <a:rPr lang="fr-CH" sz="2400" cap="all" dirty="0">
+                <a:latin typeface="Tahoma" panose="020B0604030504040204" pitchFamily="34" charset="0"/>
+                <a:ea typeface="Tahoma" panose="020B0604030504040204" pitchFamily="34" charset="0"/>
+                <a:cs typeface="Tahoma" panose="020B0604030504040204" pitchFamily="34" charset="0"/>
+              </a:rPr>
+              <a:t>"</a:t>
+            </a:r>
+          </a:p>
+          <a:p>
+            <a:r>
+              <a:rPr lang="fr-CH" sz="2400" cap="all" dirty="0">
+                <a:latin typeface="Tahoma" panose="020B0604030504040204" pitchFamily="34" charset="0"/>
+                <a:ea typeface="Tahoma" panose="020B0604030504040204" pitchFamily="34" charset="0"/>
+                <a:cs typeface="Tahoma" panose="020B0604030504040204" pitchFamily="34" charset="0"/>
+              </a:rPr>
+              <a:t>3. </a:t>
+            </a:r>
+            <a:r>
+              <a:rPr lang="fr-CH" sz="2400" cap="all" dirty="0" err="1" smtClean="0">
+                <a:latin typeface="Tahoma" panose="020B0604030504040204" pitchFamily="34" charset="0"/>
+                <a:ea typeface="Tahoma" panose="020B0604030504040204" pitchFamily="34" charset="0"/>
+                <a:cs typeface="Tahoma" panose="020B0604030504040204" pitchFamily="34" charset="0"/>
+              </a:rPr>
+              <a:t>selectionner</a:t>
+            </a:r>
+            <a:r>
+              <a:rPr lang="fr-CH" sz="2400" cap="all" dirty="0" smtClean="0">
+                <a:latin typeface="Tahoma" panose="020B0604030504040204" pitchFamily="34" charset="0"/>
+                <a:ea typeface="Tahoma" panose="020B0604030504040204" pitchFamily="34" charset="0"/>
+                <a:cs typeface="Tahoma" panose="020B0604030504040204" pitchFamily="34" charset="0"/>
+              </a:rPr>
+              <a:t> personnes </a:t>
+            </a:r>
+            <a:r>
+              <a:rPr lang="fr-CH" sz="2400" cap="all" dirty="0">
+                <a:latin typeface="Tahoma" panose="020B0604030504040204" pitchFamily="34" charset="0"/>
+                <a:ea typeface="Tahoma" panose="020B0604030504040204" pitchFamily="34" charset="0"/>
+                <a:cs typeface="Tahoma" panose="020B0604030504040204" pitchFamily="34" charset="0"/>
+              </a:rPr>
+              <a:t>ou groupes et </a:t>
+            </a:r>
+            <a:r>
+              <a:rPr lang="fr-CH" sz="2400" cap="all" dirty="0" smtClean="0">
+                <a:latin typeface="Tahoma" panose="020B0604030504040204" pitchFamily="34" charset="0"/>
+                <a:ea typeface="Tahoma" panose="020B0604030504040204" pitchFamily="34" charset="0"/>
+                <a:cs typeface="Tahoma" panose="020B0604030504040204" pitchFamily="34" charset="0"/>
+              </a:rPr>
+              <a:t>donner permissions </a:t>
+            </a:r>
+            <a:r>
+              <a:rPr lang="fr-CH" sz="2400" cap="all" dirty="0">
+                <a:latin typeface="Tahoma" panose="020B0604030504040204" pitchFamily="34" charset="0"/>
+                <a:ea typeface="Tahoma" panose="020B0604030504040204" pitchFamily="34" charset="0"/>
+                <a:cs typeface="Tahoma" panose="020B0604030504040204" pitchFamily="34" charset="0"/>
+              </a:rPr>
+              <a:t>NTFS</a:t>
+            </a:r>
+          </a:p>
+        </p:txBody>
+      </p:sp>
+      <p:sp>
+        <p:nvSpPr>
+          <p:cNvPr id="11" name="ZoneTexte 10"/>
+          <p:cNvSpPr txBox="1"/>
+          <p:nvPr/>
+        </p:nvSpPr>
+        <p:spPr>
+          <a:xfrm>
+            <a:off x="333772" y="1916832"/>
+            <a:ext cx="4968552" cy="523220"/>
+          </a:xfrm>
+          <a:prstGeom prst="rect">
+            <a:avLst/>
+          </a:prstGeom>
+          <a:noFill/>
+          <a:ln>
+            <a:solidFill>
+              <a:schemeClr val="bg2"/>
+            </a:solidFill>
+          </a:ln>
+        </p:spPr>
+        <p:txBody>
+          <a:bodyPr wrap="square" rtlCol="0" anchor="ctr" anchorCtr="1">
+            <a:spAutoFit/>
+          </a:bodyPr>
+          <a:lstStyle/>
+          <a:p>
+            <a:pPr algn="ctr"/>
+            <a:r>
+              <a:rPr lang="fr-CH" sz="2800" b="1" u="sng" dirty="0" smtClean="0">
+                <a:latin typeface="Tahoma" panose="020B0604030504040204" pitchFamily="34" charset="0"/>
+                <a:ea typeface="Tahoma" panose="020B0604030504040204" pitchFamily="34" charset="0"/>
+                <a:cs typeface="Tahoma" panose="020B0604030504040204" pitchFamily="34" charset="0"/>
+              </a:rPr>
+              <a:t>INSTRUCTIONS NTFS</a:t>
+            </a:r>
+            <a:endParaRPr lang="fr-CH" sz="2800" b="1" u="sng" dirty="0" smtClean="0">
+              <a:latin typeface="Tahoma" panose="020B0604030504040204" pitchFamily="34" charset="0"/>
+              <a:ea typeface="Tahoma" panose="020B0604030504040204" pitchFamily="34" charset="0"/>
+              <a:cs typeface="Tahoma" panose="020B0604030504040204" pitchFamily="34" charset="0"/>
+            </a:endParaRPr>
+          </a:p>
+        </p:txBody>
+      </p:sp>
+      <p:pic>
+        <p:nvPicPr>
+          <p:cNvPr id="10" name="Image 9"/>
+          <p:cNvPicPr>
+            <a:picLocks noChangeAspect="1"/>
+          </p:cNvPicPr>
+          <p:nvPr/>
+        </p:nvPicPr>
+        <p:blipFill>
+          <a:blip r:embed="rId3">
+            <a:extLst>
+              <a:ext uri="{28A0092B-C50C-407E-A947-70E740481C1C}">
+                <a14:useLocalDpi xmlns:a14="http://schemas.microsoft.com/office/drawing/2010/main" val="0"/>
+              </a:ext>
+            </a:extLst>
+          </a:blip>
+          <a:stretch>
+            <a:fillRect/>
+          </a:stretch>
+        </p:blipFill>
+        <p:spPr>
+          <a:xfrm>
+            <a:off x="6886500" y="1844824"/>
+            <a:ext cx="4142370" cy="4176464"/>
+          </a:xfrm>
+          <a:prstGeom prst="rect">
+            <a:avLst/>
+          </a:prstGeom>
+        </p:spPr>
+      </p:pic>
     </p:spTree>
     <p:extLst>
       <p:ext uri="{BB962C8B-B14F-4D97-AF65-F5344CB8AC3E}">
-        <p14:creationId xmlns:p14="http://schemas.microsoft.com/office/powerpoint/2010/main" val="2589682945"/>
+        <p14:creationId xmlns:p14="http://schemas.microsoft.com/office/powerpoint/2010/main" val="2602070683"/>
       </p:ext>
     </p:extLst>
   </p:cSld>
@@ -6906,6 +7339,108 @@
       </p:grpSpPr>
       <p:sp>
         <p:nvSpPr>
+          <p:cNvPr id="13" name="Titre 12"/>
+          <p:cNvSpPr>
+            <a:spLocks noGrp="1"/>
+          </p:cNvSpPr>
+          <p:nvPr>
+            <p:ph type="title"/>
+          </p:nvPr>
+        </p:nvSpPr>
+        <p:spPr>
+          <a:xfrm>
+            <a:off x="1485900" y="1988840"/>
+            <a:ext cx="9601201" cy="2514600"/>
+          </a:xfrm>
+        </p:spPr>
+        <p:txBody>
+          <a:bodyPr rtlCol="0" anchor="ctr">
+            <a:noAutofit/>
+          </a:bodyPr>
+          <a:lstStyle/>
+          <a:p>
+            <a:pPr algn="ctr" rtl="0"/>
+            <a:r>
+              <a:rPr lang="fr-FR" sz="6600" dirty="0" smtClean="0">
+                <a:solidFill>
+                  <a:srgbClr val="87A896"/>
+                </a:solidFill>
+                <a:latin typeface="Tahoma" panose="020B0604030504040204" pitchFamily="34" charset="0"/>
+                <a:ea typeface="Tahoma" panose="020B0604030504040204" pitchFamily="34" charset="0"/>
+                <a:cs typeface="Tahoma" panose="020B0604030504040204" pitchFamily="34" charset="0"/>
+              </a:rPr>
+              <a:t>SERVEURS D’IMPRESSION</a:t>
+            </a:r>
+            <a:endParaRPr lang="fr-FR" sz="6600" dirty="0">
+              <a:solidFill>
+                <a:srgbClr val="87A896"/>
+              </a:solidFill>
+              <a:latin typeface="Tahoma" panose="020B0604030504040204" pitchFamily="34" charset="0"/>
+              <a:ea typeface="Tahoma" panose="020B0604030504040204" pitchFamily="34" charset="0"/>
+              <a:cs typeface="Tahoma" panose="020B0604030504040204" pitchFamily="34" charset="0"/>
+            </a:endParaRPr>
+          </a:p>
+        </p:txBody>
+      </p:sp>
+    </p:spTree>
+    <p:extLst>
+      <p:ext uri="{BB962C8B-B14F-4D97-AF65-F5344CB8AC3E}">
+        <p14:creationId xmlns:p14="http://schemas.microsoft.com/office/powerpoint/2010/main" val="2589682945"/>
+      </p:ext>
+    </p:extLst>
+  </p:cSld>
+  <p:clrMapOvr>
+    <a:masterClrMapping/>
+  </p:clrMapOvr>
+  <mc:AlternateContent xmlns:mc="http://schemas.openxmlformats.org/markup-compatibility/2006" xmlns:p14="http://schemas.microsoft.com/office/powerpoint/2010/main">
+    <mc:Choice Requires="p14">
+      <p:transition spd="med" p14:dur="700">
+        <p:fade/>
+      </p:transition>
+    </mc:Choice>
+    <mc:Fallback xmlns="">
+      <p:transition spd="med">
+        <p:fade/>
+      </p:transition>
+    </mc:Fallback>
+  </mc:AlternateContent>
+  <p:timing>
+    <p:tnLst>
+      <p:par>
+        <p:cTn id="1" dur="indefinite" restart="never" nodeType="tmRoot"/>
+      </p:par>
+    </p:tnLst>
+  </p:timing>
+</p:sld>
+</file>
+
+<file path=ppt/slides/slide9.xml><?xml version="1.0" encoding="utf-8"?>
+<p:sld xmlns:a="http://schemas.openxmlformats.org/drawingml/2006/main" xmlns:r="http://schemas.openxmlformats.org/officeDocument/2006/relationships" xmlns:p="http://schemas.openxmlformats.org/presentationml/2006/main">
+  <p:cSld>
+    <p:bg>
+      <p:bgPr>
+        <a:solidFill>
+          <a:srgbClr val="34473D"/>
+        </a:solidFill>
+        <a:effectLst/>
+      </p:bgPr>
+    </p:bg>
+    <p:spTree>
+      <p:nvGrpSpPr>
+        <p:cNvPr id="1" name=""/>
+        <p:cNvGrpSpPr/>
+        <p:nvPr/>
+      </p:nvGrpSpPr>
+      <p:grpSpPr>
+        <a:xfrm>
+          <a:off x="0" y="0"/>
+          <a:ext cx="0" cy="0"/>
+          <a:chOff x="0" y="0"/>
+          <a:chExt cx="0" cy="0"/>
+        </a:xfrm>
+      </p:grpSpPr>
+      <p:sp>
+        <p:nvSpPr>
           <p:cNvPr id="5" name="Titre 12"/>
           <p:cNvSpPr txBox="1">
             <a:spLocks/>
@@ -7002,8 +7537,8 @@
         </p:nvSpPr>
         <p:spPr>
           <a:xfrm>
-            <a:off x="9118748" y="6453336"/>
-            <a:ext cx="2904457" cy="216024"/>
+            <a:off x="8758708" y="6453336"/>
+            <a:ext cx="3264497" cy="216024"/>
           </a:xfrm>
           <a:solidFill>
             <a:srgbClr val="B6CABF"/>
@@ -8010,6 +8545,15 @@
 </file>
 
 <file path=customXml/item2.xml><?xml version="1.0" encoding="utf-8"?>
+<?mso-contentType ?>
+<FormTemplates xmlns="http://schemas.microsoft.com/sharepoint/v3/contenttype/forms">
+  <Display>DocumentLibraryForm</Display>
+  <Edit>DocumentLibraryForm</Edit>
+  <New>DocumentLibraryForm</New>
+</FormTemplates>
+</file>
+
+<file path=customXml/item3.xml><?xml version="1.0" encoding="utf-8"?>
 <ct:contentTypeSchema xmlns:ct="http://schemas.microsoft.com/office/2006/metadata/contentType" xmlns:ma="http://schemas.microsoft.com/office/2006/metadata/properties/metaAttributes" ct:_="" ma:_="" ma:contentTypeName="Document" ma:contentTypeID="0x010100AA3F7D94069FF64A86F7DFF56D60E3BE" ma:contentTypeVersion="6" ma:contentTypeDescription="Create a new document." ma:contentTypeScope="" ma:versionID="c32302c77d4085ecf495bdddb7f5e889">
   <xsd:schema xmlns:xsd="http://www.w3.org/2001/XMLSchema" xmlns:xs="http://www.w3.org/2001/XMLSchema" xmlns:p="http://schemas.microsoft.com/office/2006/metadata/properties" xmlns:ns2="a4f35948-e619-41b3-aa29-22878b09cfd2" xmlns:ns3="40262f94-9f35-4ac3-9a90-690165a166b7" targetNamespace="http://schemas.microsoft.com/office/2006/metadata/properties" ma:root="true" ma:fieldsID="4ab5ae46be95f9d0be6107e8200be7a2" ns2:_="" ns3:_="">
     <xsd:import namespace="a4f35948-e619-41b3-aa29-22878b09cfd2"/>
@@ -8190,15 +8734,6 @@
 </ct:contentTypeSchema>
 </file>
 
-<file path=customXml/item3.xml><?xml version="1.0" encoding="utf-8"?>
-<?mso-contentType ?>
-<FormTemplates xmlns="http://schemas.microsoft.com/sharepoint/v3/contenttype/forms">
-  <Display>DocumentLibraryForm</Display>
-  <Edit>DocumentLibraryForm</Edit>
-  <New>DocumentLibraryForm</New>
-</FormTemplates>
-</file>
-
 <file path=customXml/itemProps1.xml><?xml version="1.0" encoding="utf-8"?>
 <ds:datastoreItem xmlns:ds="http://schemas.openxmlformats.org/officeDocument/2006/customXml" ds:itemID="{3049C11C-71DC-49B6-ACD8-27E3AE088D14}">
   <ds:schemaRefs>
@@ -8217,6 +8752,14 @@
 </file>
 
 <file path=customXml/itemProps2.xml><?xml version="1.0" encoding="utf-8"?>
+<ds:datastoreItem xmlns:ds="http://schemas.openxmlformats.org/officeDocument/2006/customXml" ds:itemID="{0875BD71-4A33-4FB7-88CA-777C4D9E6EE5}">
+  <ds:schemaRefs>
+    <ds:schemaRef ds:uri="http://schemas.microsoft.com/sharepoint/v3/contenttype/forms"/>
+  </ds:schemaRefs>
+</ds:datastoreItem>
+</file>
+
+<file path=customXml/itemProps3.xml><?xml version="1.0" encoding="utf-8"?>
 <ds:datastoreItem xmlns:ds="http://schemas.openxmlformats.org/officeDocument/2006/customXml" ds:itemID="{51F78577-2839-4BFF-9EC7-673BD8FEBD87}">
   <ds:schemaRefs>
     <ds:schemaRef ds:uri="http://schemas.microsoft.com/office/2006/metadata/contentType"/>
@@ -8233,12 +8776,4 @@
     <ds:schemaRef ds:uri="http://schemas.microsoft.com/internal/obd"/>
   </ds:schemaRefs>
 </ds:datastoreItem>
-</file>
-
-<file path=customXml/itemProps3.xml><?xml version="1.0" encoding="utf-8"?>
-<ds:datastoreItem xmlns:ds="http://schemas.openxmlformats.org/officeDocument/2006/customXml" ds:itemID="{0875BD71-4A33-4FB7-88CA-777C4D9E6EE5}">
-  <ds:schemaRefs>
-    <ds:schemaRef ds:uri="http://schemas.microsoft.com/sharepoint/v3/contenttype/forms"/>
-  </ds:schemaRefs>
-</ds:datastoreItem>
 </file>
</xml_diff>

<commit_message>
changer la position du titre
</commit_message>
<xml_diff>
--- a/SERVEUR ET FICHIERS D’IMPRESSION.pptx
+++ b/SERVEUR ET FICHIERS D’IMPRESSION.pptx
@@ -245,10 +245,6 @@
 </p:cmAuthorLst>
 </file>
 
-<file path=ppt/revisionInfo.xml><?xml version="1.0" encoding="utf-8"?>
-<p1510:revInfo xmlns:a="http://schemas.openxmlformats.org/drawingml/2006/main" xmlns:r="http://schemas.openxmlformats.org/officeDocument/2006/relationships" xmlns:p1510="http://schemas.microsoft.com/office/powerpoint/2015/10/main"/>
-</file>
-
 <file path=ppt/handoutMasters/handoutMaster1.xml><?xml version="1.0" encoding="utf-8"?>
 <p:handoutMaster xmlns:a="http://schemas.openxmlformats.org/drawingml/2006/main" xmlns:r="http://schemas.openxmlformats.org/officeDocument/2006/relationships" xmlns:p="http://schemas.openxmlformats.org/presentationml/2006/main">
   <p:cSld>
@@ -333,7 +329,7 @@
             <a:pPr rtl="0"/>
             <a:fld id="{1BF5C993-8495-4216-89A4-42CD5FDDBACA}" type="datetime1">
               <a:rPr lang="fr-FR" smtClean="0"/>
-              <a:t>13/04/2022</a:t>
+              <a:t>27/04/2022</a:t>
             </a:fld>
             <a:endParaRPr lang="fr-FR" dirty="0"/>
           </a:p>
@@ -503,7 +499,7 @@
             <a:pPr rtl="0"/>
             <a:fld id="{2C0862E7-FD40-4D3D-ACE4-67E006776546}" type="datetime1">
               <a:rPr lang="fr-FR" noProof="0" smtClean="0"/>
-              <a:t>13/04/2022</a:t>
+              <a:t>27/04/2022</a:t>
             </a:fld>
             <a:endParaRPr lang="fr-FR" noProof="0" dirty="0"/>
           </a:p>
@@ -1611,7 +1607,7 @@
           <a:p>
             <a:pPr rtl="0"/>
             <a:r>
-              <a:rPr lang="fr-FR" noProof="0" smtClean="0"/>
+              <a:rPr lang="fr-FR" noProof="0"/>
               <a:t>Modifiez le style du titre</a:t>
             </a:r>
             <a:endParaRPr lang="fr-FR" noProof="0" dirty="0"/>
@@ -1734,7 +1730,7 @@
           <a:p>
             <a:pPr rtl="0"/>
             <a:r>
-              <a:rPr lang="fr-FR" noProof="0" smtClean="0"/>
+              <a:rPr lang="fr-FR" noProof="0"/>
               <a:t>Modifier le style des sous-titres du masque</a:t>
             </a:r>
             <a:endParaRPr lang="fr-FR" noProof="0" dirty="0"/>
@@ -1806,7 +1802,7 @@
             <a:fld id="{B88C40BB-4737-4D39-9F3C-F0B9A14C804A}" type="datetime1">
               <a:rPr lang="fr-FR" smtClean="0"/>
               <a:pPr/>
-              <a:t>13/04/2022</a:t>
+              <a:t>27/04/2022</a:t>
             </a:fld>
             <a:endParaRPr lang="fr-FR" dirty="0"/>
           </a:p>
@@ -1834,13 +1830,6 @@
       </p:transition>
     </mc:Fallback>
   </mc:AlternateContent>
-  <p:timing>
-    <p:tnLst>
-      <p:par>
-        <p:cTn id="1" dur="indefinite" restart="never" nodeType="tmRoot"/>
-      </p:par>
-    </p:tnLst>
-  </p:timing>
 </p:sldLayout>
 </file>
 
@@ -1878,7 +1867,7 @@
           <a:p>
             <a:pPr rtl="0"/>
             <a:r>
-              <a:rPr lang="fr-FR" noProof="0" smtClean="0"/>
+              <a:rPr lang="fr-FR" noProof="0"/>
               <a:t>Modifiez le style du titre</a:t>
             </a:r>
             <a:endParaRPr lang="fr-FR" noProof="0" dirty="0"/>
@@ -2006,7 +1995,7 @@
             <a:fld id="{B88C40BB-4737-4D39-9F3C-F0B9A14C804A}" type="datetime1">
               <a:rPr lang="fr-FR" smtClean="0"/>
               <a:pPr/>
-              <a:t>13/04/2022</a:t>
+              <a:t>27/04/2022</a:t>
             </a:fld>
             <a:endParaRPr lang="fr-FR" dirty="0"/>
           </a:p>
@@ -2034,13 +2023,6 @@
       </p:transition>
     </mc:Fallback>
   </mc:AlternateContent>
-  <p:timing>
-    <p:tnLst>
-      <p:par>
-        <p:cTn id="1" dur="indefinite" restart="never" nodeType="tmRoot"/>
-      </p:par>
-    </p:tnLst>
-  </p:timing>
 </p:sldLayout>
 </file>
 
@@ -2083,7 +2065,7 @@
           <a:p>
             <a:pPr rtl="0"/>
             <a:r>
-              <a:rPr lang="fr-FR" noProof="0" smtClean="0"/>
+              <a:rPr lang="fr-FR" noProof="0"/>
               <a:t>Modifiez le style du titre</a:t>
             </a:r>
             <a:endParaRPr lang="fr-FR" noProof="0" dirty="0"/>
@@ -2216,7 +2198,7 @@
             <a:fld id="{B88C40BB-4737-4D39-9F3C-F0B9A14C804A}" type="datetime1">
               <a:rPr lang="fr-FR" smtClean="0"/>
               <a:pPr/>
-              <a:t>13/04/2022</a:t>
+              <a:t>27/04/2022</a:t>
             </a:fld>
             <a:endParaRPr lang="fr-FR" dirty="0"/>
           </a:p>
@@ -2244,13 +2226,6 @@
       </p:transition>
     </mc:Fallback>
   </mc:AlternateContent>
-  <p:timing>
-    <p:tnLst>
-      <p:par>
-        <p:cTn id="1" dur="indefinite" restart="never" nodeType="tmRoot"/>
-      </p:par>
-    </p:tnLst>
-  </p:timing>
 </p:sldLayout>
 </file>
 
@@ -2288,7 +2263,7 @@
           <a:p>
             <a:pPr rtl="0"/>
             <a:r>
-              <a:rPr lang="fr-FR" noProof="0" smtClean="0"/>
+              <a:rPr lang="fr-FR" noProof="0"/>
               <a:t>Modifiez le style du titre</a:t>
             </a:r>
             <a:endParaRPr lang="fr-FR" noProof="0" dirty="0"/>
@@ -2417,7 +2392,7 @@
             <a:fld id="{B88C40BB-4737-4D39-9F3C-F0B9A14C804A}" type="datetime1">
               <a:rPr lang="fr-FR" smtClean="0"/>
               <a:pPr/>
-              <a:t>13/04/2022</a:t>
+              <a:t>27/04/2022</a:t>
             </a:fld>
             <a:endParaRPr lang="fr-FR" dirty="0"/>
           </a:p>
@@ -2445,13 +2420,6 @@
       </p:transition>
     </mc:Fallback>
   </mc:AlternateContent>
-  <p:timing>
-    <p:tnLst>
-      <p:par>
-        <p:cTn id="1" dur="indefinite" restart="never" nodeType="tmRoot"/>
-      </p:par>
-    </p:tnLst>
-  </p:timing>
 </p:sldLayout>
 </file>
 
@@ -2505,7 +2473,7 @@
           <a:p>
             <a:pPr rtl="0"/>
             <a:r>
-              <a:rPr lang="fr-FR" noProof="0" smtClean="0"/>
+              <a:rPr lang="fr-FR" noProof="0"/>
               <a:t>Modifiez le style du titre</a:t>
             </a:r>
             <a:endParaRPr lang="fr-FR" noProof="0" dirty="0"/>
@@ -2695,7 +2663,7 @@
             <a:fld id="{B88C40BB-4737-4D39-9F3C-F0B9A14C804A}" type="datetime1">
               <a:rPr lang="fr-FR" smtClean="0"/>
               <a:pPr/>
-              <a:t>13/04/2022</a:t>
+              <a:t>27/04/2022</a:t>
             </a:fld>
             <a:endParaRPr lang="fr-FR" dirty="0"/>
           </a:p>
@@ -2723,13 +2691,6 @@
       </p:transition>
     </mc:Fallback>
   </mc:AlternateContent>
-  <p:timing>
-    <p:tnLst>
-      <p:par>
-        <p:cTn id="1" dur="indefinite" restart="never" nodeType="tmRoot"/>
-      </p:par>
-    </p:tnLst>
-  </p:timing>
 </p:sldLayout>
 </file>
 
@@ -2772,7 +2733,7 @@
           <a:p>
             <a:pPr rtl="0"/>
             <a:r>
-              <a:rPr lang="fr-FR" noProof="0" smtClean="0"/>
+              <a:rPr lang="fr-FR" noProof="0"/>
               <a:t>Modifiez le style du titre</a:t>
             </a:r>
             <a:endParaRPr lang="fr-FR" noProof="0" dirty="0"/>
@@ -3058,7 +3019,7 @@
             <a:fld id="{B88C40BB-4737-4D39-9F3C-F0B9A14C804A}" type="datetime1">
               <a:rPr lang="fr-FR" smtClean="0"/>
               <a:pPr/>
-              <a:t>13/04/2022</a:t>
+              <a:t>27/04/2022</a:t>
             </a:fld>
             <a:endParaRPr lang="fr-FR" dirty="0"/>
           </a:p>
@@ -3086,13 +3047,6 @@
       </p:transition>
     </mc:Fallback>
   </mc:AlternateContent>
-  <p:timing>
-    <p:tnLst>
-      <p:par>
-        <p:cTn id="1" dur="indefinite" restart="never" nodeType="tmRoot"/>
-      </p:par>
-    </p:tnLst>
-  </p:timing>
 </p:sldLayout>
 </file>
 
@@ -3139,7 +3093,7 @@
           <a:p>
             <a:pPr rtl="0"/>
             <a:r>
-              <a:rPr lang="fr-FR" noProof="0" smtClean="0"/>
+              <a:rPr lang="fr-FR" noProof="0"/>
               <a:t>Modifiez le style du titre</a:t>
             </a:r>
             <a:endParaRPr lang="fr-FR" noProof="0" dirty="0"/>
@@ -3657,7 +3611,7 @@
             <a:fld id="{B88C40BB-4737-4D39-9F3C-F0B9A14C804A}" type="datetime1">
               <a:rPr lang="fr-FR" smtClean="0"/>
               <a:pPr/>
-              <a:t>13/04/2022</a:t>
+              <a:t>27/04/2022</a:t>
             </a:fld>
             <a:endParaRPr lang="fr-FR" dirty="0"/>
           </a:p>
@@ -3685,13 +3639,6 @@
       </p:transition>
     </mc:Fallback>
   </mc:AlternateContent>
-  <p:timing>
-    <p:tnLst>
-      <p:par>
-        <p:cTn id="1" dur="indefinite" restart="never" nodeType="tmRoot"/>
-      </p:par>
-    </p:tnLst>
-  </p:timing>
 </p:sldLayout>
 </file>
 
@@ -3729,7 +3676,7 @@
           <a:p>
             <a:pPr rtl="0"/>
             <a:r>
-              <a:rPr lang="fr-FR" noProof="0" smtClean="0"/>
+              <a:rPr lang="fr-FR" noProof="0"/>
               <a:t>Modifiez le style du titre</a:t>
             </a:r>
             <a:endParaRPr lang="fr-FR" noProof="0" dirty="0"/>
@@ -3927,7 +3874,7 @@
             <a:fld id="{B88C40BB-4737-4D39-9F3C-F0B9A14C804A}" type="datetime1">
               <a:rPr lang="fr-FR" smtClean="0"/>
               <a:pPr/>
-              <a:t>13/04/2022</a:t>
+              <a:t>27/04/2022</a:t>
             </a:fld>
             <a:endParaRPr lang="fr-FR" dirty="0"/>
           </a:p>
@@ -3955,13 +3902,6 @@
       </p:transition>
     </mc:Fallback>
   </mc:AlternateContent>
-  <p:timing>
-    <p:tnLst>
-      <p:par>
-        <p:cTn id="1" dur="indefinite" restart="never" nodeType="tmRoot"/>
-      </p:par>
-    </p:tnLst>
-  </p:timing>
 </p:sldLayout>
 </file>
 
@@ -4043,7 +3983,7 @@
             <a:fld id="{B88C40BB-4737-4D39-9F3C-F0B9A14C804A}" type="datetime1">
               <a:rPr lang="fr-FR" smtClean="0"/>
               <a:pPr/>
-              <a:t>13/04/2022</a:t>
+              <a:t>27/04/2022</a:t>
             </a:fld>
             <a:endParaRPr lang="fr-FR" dirty="0"/>
           </a:p>
@@ -4071,13 +4011,6 @@
       </p:transition>
     </mc:Fallback>
   </mc:AlternateContent>
-  <p:timing>
-    <p:tnLst>
-      <p:par>
-        <p:cTn id="1" dur="indefinite" restart="never" nodeType="tmRoot"/>
-      </p:par>
-    </p:tnLst>
-  </p:timing>
 </p:sldLayout>
 </file>
 
@@ -4133,7 +4066,7 @@
           <a:p>
             <a:pPr rtl="0"/>
             <a:r>
-              <a:rPr lang="fr-FR" noProof="0" smtClean="0"/>
+              <a:rPr lang="fr-FR" noProof="0"/>
               <a:t>Modifiez le style du titre</a:t>
             </a:r>
             <a:endParaRPr lang="fr-FR" noProof="0" dirty="0"/>
@@ -4360,7 +4293,7 @@
             <a:fld id="{B88C40BB-4737-4D39-9F3C-F0B9A14C804A}" type="datetime1">
               <a:rPr lang="fr-FR" smtClean="0"/>
               <a:pPr/>
-              <a:t>13/04/2022</a:t>
+              <a:t>27/04/2022</a:t>
             </a:fld>
             <a:endParaRPr lang="fr-FR" dirty="0"/>
           </a:p>
@@ -4388,13 +4321,6 @@
       </p:transition>
     </mc:Fallback>
   </mc:AlternateContent>
-  <p:timing>
-    <p:tnLst>
-      <p:par>
-        <p:cTn id="1" dur="indefinite" restart="never" nodeType="tmRoot"/>
-      </p:par>
-    </p:tnLst>
-  </p:timing>
 </p:sldLayout>
 </file>
 
@@ -4450,7 +4376,7 @@
           <a:p>
             <a:pPr rtl="0"/>
             <a:r>
-              <a:rPr lang="fr-FR" noProof="0" smtClean="0"/>
+              <a:rPr lang="fr-FR" noProof="0"/>
               <a:t>Modifiez le style du titre</a:t>
             </a:r>
             <a:endParaRPr lang="fr-FR" noProof="0" dirty="0"/>
@@ -4527,7 +4453,7 @@
           <a:p>
             <a:pPr rtl="0"/>
             <a:r>
-              <a:rPr lang="fr-FR" noProof="0" smtClean="0"/>
+              <a:rPr lang="fr-FR" noProof="0"/>
               <a:t>Cliquez sur l'icône pour ajouter une image</a:t>
             </a:r>
             <a:endParaRPr lang="fr-FR" noProof="0" dirty="0"/>
@@ -4668,7 +4594,7 @@
             <a:fld id="{B88C40BB-4737-4D39-9F3C-F0B9A14C804A}" type="datetime1">
               <a:rPr lang="fr-FR" smtClean="0"/>
               <a:pPr/>
-              <a:t>13/04/2022</a:t>
+              <a:t>27/04/2022</a:t>
             </a:fld>
             <a:endParaRPr lang="fr-FR" dirty="0"/>
           </a:p>
@@ -4696,13 +4622,6 @@
       </p:transition>
     </mc:Fallback>
   </mc:AlternateContent>
-  <p:timing>
-    <p:tnLst>
-      <p:par>
-        <p:cTn id="1" dur="indefinite" restart="never" nodeType="tmRoot"/>
-      </p:par>
-    </p:tnLst>
-  </p:timing>
 </p:sldLayout>
 </file>
 
@@ -5044,7 +4963,7 @@
             <a:fld id="{B88C40BB-4737-4D39-9F3C-F0B9A14C804A}" type="datetime1">
               <a:rPr lang="fr-FR" smtClean="0"/>
               <a:pPr/>
-              <a:t>13/04/2022</a:t>
+              <a:t>27/04/2022</a:t>
             </a:fld>
             <a:endParaRPr lang="fr-FR" dirty="0"/>
           </a:p>
@@ -5083,13 +5002,6 @@
       </p:transition>
     </mc:Fallback>
   </mc:AlternateContent>
-  <p:timing>
-    <p:tnLst>
-      <p:par>
-        <p:cTn id="1" dur="indefinite" restart="never" nodeType="tmRoot"/>
-      </p:par>
-    </p:tnLst>
-  </p:timing>
   <p:hf hdr="0" ftr="0"/>
   <p:txStyles>
     <p:titleStyle>
@@ -5448,7 +5360,7 @@
           <a:p>
             <a:pPr algn="ctr" rtl="0"/>
             <a:r>
-              <a:rPr lang="fr-FR" dirty="0" smtClean="0">
+              <a:rPr lang="fr-FR" dirty="0">
                 <a:solidFill>
                   <a:schemeClr val="bg2">
                     <a:lumMod val="60000"/>
@@ -5461,17 +5373,6 @@
               </a:rPr>
               <a:t>SERVEURS ET FICHIERS D’IMPRESSION</a:t>
             </a:r>
-            <a:endParaRPr lang="fr-FR" dirty="0">
-              <a:solidFill>
-                <a:schemeClr val="bg2">
-                  <a:lumMod val="60000"/>
-                  <a:lumOff val="40000"/>
-                </a:schemeClr>
-              </a:solidFill>
-              <a:latin typeface="Tahoma" panose="020B0604030504040204" pitchFamily="34" charset="0"/>
-              <a:ea typeface="Tahoma" panose="020B0604030504040204" pitchFamily="34" charset="0"/>
-              <a:cs typeface="Tahoma" panose="020B0604030504040204" pitchFamily="34" charset="0"/>
-            </a:endParaRPr>
           </a:p>
         </p:txBody>
       </p:sp>
@@ -5500,7 +5401,7 @@
           <a:p>
             <a:pPr rtl="0"/>
             <a:r>
-              <a:rPr lang="fr-FR" sz="1600" dirty="0" smtClean="0">
+              <a:rPr lang="fr-FR" sz="1600" dirty="0">
                 <a:solidFill>
                   <a:schemeClr val="bg2">
                     <a:lumMod val="60000"/>
@@ -5513,17 +5414,6 @@
               </a:rPr>
               <a:t>ALESSIA, JORGE, PHILIPPE, ROMAIN</a:t>
             </a:r>
-            <a:endParaRPr lang="fr-FR" sz="1600" dirty="0">
-              <a:solidFill>
-                <a:schemeClr val="bg2">
-                  <a:lumMod val="60000"/>
-                  <a:lumOff val="40000"/>
-                </a:schemeClr>
-              </a:solidFill>
-              <a:latin typeface="Tahoma" panose="020B0604030504040204" pitchFamily="34" charset="0"/>
-              <a:ea typeface="Tahoma" panose="020B0604030504040204" pitchFamily="34" charset="0"/>
-              <a:cs typeface="Tahoma" panose="020B0604030504040204" pitchFamily="34" charset="0"/>
-            </a:endParaRPr>
           </a:p>
         </p:txBody>
       </p:sp>
@@ -5590,13 +5480,6 @@
       <p:transition/>
     </mc:Fallback>
   </mc:AlternateContent>
-  <p:timing>
-    <p:tnLst>
-      <p:par>
-        <p:cTn id="1" dur="indefinite" restart="never" nodeType="tmRoot"/>
-      </p:par>
-    </p:tnLst>
-  </p:timing>
 </p:sld>
 </file>
 
@@ -5649,7 +5532,7 @@
           <a:p>
             <a:pPr algn="ctr" rtl="0"/>
             <a:r>
-              <a:rPr lang="fr-FR" sz="4400" dirty="0" smtClean="0">
+              <a:rPr lang="fr-FR" sz="4400" dirty="0">
                 <a:solidFill>
                   <a:srgbClr val="87A896"/>
                 </a:solidFill>
@@ -5659,14 +5542,6 @@
               </a:rPr>
               <a:t>TABLES DES MATIÈRES</a:t>
             </a:r>
-            <a:endParaRPr lang="fr-FR" sz="4400" dirty="0">
-              <a:solidFill>
-                <a:srgbClr val="87A896"/>
-              </a:solidFill>
-              <a:latin typeface="Tahoma" panose="020B0604030504040204" pitchFamily="34" charset="0"/>
-              <a:ea typeface="Tahoma" panose="020B0604030504040204" pitchFamily="34" charset="0"/>
-              <a:cs typeface="Tahoma" panose="020B0604030504040204" pitchFamily="34" charset="0"/>
-            </a:endParaRPr>
           </a:p>
         </p:txBody>
       </p:sp>
@@ -5702,27 +5577,8 @@
                 <a:ea typeface="Tahoma" panose="020B0604030504040204" pitchFamily="34" charset="0"/>
                 <a:cs typeface="Tahoma" panose="020B0604030504040204" pitchFamily="34" charset="0"/>
               </a:rPr>
-              <a:t>Serveur de fichiers </a:t>
-            </a:r>
-            <a:r>
-              <a:rPr lang="fr-CH" b="1" dirty="0" smtClean="0">
-                <a:solidFill>
-                  <a:srgbClr val="87A896"/>
-                </a:solidFill>
-                <a:latin typeface="Tahoma" panose="020B0604030504040204" pitchFamily="34" charset="0"/>
-                <a:ea typeface="Tahoma" panose="020B0604030504040204" pitchFamily="34" charset="0"/>
-                <a:cs typeface="Tahoma" panose="020B0604030504040204" pitchFamily="34" charset="0"/>
-              </a:rPr>
-              <a:t>:</a:t>
-            </a:r>
-            <a:endParaRPr lang="fr-CH" b="1" dirty="0">
-              <a:solidFill>
-                <a:srgbClr val="87A896"/>
-              </a:solidFill>
-              <a:latin typeface="Tahoma" panose="020B0604030504040204" pitchFamily="34" charset="0"/>
-              <a:ea typeface="Tahoma" panose="020B0604030504040204" pitchFamily="34" charset="0"/>
-              <a:cs typeface="Tahoma" panose="020B0604030504040204" pitchFamily="34" charset="0"/>
-            </a:endParaRPr>
+              <a:t>Serveur de fichiers :</a:t>
+            </a:r>
           </a:p>
           <a:p>
             <a:pPr lvl="1"/>
@@ -5846,27 +5702,8 @@
                 <a:ea typeface="Tahoma" panose="020B0604030504040204" pitchFamily="34" charset="0"/>
                 <a:cs typeface="Tahoma" panose="020B0604030504040204" pitchFamily="34" charset="0"/>
               </a:rPr>
-              <a:t>Files </a:t>
-            </a:r>
-            <a:r>
-              <a:rPr lang="fr-CH" b="1" dirty="0" smtClean="0">
-                <a:solidFill>
-                  <a:srgbClr val="87A896"/>
-                </a:solidFill>
-                <a:latin typeface="Tahoma" panose="020B0604030504040204" pitchFamily="34" charset="0"/>
-                <a:ea typeface="Tahoma" panose="020B0604030504040204" pitchFamily="34" charset="0"/>
-                <a:cs typeface="Tahoma" panose="020B0604030504040204" pitchFamily="34" charset="0"/>
-              </a:rPr>
-              <a:t>d'impression</a:t>
-            </a:r>
-            <a:endParaRPr lang="fr-CH" b="1" dirty="0">
-              <a:solidFill>
-                <a:srgbClr val="87A896"/>
-              </a:solidFill>
-              <a:latin typeface="Tahoma" panose="020B0604030504040204" pitchFamily="34" charset="0"/>
-              <a:ea typeface="Tahoma" panose="020B0604030504040204" pitchFamily="34" charset="0"/>
-              <a:cs typeface="Tahoma" panose="020B0604030504040204" pitchFamily="34" charset="0"/>
-            </a:endParaRPr>
+              <a:t>Files d'impression</a:t>
+            </a:r>
           </a:p>
         </p:txBody>
       </p:sp>
@@ -5888,13 +5725,6 @@
       <p:transition/>
     </mc:Fallback>
   </mc:AlternateContent>
-  <p:timing>
-    <p:tnLst>
-      <p:par>
-        <p:cTn id="1" dur="indefinite" restart="never" nodeType="tmRoot"/>
-      </p:par>
-    </p:tnLst>
-  </p:timing>
 </p:sld>
 </file>
 
@@ -5947,7 +5777,7 @@
           <a:p>
             <a:pPr algn="ctr" rtl="0"/>
             <a:r>
-              <a:rPr lang="fr-FR" sz="6600" dirty="0" smtClean="0">
+              <a:rPr lang="fr-FR" sz="6600" dirty="0">
                 <a:solidFill>
                   <a:srgbClr val="87A896"/>
                 </a:solidFill>
@@ -5957,14 +5787,6 @@
               </a:rPr>
               <a:t>SERVEURS DE FICHIERS</a:t>
             </a:r>
-            <a:endParaRPr lang="fr-FR" sz="6600" dirty="0">
-              <a:solidFill>
-                <a:srgbClr val="87A896"/>
-              </a:solidFill>
-              <a:latin typeface="Tahoma" panose="020B0604030504040204" pitchFamily="34" charset="0"/>
-              <a:ea typeface="Tahoma" panose="020B0604030504040204" pitchFamily="34" charset="0"/>
-              <a:cs typeface="Tahoma" panose="020B0604030504040204" pitchFamily="34" charset="0"/>
-            </a:endParaRPr>
           </a:p>
         </p:txBody>
       </p:sp>
@@ -5990,13 +5812,6 @@
       </p:transition>
     </mc:Fallback>
   </mc:AlternateContent>
-  <p:timing>
-    <p:tnLst>
-      <p:par>
-        <p:cTn id="1" dur="indefinite" restart="never" nodeType="tmRoot"/>
-      </p:par>
-    </p:tnLst>
-  </p:timing>
 </p:sld>
 </file>
 
@@ -6083,7 +5898,7 @@
           <a:p>
             <a:pPr algn="ctr"/>
             <a:r>
-              <a:rPr lang="fr-FR" sz="6600" dirty="0" smtClean="0">
+              <a:rPr lang="fr-FR" sz="6600" dirty="0">
                 <a:solidFill>
                   <a:srgbClr val="87A896"/>
                 </a:solidFill>
@@ -6093,14 +5908,6 @@
               </a:rPr>
               <a:t>ARBORESCENCES</a:t>
             </a:r>
-            <a:endParaRPr lang="fr-FR" sz="6600" dirty="0">
-              <a:solidFill>
-                <a:srgbClr val="87A896"/>
-              </a:solidFill>
-              <a:latin typeface="Tahoma" panose="020B0604030504040204" pitchFamily="34" charset="0"/>
-              <a:ea typeface="Tahoma" panose="020B0604030504040204" pitchFamily="34" charset="0"/>
-              <a:cs typeface="Tahoma" panose="020B0604030504040204" pitchFamily="34" charset="0"/>
-            </a:endParaRPr>
           </a:p>
         </p:txBody>
       </p:sp>
@@ -6131,7 +5938,7 @@
           <a:p>
             <a:pPr algn="ctr" rtl="0"/>
             <a:r>
-              <a:rPr lang="fr-FR" sz="1800" dirty="0" smtClean="0">
+              <a:rPr lang="fr-FR" sz="1800" dirty="0">
                 <a:solidFill>
                   <a:srgbClr val="87A896"/>
                 </a:solidFill>
@@ -6141,14 +5948,6 @@
               </a:rPr>
               <a:t>SERVEURS DE FICHIERS</a:t>
             </a:r>
-            <a:endParaRPr lang="fr-FR" sz="1800" dirty="0">
-              <a:solidFill>
-                <a:srgbClr val="87A896"/>
-              </a:solidFill>
-              <a:latin typeface="Tahoma" panose="020B0604030504040204" pitchFamily="34" charset="0"/>
-              <a:ea typeface="Tahoma" panose="020B0604030504040204" pitchFamily="34" charset="0"/>
-              <a:cs typeface="Tahoma" panose="020B0604030504040204" pitchFamily="34" charset="0"/>
-            </a:endParaRPr>
           </a:p>
         </p:txBody>
       </p:sp>
@@ -6190,7 +5989,7 @@
         </p:nvSpPr>
         <p:spPr>
           <a:xfrm>
-            <a:off x="4510236" y="2636912"/>
+            <a:off x="4510236" y="2592628"/>
             <a:ext cx="6552728" cy="2862322"/>
           </a:xfrm>
           <a:prstGeom prst="rect">
@@ -6215,57 +6014,36 @@
               </a:tabLst>
             </a:pPr>
             <a:r>
-              <a:rPr lang="fr-CH" dirty="0" smtClean="0">
+              <a:rPr lang="fr-CH" dirty="0">
                 <a:latin typeface="Tahoma" panose="020B0604030504040204" pitchFamily="34" charset="0"/>
                 <a:ea typeface="Tahoma" panose="020B0604030504040204" pitchFamily="34" charset="0"/>
                 <a:cs typeface="Tahoma" panose="020B0604030504040204" pitchFamily="34" charset="0"/>
               </a:rPr>
-              <a:t>Développement hiérarchie </a:t>
-            </a:r>
-            <a:r>
-              <a:rPr lang="fr-CH" dirty="0" smtClean="0">
+              <a:t>Développement hiérarchie de fichiers et dossiers dans but de transmettre de manière synchronisée des données de différents types. </a:t>
+            </a:r>
+          </a:p>
+          <a:p>
+            <a:pPr algn="ctr"/>
+            <a:endParaRPr lang="fr-CH" dirty="0">
+              <a:latin typeface="Tahoma" panose="020B0604030504040204" pitchFamily="34" charset="0"/>
+              <a:ea typeface="Tahoma" panose="020B0604030504040204" pitchFamily="34" charset="0"/>
+              <a:cs typeface="Tahoma" panose="020B0604030504040204" pitchFamily="34" charset="0"/>
+            </a:endParaRPr>
+          </a:p>
+          <a:p>
+            <a:pPr algn="ctr"/>
+            <a:r>
+              <a:rPr lang="fr-CH" dirty="0">
                 <a:latin typeface="Tahoma" panose="020B0604030504040204" pitchFamily="34" charset="0"/>
                 <a:ea typeface="Tahoma" panose="020B0604030504040204" pitchFamily="34" charset="0"/>
                 <a:cs typeface="Tahoma" panose="020B0604030504040204" pitchFamily="34" charset="0"/>
               </a:rPr>
-              <a:t>de fichiers et </a:t>
-            </a:r>
-            <a:r>
-              <a:rPr lang="fr-CH" dirty="0" smtClean="0">
-                <a:latin typeface="Tahoma" panose="020B0604030504040204" pitchFamily="34" charset="0"/>
-                <a:ea typeface="Tahoma" panose="020B0604030504040204" pitchFamily="34" charset="0"/>
-                <a:cs typeface="Tahoma" panose="020B0604030504040204" pitchFamily="34" charset="0"/>
-              </a:rPr>
-              <a:t>dossiers </a:t>
-            </a:r>
-            <a:r>
-              <a:rPr lang="fr-CH" dirty="0" smtClean="0">
-                <a:latin typeface="Tahoma" panose="020B0604030504040204" pitchFamily="34" charset="0"/>
-                <a:ea typeface="Tahoma" panose="020B0604030504040204" pitchFamily="34" charset="0"/>
-                <a:cs typeface="Tahoma" panose="020B0604030504040204" pitchFamily="34" charset="0"/>
-              </a:rPr>
-              <a:t>dans </a:t>
-            </a:r>
-            <a:r>
-              <a:rPr lang="fr-CH" dirty="0" smtClean="0">
-                <a:latin typeface="Tahoma" panose="020B0604030504040204" pitchFamily="34" charset="0"/>
-                <a:ea typeface="Tahoma" panose="020B0604030504040204" pitchFamily="34" charset="0"/>
-                <a:cs typeface="Tahoma" panose="020B0604030504040204" pitchFamily="34" charset="0"/>
-              </a:rPr>
-              <a:t>but </a:t>
-            </a:r>
-            <a:r>
-              <a:rPr lang="fr-CH" dirty="0" smtClean="0">
-                <a:latin typeface="Tahoma" panose="020B0604030504040204" pitchFamily="34" charset="0"/>
-                <a:ea typeface="Tahoma" panose="020B0604030504040204" pitchFamily="34" charset="0"/>
-                <a:cs typeface="Tahoma" panose="020B0604030504040204" pitchFamily="34" charset="0"/>
-              </a:rPr>
-              <a:t>de transmettre de manière synchronisée des données de différents types. </a:t>
+              <a:t>Les utilisateurs ayant accès au serveur, soumis à contraintes émises sur celui-ci au détriment de l’hôte.</a:t>
             </a:r>
           </a:p>
           <a:p>
             <a:pPr algn="ctr"/>
-            <a:endParaRPr lang="fr-CH" dirty="0" smtClean="0">
+            <a:endParaRPr lang="fr-CH" dirty="0">
               <a:latin typeface="Tahoma" panose="020B0604030504040204" pitchFamily="34" charset="0"/>
               <a:ea typeface="Tahoma" panose="020B0604030504040204" pitchFamily="34" charset="0"/>
               <a:cs typeface="Tahoma" panose="020B0604030504040204" pitchFamily="34" charset="0"/>
@@ -6274,46 +6052,14 @@
           <a:p>
             <a:pPr algn="ctr"/>
             <a:r>
-              <a:rPr lang="fr-CH" dirty="0" smtClean="0">
-                <a:latin typeface="Tahoma" panose="020B0604030504040204" pitchFamily="34" charset="0"/>
-                <a:ea typeface="Tahoma" panose="020B0604030504040204" pitchFamily="34" charset="0"/>
-                <a:cs typeface="Tahoma" panose="020B0604030504040204" pitchFamily="34" charset="0"/>
-              </a:rPr>
-              <a:t>Les </a:t>
-            </a:r>
-            <a:r>
-              <a:rPr lang="fr-CH" dirty="0" smtClean="0">
-                <a:latin typeface="Tahoma" panose="020B0604030504040204" pitchFamily="34" charset="0"/>
-                <a:ea typeface="Tahoma" panose="020B0604030504040204" pitchFamily="34" charset="0"/>
-                <a:cs typeface="Tahoma" panose="020B0604030504040204" pitchFamily="34" charset="0"/>
-              </a:rPr>
-              <a:t>utilisateurs ayant accès au serveur, soumis à contraintes émises sur celui-ci au détriment de l’hôte.</a:t>
-            </a:r>
-            <a:endParaRPr lang="fr-CH" dirty="0" smtClean="0">
-              <a:latin typeface="Tahoma" panose="020B0604030504040204" pitchFamily="34" charset="0"/>
-              <a:ea typeface="Tahoma" panose="020B0604030504040204" pitchFamily="34" charset="0"/>
-              <a:cs typeface="Tahoma" panose="020B0604030504040204" pitchFamily="34" charset="0"/>
-            </a:endParaRPr>
-          </a:p>
-          <a:p>
-            <a:pPr algn="ctr"/>
-            <a:endParaRPr lang="fr-CH" dirty="0" smtClean="0">
-              <a:latin typeface="Tahoma" panose="020B0604030504040204" pitchFamily="34" charset="0"/>
-              <a:ea typeface="Tahoma" panose="020B0604030504040204" pitchFamily="34" charset="0"/>
-              <a:cs typeface="Tahoma" panose="020B0604030504040204" pitchFamily="34" charset="0"/>
-            </a:endParaRPr>
-          </a:p>
-          <a:p>
-            <a:pPr algn="ctr"/>
-            <a:r>
-              <a:rPr lang="fr-CH" dirty="0" smtClean="0">
+              <a:rPr lang="fr-CH" dirty="0">
                 <a:latin typeface="Tahoma" panose="020B0604030504040204" pitchFamily="34" charset="0"/>
                 <a:ea typeface="Tahoma" panose="020B0604030504040204" pitchFamily="34" charset="0"/>
                 <a:cs typeface="Tahoma" panose="020B0604030504040204" pitchFamily="34" charset="0"/>
               </a:rPr>
               <a:t>Ces restrictions sont infranchissables et doivent être respectées. Elles sont respectées et sont représentés par des droits NTFS.</a:t>
             </a:r>
-            <a:endParaRPr lang="fr-CH" b="1" dirty="0" smtClean="0">
+            <a:endParaRPr lang="fr-CH" b="1" dirty="0">
               <a:latin typeface="Tahoma" panose="020B0604030504040204" pitchFamily="34" charset="0"/>
               <a:ea typeface="Tahoma" panose="020B0604030504040204" pitchFamily="34" charset="0"/>
               <a:cs typeface="Tahoma" panose="020B0604030504040204" pitchFamily="34" charset="0"/>
@@ -6343,13 +6089,6 @@
       </p:transition>
     </mc:Fallback>
   </mc:AlternateContent>
-  <p:timing>
-    <p:tnLst>
-      <p:par>
-        <p:cTn id="1" dur="indefinite" restart="never" nodeType="tmRoot"/>
-      </p:par>
-    </p:tnLst>
-  </p:timing>
 </p:sld>
 </file>
 
@@ -6431,7 +6170,7 @@
           <a:p>
             <a:pPr algn="ctr"/>
             <a:r>
-              <a:rPr lang="fr-FR" sz="6600" dirty="0" smtClean="0">
+              <a:rPr lang="fr-FR" sz="6600" dirty="0">
                 <a:solidFill>
                   <a:srgbClr val="87A896"/>
                 </a:solidFill>
@@ -6441,14 +6180,6 @@
               </a:rPr>
               <a:t>EXPLICATIONS DES PARTAGES</a:t>
             </a:r>
-            <a:endParaRPr lang="fr-FR" sz="6600" dirty="0">
-              <a:solidFill>
-                <a:srgbClr val="87A896"/>
-              </a:solidFill>
-              <a:latin typeface="Tahoma" panose="020B0604030504040204" pitchFamily="34" charset="0"/>
-              <a:ea typeface="Tahoma" panose="020B0604030504040204" pitchFamily="34" charset="0"/>
-              <a:cs typeface="Tahoma" panose="020B0604030504040204" pitchFamily="34" charset="0"/>
-            </a:endParaRPr>
           </a:p>
         </p:txBody>
       </p:sp>
@@ -6479,7 +6210,7 @@
           <a:p>
             <a:pPr algn="ctr" rtl="0"/>
             <a:r>
-              <a:rPr lang="fr-FR" sz="1800" dirty="0" smtClean="0">
+              <a:rPr lang="fr-FR" sz="1800" dirty="0">
                 <a:solidFill>
                   <a:srgbClr val="87A896"/>
                 </a:solidFill>
@@ -6489,14 +6220,6 @@
               </a:rPr>
               <a:t>SERVEURS DE FICHIERS</a:t>
             </a:r>
-            <a:endParaRPr lang="fr-FR" sz="1800" dirty="0">
-              <a:solidFill>
-                <a:srgbClr val="87A896"/>
-              </a:solidFill>
-              <a:latin typeface="Tahoma" panose="020B0604030504040204" pitchFamily="34" charset="0"/>
-              <a:ea typeface="Tahoma" panose="020B0604030504040204" pitchFamily="34" charset="0"/>
-              <a:cs typeface="Tahoma" panose="020B0604030504040204" pitchFamily="34" charset="0"/>
-            </a:endParaRPr>
           </a:p>
         </p:txBody>
       </p:sp>
@@ -6508,7 +6231,7 @@
         </p:nvSpPr>
         <p:spPr>
           <a:xfrm>
-            <a:off x="189756" y="2204864"/>
+            <a:off x="261764" y="2132856"/>
             <a:ext cx="4968552" cy="523220"/>
           </a:xfrm>
           <a:prstGeom prst="rect">
@@ -6529,7 +6252,7 @@
           <a:p>
             <a:pPr algn="ctr"/>
             <a:r>
-              <a:rPr lang="fr-CH" sz="2800" dirty="0" smtClean="0">
+              <a:rPr lang="fr-CH" sz="2800" dirty="0">
                 <a:latin typeface="Tahoma" panose="020B0604030504040204" pitchFamily="34" charset="0"/>
                 <a:ea typeface="Tahoma" panose="020B0604030504040204" pitchFamily="34" charset="0"/>
                 <a:cs typeface="Tahoma" panose="020B0604030504040204" pitchFamily="34" charset="0"/>
@@ -6568,7 +6291,7 @@
           <a:p>
             <a:pPr algn="ctr"/>
             <a:r>
-              <a:rPr lang="fr-CH" sz="2800" dirty="0" smtClean="0">
+              <a:rPr lang="fr-CH" sz="2800" dirty="0">
                 <a:latin typeface="Tahoma" panose="020B0604030504040204" pitchFamily="34" charset="0"/>
                 <a:ea typeface="Tahoma" panose="020B0604030504040204" pitchFamily="34" charset="0"/>
                 <a:cs typeface="Tahoma" panose="020B0604030504040204" pitchFamily="34" charset="0"/>
@@ -6600,13 +6323,6 @@
       </p:transition>
     </mc:Fallback>
   </mc:AlternateContent>
-  <p:timing>
-    <p:tnLst>
-      <p:par>
-        <p:cTn id="1" dur="indefinite" restart="never" nodeType="tmRoot"/>
-      </p:par>
-    </p:tnLst>
-  </p:timing>
 </p:sld>
 </file>
 
@@ -6686,7 +6402,7 @@
           <a:p>
             <a:pPr algn="ctr"/>
             <a:r>
-              <a:rPr lang="fr-FR" sz="4800" dirty="0" smtClean="0">
+              <a:rPr lang="fr-FR" sz="4800" dirty="0">
                 <a:solidFill>
                   <a:srgbClr val="87A896"/>
                 </a:solidFill>
@@ -6696,14 +6412,6 @@
               </a:rPr>
               <a:t>EXPLICATIONS DES AUTORISATIONS NTFS</a:t>
             </a:r>
-            <a:endParaRPr lang="fr-FR" sz="4800" dirty="0">
-              <a:solidFill>
-                <a:srgbClr val="87A896"/>
-              </a:solidFill>
-              <a:latin typeface="Tahoma" panose="020B0604030504040204" pitchFamily="34" charset="0"/>
-              <a:ea typeface="Tahoma" panose="020B0604030504040204" pitchFamily="34" charset="0"/>
-              <a:cs typeface="Tahoma" panose="020B0604030504040204" pitchFamily="34" charset="0"/>
-            </a:endParaRPr>
           </a:p>
         </p:txBody>
       </p:sp>
@@ -6734,7 +6442,7 @@
           <a:p>
             <a:pPr algn="ctr" rtl="0"/>
             <a:r>
-              <a:rPr lang="fr-FR" sz="1800" dirty="0" smtClean="0">
+              <a:rPr lang="fr-FR" sz="1800" dirty="0">
                 <a:solidFill>
                   <a:srgbClr val="87A896"/>
                 </a:solidFill>
@@ -6744,14 +6452,6 @@
               </a:rPr>
               <a:t>SERVEURS DE FICHIERS</a:t>
             </a:r>
-            <a:endParaRPr lang="fr-FR" sz="1800" dirty="0">
-              <a:solidFill>
-                <a:srgbClr val="87A896"/>
-              </a:solidFill>
-              <a:latin typeface="Tahoma" panose="020B0604030504040204" pitchFamily="34" charset="0"/>
-              <a:ea typeface="Tahoma" panose="020B0604030504040204" pitchFamily="34" charset="0"/>
-              <a:cs typeface="Tahoma" panose="020B0604030504040204" pitchFamily="34" charset="0"/>
-            </a:endParaRPr>
           </a:p>
         </p:txBody>
       </p:sp>
@@ -6784,50 +6484,13 @@
           <a:p>
             <a:pPr algn="ctr"/>
             <a:r>
-              <a:rPr lang="fr-CH" sz="2400" dirty="0" smtClean="0">
+              <a:rPr lang="fr-CH" sz="2400" dirty="0">
                 <a:latin typeface="Tahoma" panose="020B0604030504040204" pitchFamily="34" charset="0"/>
                 <a:ea typeface="Tahoma" panose="020B0604030504040204" pitchFamily="34" charset="0"/>
                 <a:cs typeface="Tahoma" panose="020B0604030504040204" pitchFamily="34" charset="0"/>
               </a:rPr>
-              <a:t>NTFS ( </a:t>
-            </a:r>
-            <a:r>
-              <a:rPr lang="fr-CH" sz="2400" dirty="0" smtClean="0">
-                <a:latin typeface="Tahoma" panose="020B0604030504040204" pitchFamily="34" charset="0"/>
-                <a:ea typeface="Tahoma" panose="020B0604030504040204" pitchFamily="34" charset="0"/>
-                <a:cs typeface="Tahoma" panose="020B0604030504040204" pitchFamily="34" charset="0"/>
-              </a:rPr>
-              <a:t>ou</a:t>
-            </a:r>
-            <a:r>
-              <a:rPr lang="fr-CH" sz="2400" dirty="0" smtClean="0">
-                <a:latin typeface="Tahoma" panose="020B0604030504040204" pitchFamily="34" charset="0"/>
-                <a:ea typeface="Tahoma" panose="020B0604030504040204" pitchFamily="34" charset="0"/>
-                <a:cs typeface="Tahoma" panose="020B0604030504040204" pitchFamily="34" charset="0"/>
-              </a:rPr>
-              <a:t> </a:t>
-            </a:r>
-            <a:r>
-              <a:rPr lang="fr-CH" sz="2400" dirty="0" smtClean="0">
-                <a:latin typeface="Tahoma" panose="020B0604030504040204" pitchFamily="34" charset="0"/>
-                <a:ea typeface="Tahoma" panose="020B0604030504040204" pitchFamily="34" charset="0"/>
-                <a:cs typeface="Tahoma" panose="020B0604030504040204" pitchFamily="34" charset="0"/>
-              </a:rPr>
-              <a:t>NEW TECHNOLOGIE FILE SYSTEM</a:t>
-            </a:r>
-            <a:r>
-              <a:rPr lang="fr-CH" sz="2400" dirty="0" smtClean="0">
-                <a:latin typeface="Tahoma" panose="020B0604030504040204" pitchFamily="34" charset="0"/>
-                <a:ea typeface="Tahoma" panose="020B0604030504040204" pitchFamily="34" charset="0"/>
-                <a:cs typeface="Tahoma" panose="020B0604030504040204" pitchFamily="34" charset="0"/>
-              </a:rPr>
-              <a:t>),procédure que Windows NT Système utilise pour stocker, organiser et trouver fichiers dans disque dur. NTFS existe depuis 1993 et est système le plus efficace de notre génération </a:t>
-            </a:r>
-            <a:endParaRPr lang="fr-CH" sz="2400" dirty="0" smtClean="0">
-              <a:latin typeface="Tahoma" panose="020B0604030504040204" pitchFamily="34" charset="0"/>
-              <a:ea typeface="Tahoma" panose="020B0604030504040204" pitchFamily="34" charset="0"/>
-              <a:cs typeface="Tahoma" panose="020B0604030504040204" pitchFamily="34" charset="0"/>
-            </a:endParaRPr>
+              <a:t>NTFS ( ou NEW TECHNOLOGIE FILE SYSTEM),procédure que Windows NT Système utilise pour stocker, organiser et trouver fichiers dans disque dur. NTFS existe depuis 1993 et est système le plus efficace de notre génération </a:t>
+            </a:r>
           </a:p>
         </p:txBody>
       </p:sp>
@@ -6860,18 +6523,13 @@
           <a:p>
             <a:pPr algn="ctr"/>
             <a:r>
-              <a:rPr lang="fr-CH" sz="2800" u="sng" dirty="0" smtClean="0">
+              <a:rPr lang="fr-CH" sz="2800" u="sng" dirty="0">
                 <a:latin typeface="Tahoma" panose="020B0604030504040204" pitchFamily="34" charset="0"/>
                 <a:ea typeface="Tahoma" panose="020B0604030504040204" pitchFamily="34" charset="0"/>
                 <a:cs typeface="Tahoma" panose="020B0604030504040204" pitchFamily="34" charset="0"/>
               </a:rPr>
               <a:t>Type d’autorisation</a:t>
             </a:r>
-            <a:endParaRPr lang="fr-CH" sz="2800" u="sng" dirty="0" smtClean="0">
-              <a:latin typeface="Tahoma" panose="020B0604030504040204" pitchFamily="34" charset="0"/>
-              <a:ea typeface="Tahoma" panose="020B0604030504040204" pitchFamily="34" charset="0"/>
-              <a:cs typeface="Tahoma" panose="020B0604030504040204" pitchFamily="34" charset="0"/>
-            </a:endParaRPr>
           </a:p>
         </p:txBody>
       </p:sp>
@@ -6943,13 +6601,6 @@
       </p:transition>
     </mc:Fallback>
   </mc:AlternateContent>
-  <p:timing>
-    <p:tnLst>
-      <p:par>
-        <p:cTn id="1" dur="indefinite" restart="never" nodeType="tmRoot"/>
-      </p:par>
-    </p:tnLst>
-  </p:timing>
 </p:sld>
 </file>
 
@@ -7029,7 +6680,7 @@
           <a:p>
             <a:pPr algn="ctr"/>
             <a:r>
-              <a:rPr lang="fr-FR" sz="4800" dirty="0" smtClean="0">
+              <a:rPr lang="fr-FR" sz="4800" dirty="0">
                 <a:solidFill>
                   <a:srgbClr val="87A896"/>
                 </a:solidFill>
@@ -7039,14 +6690,6 @@
               </a:rPr>
               <a:t>EXPLICATIONS DES AUTORISATIONS NTFS</a:t>
             </a:r>
-            <a:endParaRPr lang="fr-FR" sz="4800" dirty="0">
-              <a:solidFill>
-                <a:srgbClr val="87A896"/>
-              </a:solidFill>
-              <a:latin typeface="Tahoma" panose="020B0604030504040204" pitchFamily="34" charset="0"/>
-              <a:ea typeface="Tahoma" panose="020B0604030504040204" pitchFamily="34" charset="0"/>
-              <a:cs typeface="Tahoma" panose="020B0604030504040204" pitchFamily="34" charset="0"/>
-            </a:endParaRPr>
           </a:p>
         </p:txBody>
       </p:sp>
@@ -7077,7 +6720,7 @@
           <a:p>
             <a:pPr algn="ctr" rtl="0"/>
             <a:r>
-              <a:rPr lang="fr-FR" sz="1800" dirty="0" smtClean="0">
+              <a:rPr lang="fr-FR" sz="1800" dirty="0">
                 <a:solidFill>
                   <a:srgbClr val="87A896"/>
                 </a:solidFill>
@@ -7087,14 +6730,6 @@
               </a:rPr>
               <a:t>SERVEURS DE FICHIERS</a:t>
             </a:r>
-            <a:endParaRPr lang="fr-FR" sz="1800" dirty="0">
-              <a:solidFill>
-                <a:srgbClr val="87A896"/>
-              </a:solidFill>
-              <a:latin typeface="Tahoma" panose="020B0604030504040204" pitchFamily="34" charset="0"/>
-              <a:ea typeface="Tahoma" panose="020B0604030504040204" pitchFamily="34" charset="0"/>
-              <a:cs typeface="Tahoma" panose="020B0604030504040204" pitchFamily="34" charset="0"/>
-            </a:endParaRPr>
           </a:p>
         </p:txBody>
       </p:sp>
@@ -7132,165 +6767,29 @@
                 <a:ea typeface="Tahoma" panose="020B0604030504040204" pitchFamily="34" charset="0"/>
                 <a:cs typeface="Tahoma" panose="020B0604030504040204" pitchFamily="34" charset="0"/>
               </a:rPr>
-              <a:t>1. </a:t>
-            </a:r>
-            <a:r>
-              <a:rPr lang="fr-CH" sz="2400" dirty="0" smtClean="0">
-                <a:latin typeface="Tahoma" panose="020B0604030504040204" pitchFamily="34" charset="0"/>
-                <a:ea typeface="Tahoma" panose="020B0604030504040204" pitchFamily="34" charset="0"/>
-                <a:cs typeface="Tahoma" panose="020B0604030504040204" pitchFamily="34" charset="0"/>
-              </a:rPr>
-              <a:t>Explorateur </a:t>
-            </a:r>
-            <a:r>
-              <a:rPr lang="fr-CH" sz="2400" dirty="0" smtClean="0">
-                <a:latin typeface="Tahoma" panose="020B0604030504040204" pitchFamily="34" charset="0"/>
-                <a:ea typeface="Tahoma" panose="020B0604030504040204" pitchFamily="34" charset="0"/>
-                <a:cs typeface="Tahoma" panose="020B0604030504040204" pitchFamily="34" charset="0"/>
-              </a:rPr>
-              <a:t>fichiers</a:t>
-            </a:r>
+              <a:t>1. Explorateur fichiers, clique droit sur fichier. Sélectionnez l'option "Propriétés"</a:t>
+            </a:r>
+          </a:p>
+          <a:p>
+            <a:pPr algn="ctr"/>
             <a:r>
               <a:rPr lang="fr-CH" sz="2400" dirty="0">
                 <a:latin typeface="Tahoma" panose="020B0604030504040204" pitchFamily="34" charset="0"/>
                 <a:ea typeface="Tahoma" panose="020B0604030504040204" pitchFamily="34" charset="0"/>
                 <a:cs typeface="Tahoma" panose="020B0604030504040204" pitchFamily="34" charset="0"/>
               </a:rPr>
-              <a:t>, clique droit sur </a:t>
-            </a:r>
-            <a:r>
-              <a:rPr lang="fr-CH" sz="2400" dirty="0" smtClean="0">
-                <a:latin typeface="Tahoma" panose="020B0604030504040204" pitchFamily="34" charset="0"/>
-                <a:ea typeface="Tahoma" panose="020B0604030504040204" pitchFamily="34" charset="0"/>
-                <a:cs typeface="Tahoma" panose="020B0604030504040204" pitchFamily="34" charset="0"/>
-              </a:rPr>
-              <a:t>fichier. </a:t>
-            </a:r>
-            <a:r>
-              <a:rPr lang="fr-CH" sz="2400" dirty="0" smtClean="0">
-                <a:latin typeface="Tahoma" panose="020B0604030504040204" pitchFamily="34" charset="0"/>
-                <a:ea typeface="Tahoma" panose="020B0604030504040204" pitchFamily="34" charset="0"/>
-                <a:cs typeface="Tahoma" panose="020B0604030504040204" pitchFamily="34" charset="0"/>
-              </a:rPr>
-              <a:t>Sélectionnez </a:t>
-            </a:r>
+              <a:t>2. Cliquer sur "Sécurité"</a:t>
+            </a:r>
+          </a:p>
+          <a:p>
+            <a:pPr algn="ctr"/>
             <a:r>
               <a:rPr lang="fr-CH" sz="2400" dirty="0">
                 <a:latin typeface="Tahoma" panose="020B0604030504040204" pitchFamily="34" charset="0"/>
                 <a:ea typeface="Tahoma" panose="020B0604030504040204" pitchFamily="34" charset="0"/>
                 <a:cs typeface="Tahoma" panose="020B0604030504040204" pitchFamily="34" charset="0"/>
               </a:rPr>
-              <a:t>l'option "</a:t>
-            </a:r>
-            <a:r>
-              <a:rPr lang="fr-CH" sz="2400" dirty="0" smtClean="0">
-                <a:latin typeface="Tahoma" panose="020B0604030504040204" pitchFamily="34" charset="0"/>
-                <a:ea typeface="Tahoma" panose="020B0604030504040204" pitchFamily="34" charset="0"/>
-                <a:cs typeface="Tahoma" panose="020B0604030504040204" pitchFamily="34" charset="0"/>
-              </a:rPr>
-              <a:t>Propriétés</a:t>
-            </a:r>
-            <a:r>
-              <a:rPr lang="fr-CH" sz="2400" dirty="0">
-                <a:latin typeface="Tahoma" panose="020B0604030504040204" pitchFamily="34" charset="0"/>
-                <a:ea typeface="Tahoma" panose="020B0604030504040204" pitchFamily="34" charset="0"/>
-                <a:cs typeface="Tahoma" panose="020B0604030504040204" pitchFamily="34" charset="0"/>
-              </a:rPr>
-              <a:t>"</a:t>
-            </a:r>
-          </a:p>
-          <a:p>
-            <a:pPr algn="ctr"/>
-            <a:r>
-              <a:rPr lang="fr-CH" sz="2400" dirty="0">
-                <a:latin typeface="Tahoma" panose="020B0604030504040204" pitchFamily="34" charset="0"/>
-                <a:ea typeface="Tahoma" panose="020B0604030504040204" pitchFamily="34" charset="0"/>
-                <a:cs typeface="Tahoma" panose="020B0604030504040204" pitchFamily="34" charset="0"/>
-              </a:rPr>
-              <a:t>2. Cliquer sur "</a:t>
-            </a:r>
-            <a:r>
-              <a:rPr lang="fr-CH" sz="2400" dirty="0" smtClean="0">
-                <a:latin typeface="Tahoma" panose="020B0604030504040204" pitchFamily="34" charset="0"/>
-                <a:ea typeface="Tahoma" panose="020B0604030504040204" pitchFamily="34" charset="0"/>
-                <a:cs typeface="Tahoma" panose="020B0604030504040204" pitchFamily="34" charset="0"/>
-              </a:rPr>
-              <a:t>Sécurité</a:t>
-            </a:r>
-            <a:r>
-              <a:rPr lang="fr-CH" sz="2400" dirty="0">
-                <a:latin typeface="Tahoma" panose="020B0604030504040204" pitchFamily="34" charset="0"/>
-                <a:ea typeface="Tahoma" panose="020B0604030504040204" pitchFamily="34" charset="0"/>
-                <a:cs typeface="Tahoma" panose="020B0604030504040204" pitchFamily="34" charset="0"/>
-              </a:rPr>
-              <a:t>"</a:t>
-            </a:r>
-          </a:p>
-          <a:p>
-            <a:pPr algn="ctr"/>
-            <a:r>
-              <a:rPr lang="fr-CH" sz="2400" dirty="0">
-                <a:latin typeface="Tahoma" panose="020B0604030504040204" pitchFamily="34" charset="0"/>
-                <a:ea typeface="Tahoma" panose="020B0604030504040204" pitchFamily="34" charset="0"/>
-                <a:cs typeface="Tahoma" panose="020B0604030504040204" pitchFamily="34" charset="0"/>
-              </a:rPr>
-              <a:t>3. </a:t>
-            </a:r>
-            <a:r>
-              <a:rPr lang="fr-CH" sz="2400" dirty="0" smtClean="0">
-                <a:latin typeface="Tahoma" panose="020B0604030504040204" pitchFamily="34" charset="0"/>
-                <a:ea typeface="Tahoma" panose="020B0604030504040204" pitchFamily="34" charset="0"/>
-                <a:cs typeface="Tahoma" panose="020B0604030504040204" pitchFamily="34" charset="0"/>
-              </a:rPr>
-              <a:t>S</a:t>
-            </a:r>
-            <a:r>
-              <a:rPr lang="fr-CH" sz="2400" dirty="0" smtClean="0">
-                <a:latin typeface="Tahoma" panose="020B0604030504040204" pitchFamily="34" charset="0"/>
-                <a:ea typeface="Tahoma" panose="020B0604030504040204" pitchFamily="34" charset="0"/>
-                <a:cs typeface="Tahoma" panose="020B0604030504040204" pitchFamily="34" charset="0"/>
-              </a:rPr>
-              <a:t>é</a:t>
-            </a:r>
-            <a:r>
-              <a:rPr lang="fr-CH" sz="2400" dirty="0" smtClean="0">
-                <a:latin typeface="Tahoma" panose="020B0604030504040204" pitchFamily="34" charset="0"/>
-                <a:ea typeface="Tahoma" panose="020B0604030504040204" pitchFamily="34" charset="0"/>
-                <a:cs typeface="Tahoma" panose="020B0604030504040204" pitchFamily="34" charset="0"/>
-              </a:rPr>
-              <a:t>lectionnez </a:t>
-            </a:r>
-            <a:r>
-              <a:rPr lang="fr-CH" sz="2400" dirty="0" smtClean="0">
-                <a:latin typeface="Tahoma" panose="020B0604030504040204" pitchFamily="34" charset="0"/>
-                <a:ea typeface="Tahoma" panose="020B0604030504040204" pitchFamily="34" charset="0"/>
-                <a:cs typeface="Tahoma" panose="020B0604030504040204" pitchFamily="34" charset="0"/>
-              </a:rPr>
-              <a:t>personnes </a:t>
-            </a:r>
-            <a:r>
-              <a:rPr lang="fr-CH" sz="2400" dirty="0">
-                <a:latin typeface="Tahoma" panose="020B0604030504040204" pitchFamily="34" charset="0"/>
-                <a:ea typeface="Tahoma" panose="020B0604030504040204" pitchFamily="34" charset="0"/>
-                <a:cs typeface="Tahoma" panose="020B0604030504040204" pitchFamily="34" charset="0"/>
-              </a:rPr>
-              <a:t>ou groupes et </a:t>
-            </a:r>
-            <a:r>
-              <a:rPr lang="fr-CH" sz="2400" dirty="0" smtClean="0">
-                <a:latin typeface="Tahoma" panose="020B0604030504040204" pitchFamily="34" charset="0"/>
-                <a:ea typeface="Tahoma" panose="020B0604030504040204" pitchFamily="34" charset="0"/>
-                <a:cs typeface="Tahoma" panose="020B0604030504040204" pitchFamily="34" charset="0"/>
-              </a:rPr>
-              <a:t>donner permissions </a:t>
-            </a:r>
-            <a:r>
-              <a:rPr lang="fr-CH" sz="2400" dirty="0">
-                <a:latin typeface="Tahoma" panose="020B0604030504040204" pitchFamily="34" charset="0"/>
-                <a:ea typeface="Tahoma" panose="020B0604030504040204" pitchFamily="34" charset="0"/>
-                <a:cs typeface="Tahoma" panose="020B0604030504040204" pitchFamily="34" charset="0"/>
-              </a:rPr>
-              <a:t>NTFS</a:t>
+              <a:t>3. Sélectionnez personnes ou groupes et donner permissions NTFS</a:t>
             </a:r>
           </a:p>
         </p:txBody>
@@ -7324,18 +6823,13 @@
           <a:p>
             <a:pPr algn="ctr"/>
             <a:r>
-              <a:rPr lang="fr-CH" sz="2800" u="sng" dirty="0" smtClean="0">
+              <a:rPr lang="fr-CH" sz="2800" u="sng" dirty="0">
                 <a:latin typeface="Tahoma" panose="020B0604030504040204" pitchFamily="34" charset="0"/>
                 <a:ea typeface="Tahoma" panose="020B0604030504040204" pitchFamily="34" charset="0"/>
                 <a:cs typeface="Tahoma" panose="020B0604030504040204" pitchFamily="34" charset="0"/>
               </a:rPr>
               <a:t>Instructions NTFS</a:t>
             </a:r>
-            <a:endParaRPr lang="fr-CH" sz="2800" u="sng" dirty="0" smtClean="0">
-              <a:latin typeface="Tahoma" panose="020B0604030504040204" pitchFamily="34" charset="0"/>
-              <a:ea typeface="Tahoma" panose="020B0604030504040204" pitchFamily="34" charset="0"/>
-              <a:cs typeface="Tahoma" panose="020B0604030504040204" pitchFamily="34" charset="0"/>
-            </a:endParaRPr>
           </a:p>
         </p:txBody>
       </p:sp>
@@ -7391,13 +6885,6 @@
       </p:transition>
     </mc:Fallback>
   </mc:AlternateContent>
-  <p:timing>
-    <p:tnLst>
-      <p:par>
-        <p:cTn id="1" dur="indefinite" restart="never" nodeType="tmRoot"/>
-      </p:par>
-    </p:tnLst>
-  </p:timing>
 </p:sld>
 </file>
 
@@ -7450,7 +6937,7 @@
           <a:p>
             <a:pPr algn="ctr" rtl="0"/>
             <a:r>
-              <a:rPr lang="fr-FR" sz="6600" dirty="0" smtClean="0">
+              <a:rPr lang="fr-FR" sz="6600" dirty="0">
                 <a:solidFill>
                   <a:srgbClr val="87A896"/>
                 </a:solidFill>
@@ -7460,14 +6947,6 @@
               </a:rPr>
               <a:t>SERVEURS D’IMPRESSION</a:t>
             </a:r>
-            <a:endParaRPr lang="fr-FR" sz="6600" dirty="0">
-              <a:solidFill>
-                <a:srgbClr val="87A896"/>
-              </a:solidFill>
-              <a:latin typeface="Tahoma" panose="020B0604030504040204" pitchFamily="34" charset="0"/>
-              <a:ea typeface="Tahoma" panose="020B0604030504040204" pitchFamily="34" charset="0"/>
-              <a:cs typeface="Tahoma" panose="020B0604030504040204" pitchFamily="34" charset="0"/>
-            </a:endParaRPr>
           </a:p>
         </p:txBody>
       </p:sp>
@@ -7493,13 +6972,6 @@
       </p:transition>
     </mc:Fallback>
   </mc:AlternateContent>
-  <p:timing>
-    <p:tnLst>
-      <p:par>
-        <p:cTn id="1" dur="indefinite" restart="never" nodeType="tmRoot"/>
-      </p:par>
-    </p:tnLst>
-  </p:timing>
 </p:sld>
 </file>
 
@@ -7579,7 +7051,7 @@
           <a:p>
             <a:pPr algn="ctr"/>
             <a:r>
-              <a:rPr lang="fr-CH" sz="4800" cap="all" dirty="0" smtClean="0">
+              <a:rPr lang="fr-CH" sz="4800" cap="all" dirty="0">
                 <a:solidFill>
                   <a:srgbClr val="87A896"/>
                 </a:solidFill>
@@ -7587,18 +7059,7 @@
                 <a:ea typeface="Tahoma" panose="020B0604030504040204" pitchFamily="34" charset="0"/>
                 <a:cs typeface="Tahoma" panose="020B0604030504040204" pitchFamily="34" charset="0"/>
               </a:rPr>
-              <a:t>Différence serveur impression </a:t>
-            </a:r>
-            <a:r>
-              <a:rPr lang="fr-CH" sz="4800" cap="all" dirty="0">
-                <a:solidFill>
-                  <a:srgbClr val="87A896"/>
-                </a:solidFill>
-                <a:latin typeface="Tahoma" panose="020B0604030504040204" pitchFamily="34" charset="0"/>
-                <a:ea typeface="Tahoma" panose="020B0604030504040204" pitchFamily="34" charset="0"/>
-                <a:cs typeface="Tahoma" panose="020B0604030504040204" pitchFamily="34" charset="0"/>
-              </a:rPr>
-              <a:t>et imprimante réseau standard</a:t>
+              <a:t>Différence serveur impression et imprimante réseau standard</a:t>
             </a:r>
           </a:p>
           <a:p>
@@ -7641,7 +7102,7 @@
           <a:p>
             <a:pPr algn="ctr" rtl="0"/>
             <a:r>
-              <a:rPr lang="fr-FR" sz="1800" dirty="0" smtClean="0">
+              <a:rPr lang="fr-FR" sz="1800" dirty="0">
                 <a:solidFill>
                   <a:srgbClr val="87A896"/>
                 </a:solidFill>
@@ -7651,14 +7112,6 @@
               </a:rPr>
               <a:t>SERVEURS D’IMPRESSION</a:t>
             </a:r>
-            <a:endParaRPr lang="fr-FR" sz="1800" dirty="0">
-              <a:solidFill>
-                <a:srgbClr val="87A896"/>
-              </a:solidFill>
-              <a:latin typeface="Tahoma" panose="020B0604030504040204" pitchFamily="34" charset="0"/>
-              <a:ea typeface="Tahoma" panose="020B0604030504040204" pitchFamily="34" charset="0"/>
-              <a:cs typeface="Tahoma" panose="020B0604030504040204" pitchFamily="34" charset="0"/>
-            </a:endParaRPr>
           </a:p>
         </p:txBody>
       </p:sp>
@@ -7691,7 +7144,7 @@
           <a:p>
             <a:pPr algn="ctr"/>
             <a:r>
-              <a:rPr lang="fr-CH" dirty="0" smtClean="0">
+              <a:rPr lang="fr-CH" dirty="0">
                 <a:latin typeface="Tahoma" panose="020B0604030504040204" pitchFamily="34" charset="0"/>
                 <a:ea typeface="Tahoma" panose="020B0604030504040204" pitchFamily="34" charset="0"/>
                 <a:cs typeface="Tahoma" panose="020B0604030504040204" pitchFamily="34" charset="0"/>
@@ -7730,7 +7183,7 @@
           <a:p>
             <a:pPr algn="ctr"/>
             <a:r>
-              <a:rPr lang="fr-CH" dirty="0" smtClean="0">
+              <a:rPr lang="fr-CH" dirty="0">
                 <a:latin typeface="Tahoma" panose="020B0604030504040204" pitchFamily="34" charset="0"/>
                 <a:ea typeface="Tahoma" panose="020B0604030504040204" pitchFamily="34" charset="0"/>
                 <a:cs typeface="Tahoma" panose="020B0604030504040204" pitchFamily="34" charset="0"/>
@@ -7762,13 +7215,6 @@
       </p:transition>
     </mc:Fallback>
   </mc:AlternateContent>
-  <p:timing>
-    <p:tnLst>
-      <p:par>
-        <p:cTn id="1" dur="indefinite" restart="never" nodeType="tmRoot"/>
-      </p:par>
-    </p:tnLst>
-  </p:timing>
 </p:sld>
 </file>
 
@@ -8623,14 +8069,12 @@
 </file>
 
 <file path=customXml/item1.xml><?xml version="1.0" encoding="utf-8"?>
-<p:properties xmlns:p="http://schemas.microsoft.com/office/2006/metadata/properties" xmlns:xsi="http://www.w3.org/2001/XMLSchema-instance" xmlns:pc="http://schemas.microsoft.com/office/infopath/2007/PartnerControls">
-  <documentManagement>
-    <VSO_x0020_item_x0020_id xmlns="40262f94-9f35-4ac3-9a90-690165a166b7" xsi:nil="true"/>
-    <Assetid_x0020_ xmlns="40262f94-9f35-4ac3-9a90-690165a166b7" xsi:nil="true"/>
-    <Item_x0020_Details xmlns="40262f94-9f35-4ac3-9a90-690165a166b7" xsi:nil="true"/>
-    <Template_x0020_details xmlns="40262f94-9f35-4ac3-9a90-690165a166b7" xsi:nil="true"/>
-  </documentManagement>
-</p:properties>
+<?mso-contentType ?>
+<FormTemplates xmlns="http://schemas.microsoft.com/sharepoint/v3/contenttype/forms">
+  <Display>DocumentLibraryForm</Display>
+  <Edit>DocumentLibraryForm</Edit>
+  <New>DocumentLibraryForm</New>
+</FormTemplates>
 </file>
 
 <file path=customXml/item2.xml><?xml version="1.0" encoding="utf-8"?>
@@ -8815,27 +8259,20 @@
 </file>
 
 <file path=customXml/item3.xml><?xml version="1.0" encoding="utf-8"?>
-<?mso-contentType ?>
-<FormTemplates xmlns="http://schemas.microsoft.com/sharepoint/v3/contenttype/forms">
-  <Display>DocumentLibraryForm</Display>
-  <Edit>DocumentLibraryForm</Edit>
-  <New>DocumentLibraryForm</New>
-</FormTemplates>
+<p:properties xmlns:p="http://schemas.microsoft.com/office/2006/metadata/properties" xmlns:xsi="http://www.w3.org/2001/XMLSchema-instance" xmlns:pc="http://schemas.microsoft.com/office/infopath/2007/PartnerControls">
+  <documentManagement>
+    <VSO_x0020_item_x0020_id xmlns="40262f94-9f35-4ac3-9a90-690165a166b7" xsi:nil="true"/>
+    <Assetid_x0020_ xmlns="40262f94-9f35-4ac3-9a90-690165a166b7" xsi:nil="true"/>
+    <Item_x0020_Details xmlns="40262f94-9f35-4ac3-9a90-690165a166b7" xsi:nil="true"/>
+    <Template_x0020_details xmlns="40262f94-9f35-4ac3-9a90-690165a166b7" xsi:nil="true"/>
+  </documentManagement>
+</p:properties>
 </file>
 
 <file path=customXml/itemProps1.xml><?xml version="1.0" encoding="utf-8"?>
-<ds:datastoreItem xmlns:ds="http://schemas.openxmlformats.org/officeDocument/2006/customXml" ds:itemID="{3049C11C-71DC-49B6-ACD8-27E3AE088D14}">
+<ds:datastoreItem xmlns:ds="http://schemas.openxmlformats.org/officeDocument/2006/customXml" ds:itemID="{0875BD71-4A33-4FB7-88CA-777C4D9E6EE5}">
   <ds:schemaRefs>
-    <ds:schemaRef ds:uri="http://purl.org/dc/terms/"/>
-    <ds:schemaRef ds:uri="http://schemas.openxmlformats.org/package/2006/metadata/core-properties"/>
-    <ds:schemaRef ds:uri="http://purl.org/dc/dcmitype/"/>
-    <ds:schemaRef ds:uri="http://schemas.microsoft.com/office/infopath/2007/PartnerControls"/>
-    <ds:schemaRef ds:uri="http://purl.org/dc/elements/1.1/"/>
-    <ds:schemaRef ds:uri="http://schemas.microsoft.com/office/2006/metadata/properties"/>
-    <ds:schemaRef ds:uri="http://schemas.microsoft.com/office/2006/documentManagement/types"/>
-    <ds:schemaRef ds:uri="40262f94-9f35-4ac3-9a90-690165a166b7"/>
-    <ds:schemaRef ds:uri="a4f35948-e619-41b3-aa29-22878b09cfd2"/>
-    <ds:schemaRef ds:uri="http://www.w3.org/XML/1998/namespace"/>
+    <ds:schemaRef ds:uri="http://schemas.microsoft.com/sharepoint/v3/contenttype/forms"/>
   </ds:schemaRefs>
 </ds:datastoreItem>
 </file>
@@ -8860,9 +8297,18 @@
 </file>
 
 <file path=customXml/itemProps3.xml><?xml version="1.0" encoding="utf-8"?>
-<ds:datastoreItem xmlns:ds="http://schemas.openxmlformats.org/officeDocument/2006/customXml" ds:itemID="{0875BD71-4A33-4FB7-88CA-777C4D9E6EE5}">
+<ds:datastoreItem xmlns:ds="http://schemas.openxmlformats.org/officeDocument/2006/customXml" ds:itemID="{3049C11C-71DC-49B6-ACD8-27E3AE088D14}">
   <ds:schemaRefs>
-    <ds:schemaRef ds:uri="http://schemas.microsoft.com/sharepoint/v3/contenttype/forms"/>
+    <ds:schemaRef ds:uri="http://purl.org/dc/terms/"/>
+    <ds:schemaRef ds:uri="http://schemas.openxmlformats.org/package/2006/metadata/core-properties"/>
+    <ds:schemaRef ds:uri="http://purl.org/dc/dcmitype/"/>
+    <ds:schemaRef ds:uri="http://schemas.microsoft.com/office/infopath/2007/PartnerControls"/>
+    <ds:schemaRef ds:uri="http://purl.org/dc/elements/1.1/"/>
+    <ds:schemaRef ds:uri="http://schemas.microsoft.com/office/2006/metadata/properties"/>
+    <ds:schemaRef ds:uri="http://schemas.microsoft.com/office/2006/documentManagement/types"/>
+    <ds:schemaRef ds:uri="40262f94-9f35-4ac3-9a90-690165a166b7"/>
+    <ds:schemaRef ds:uri="a4f35948-e619-41b3-aa29-22878b09cfd2"/>
+    <ds:schemaRef ds:uri="http://www.w3.org/XML/1998/namespace"/>
   </ds:schemaRefs>
 </ds:datastoreItem>
 </file>
</xml_diff>

<commit_message>
changer des trucs ajouter des textes etc...
</commit_message>
<xml_diff>
--- a/SERVEUR ET FICHIERS D’IMPRESSION.pptx
+++ b/SERVEUR ET FICHIERS D’IMPRESSION.pptx
@@ -5,10 +5,10 @@
     <p:sldMasterId id="2147483672" r:id="rId4"/>
   </p:sldMasterIdLst>
   <p:notesMasterIdLst>
-    <p:notesMasterId r:id="rId14"/>
+    <p:notesMasterId r:id="rId15"/>
   </p:notesMasterIdLst>
   <p:handoutMasterIdLst>
-    <p:handoutMasterId r:id="rId15"/>
+    <p:handoutMasterId r:id="rId16"/>
   </p:handoutMasterIdLst>
   <p:sldIdLst>
     <p:sldId id="322" r:id="rId5"/>
@@ -16,15 +16,16 @@
     <p:sldId id="311" r:id="rId7"/>
     <p:sldId id="313" r:id="rId8"/>
     <p:sldId id="324" r:id="rId9"/>
-    <p:sldId id="325" r:id="rId10"/>
-    <p:sldId id="328" r:id="rId11"/>
-    <p:sldId id="326" r:id="rId12"/>
-    <p:sldId id="327" r:id="rId13"/>
+    <p:sldId id="329" r:id="rId10"/>
+    <p:sldId id="325" r:id="rId11"/>
+    <p:sldId id="328" r:id="rId12"/>
+    <p:sldId id="326" r:id="rId13"/>
+    <p:sldId id="327" r:id="rId14"/>
   </p:sldIdLst>
   <p:sldSz cx="12188825" cy="6858000"/>
   <p:notesSz cx="6858000" cy="9144000"/>
   <p:custDataLst>
-    <p:tags r:id="rId16"/>
+    <p:tags r:id="rId17"/>
   </p:custDataLst>
   <p:defaultTextStyle>
     <a:defPPr rtl="0">
@@ -856,6 +857,91 @@
 </p:notes>
 </file>
 
+<file path=ppt/notesSlides/notesSlide10.xml><?xml version="1.0" encoding="utf-8"?>
+<p:notes xmlns:a="http://schemas.openxmlformats.org/drawingml/2006/main" xmlns:r="http://schemas.openxmlformats.org/officeDocument/2006/relationships" xmlns:p="http://schemas.openxmlformats.org/presentationml/2006/main">
+  <p:cSld>
+    <p:spTree>
+      <p:nvGrpSpPr>
+        <p:cNvPr id="1" name=""/>
+        <p:cNvGrpSpPr/>
+        <p:nvPr/>
+      </p:nvGrpSpPr>
+      <p:grpSpPr>
+        <a:xfrm>
+          <a:off x="0" y="0"/>
+          <a:ext cx="0" cy="0"/>
+          <a:chOff x="0" y="0"/>
+          <a:chExt cx="0" cy="0"/>
+        </a:xfrm>
+      </p:grpSpPr>
+      <p:sp>
+        <p:nvSpPr>
+          <p:cNvPr id="2" name="Espace réservé d’image de diapositive 1"/>
+          <p:cNvSpPr>
+            <a:spLocks noGrp="1" noRot="1" noChangeAspect="1"/>
+          </p:cNvSpPr>
+          <p:nvPr>
+            <p:ph type="sldImg"/>
+          </p:nvPr>
+        </p:nvSpPr>
+        <p:spPr/>
+      </p:sp>
+      <p:sp>
+        <p:nvSpPr>
+          <p:cNvPr id="3" name="Espace réservé des notes 2"/>
+          <p:cNvSpPr>
+            <a:spLocks noGrp="1"/>
+          </p:cNvSpPr>
+          <p:nvPr>
+            <p:ph type="body" idx="1"/>
+          </p:nvPr>
+        </p:nvSpPr>
+        <p:spPr/>
+        <p:txBody>
+          <a:bodyPr/>
+          <a:lstStyle/>
+          <a:p>
+            <a:endParaRPr lang="fr-FR" dirty="0"/>
+          </a:p>
+        </p:txBody>
+      </p:sp>
+      <p:sp>
+        <p:nvSpPr>
+          <p:cNvPr id="4" name="Espace réservé du numéro de diapositive 3"/>
+          <p:cNvSpPr>
+            <a:spLocks noGrp="1"/>
+          </p:cNvSpPr>
+          <p:nvPr>
+            <p:ph type="sldNum" sz="quarter" idx="10"/>
+          </p:nvPr>
+        </p:nvSpPr>
+        <p:spPr/>
+        <p:txBody>
+          <a:bodyPr/>
+          <a:lstStyle/>
+          <a:p>
+            <a:pPr rtl="0"/>
+            <a:fld id="{F93199CD-3E1B-4AE6-990F-76F925F5EA9F}" type="slidenum">
+              <a:rPr lang="fr-FR" smtClean="0"/>
+              <a:t>10</a:t>
+            </a:fld>
+            <a:endParaRPr lang="fr-FR" dirty="0"/>
+          </a:p>
+        </p:txBody>
+      </p:sp>
+    </p:spTree>
+    <p:extLst>
+      <p:ext uri="{BB962C8B-B14F-4D97-AF65-F5344CB8AC3E}">
+        <p14:creationId xmlns:p14="http://schemas.microsoft.com/office/powerpoint/2010/main" val="2824073808"/>
+      </p:ext>
+    </p:extLst>
+  </p:cSld>
+  <p:clrMapOvr>
+    <a:masterClrMapping/>
+  </p:clrMapOvr>
+</p:notes>
+</file>
+
 <file path=ppt/notesSlides/notesSlide2.xml><?xml version="1.0" encoding="utf-8"?>
 <p:notes xmlns:a="http://schemas.openxmlformats.org/drawingml/2006/main" xmlns:r="http://schemas.openxmlformats.org/officeDocument/2006/relationships" xmlns:p="http://schemas.openxmlformats.org/presentationml/2006/main">
   <p:cSld>
@@ -1271,7 +1357,7 @@
     </p:spTree>
     <p:extLst>
       <p:ext uri="{BB962C8B-B14F-4D97-AF65-F5344CB8AC3E}">
-        <p14:creationId xmlns:p14="http://schemas.microsoft.com/office/powerpoint/2010/main" val="2545620953"/>
+        <p14:creationId xmlns:p14="http://schemas.microsoft.com/office/powerpoint/2010/main" val="3562994706"/>
       </p:ext>
     </p:extLst>
   </p:cSld>
@@ -1356,7 +1442,7 @@
     </p:spTree>
     <p:extLst>
       <p:ext uri="{BB962C8B-B14F-4D97-AF65-F5344CB8AC3E}">
-        <p14:creationId xmlns:p14="http://schemas.microsoft.com/office/powerpoint/2010/main" val="1754128439"/>
+        <p14:creationId xmlns:p14="http://schemas.microsoft.com/office/powerpoint/2010/main" val="2545620953"/>
       </p:ext>
     </p:extLst>
   </p:cSld>
@@ -1441,7 +1527,7 @@
     </p:spTree>
     <p:extLst>
       <p:ext uri="{BB962C8B-B14F-4D97-AF65-F5344CB8AC3E}">
-        <p14:creationId xmlns:p14="http://schemas.microsoft.com/office/powerpoint/2010/main" val="3382611344"/>
+        <p14:creationId xmlns:p14="http://schemas.microsoft.com/office/powerpoint/2010/main" val="1754128439"/>
       </p:ext>
     </p:extLst>
   </p:cSld>
@@ -1526,7 +1612,7 @@
     </p:spTree>
     <p:extLst>
       <p:ext uri="{BB962C8B-B14F-4D97-AF65-F5344CB8AC3E}">
-        <p14:creationId xmlns:p14="http://schemas.microsoft.com/office/powerpoint/2010/main" val="2824073808"/>
+        <p14:creationId xmlns:p14="http://schemas.microsoft.com/office/powerpoint/2010/main" val="3382611344"/>
       </p:ext>
     </p:extLst>
   </p:cSld>
@@ -5483,6 +5569,338 @@
 </p:sld>
 </file>
 
+<file path=ppt/slides/slide10.xml><?xml version="1.0" encoding="utf-8"?>
+<p:sld xmlns:a="http://schemas.openxmlformats.org/drawingml/2006/main" xmlns:r="http://schemas.openxmlformats.org/officeDocument/2006/relationships" xmlns:p="http://schemas.openxmlformats.org/presentationml/2006/main">
+  <p:cSld>
+    <p:bg>
+      <p:bgPr>
+        <a:solidFill>
+          <a:srgbClr val="34473D"/>
+        </a:solidFill>
+        <a:effectLst/>
+      </p:bgPr>
+    </p:bg>
+    <p:spTree>
+      <p:nvGrpSpPr>
+        <p:cNvPr id="1" name=""/>
+        <p:cNvGrpSpPr/>
+        <p:nvPr/>
+      </p:nvGrpSpPr>
+      <p:grpSpPr>
+        <a:xfrm>
+          <a:off x="0" y="0"/>
+          <a:ext cx="0" cy="0"/>
+          <a:chOff x="0" y="0"/>
+          <a:chExt cx="0" cy="0"/>
+        </a:xfrm>
+      </p:grpSpPr>
+      <p:sp>
+        <p:nvSpPr>
+          <p:cNvPr id="5" name="Titre 12"/>
+          <p:cNvSpPr txBox="1">
+            <a:spLocks/>
+          </p:cNvSpPr>
+          <p:nvPr/>
+        </p:nvSpPr>
+        <p:spPr>
+          <a:xfrm>
+            <a:off x="549796" y="1124744"/>
+            <a:ext cx="11159008" cy="875928"/>
+          </a:xfrm>
+          <a:prstGeom prst="rect">
+            <a:avLst/>
+          </a:prstGeom>
+          <a:ln>
+            <a:noFill/>
+          </a:ln>
+        </p:spPr>
+        <p:txBody>
+          <a:bodyPr vert="horz" lIns="91440" tIns="45720" rIns="91440" bIns="45720" rtlCol="0" anchor="ctr">
+            <a:noAutofit/>
+          </a:bodyPr>
+          <a:lstStyle>
+            <a:lvl1pPr algn="l" defTabSz="914400" rtl="0" eaLnBrk="1" latinLnBrk="0" hangingPunct="1">
+              <a:lnSpc>
+                <a:spcPct val="90000"/>
+              </a:lnSpc>
+              <a:spcBef>
+                <a:spcPct val="0"/>
+              </a:spcBef>
+              <a:buNone/>
+              <a:defRPr sz="3600" b="1" kern="1200" cap="none" spc="0" baseline="0">
+                <a:ln w="9525">
+                  <a:noFill/>
+                  <a:prstDash val="solid"/>
+                </a:ln>
+                <a:solidFill>
+                  <a:schemeClr val="accent5"/>
+                </a:solidFill>
+                <a:effectLst/>
+                <a:latin typeface="+mj-lt"/>
+                <a:ea typeface="+mj-ea"/>
+                <a:cs typeface="+mj-cs"/>
+              </a:defRPr>
+            </a:lvl1pPr>
+          </a:lstStyle>
+          <a:p>
+            <a:pPr algn="ctr"/>
+            <a:r>
+              <a:rPr lang="fr-CH" sz="4800" cap="all" dirty="0">
+                <a:solidFill>
+                  <a:srgbClr val="87A896"/>
+                </a:solidFill>
+                <a:latin typeface="Tahoma" panose="020B0604030504040204" pitchFamily="34" charset="0"/>
+                <a:ea typeface="Tahoma" panose="020B0604030504040204" pitchFamily="34" charset="0"/>
+                <a:cs typeface="Tahoma" panose="020B0604030504040204" pitchFamily="34" charset="0"/>
+              </a:rPr>
+              <a:t>Différence serveur impression et imprimante réseau standard</a:t>
+            </a:r>
+          </a:p>
+          <a:p>
+            <a:pPr algn="ctr"/>
+            <a:endParaRPr lang="fr-FR" sz="4800" cap="all" dirty="0">
+              <a:solidFill>
+                <a:srgbClr val="87A896"/>
+              </a:solidFill>
+              <a:latin typeface="Tahoma" panose="020B0604030504040204" pitchFamily="34" charset="0"/>
+              <a:ea typeface="Tahoma" panose="020B0604030504040204" pitchFamily="34" charset="0"/>
+              <a:cs typeface="Tahoma" panose="020B0604030504040204" pitchFamily="34" charset="0"/>
+            </a:endParaRPr>
+          </a:p>
+        </p:txBody>
+      </p:sp>
+      <p:sp>
+        <p:nvSpPr>
+          <p:cNvPr id="8" name="Titre 12"/>
+          <p:cNvSpPr>
+            <a:spLocks noGrp="1"/>
+          </p:cNvSpPr>
+          <p:nvPr>
+            <p:ph type="title"/>
+          </p:nvPr>
+        </p:nvSpPr>
+        <p:spPr>
+          <a:xfrm>
+            <a:off x="8758708" y="6453336"/>
+            <a:ext cx="3264497" cy="216024"/>
+          </a:xfrm>
+          <a:solidFill>
+            <a:srgbClr val="B6CABF"/>
+          </a:solidFill>
+        </p:spPr>
+        <p:txBody>
+          <a:bodyPr rtlCol="0" anchor="ctr">
+            <a:noAutofit/>
+          </a:bodyPr>
+          <a:lstStyle/>
+          <a:p>
+            <a:pPr algn="ctr" rtl="0"/>
+            <a:r>
+              <a:rPr lang="fr-FR" sz="1800" dirty="0">
+                <a:solidFill>
+                  <a:srgbClr val="87A896"/>
+                </a:solidFill>
+                <a:latin typeface="Tahoma" panose="020B0604030504040204" pitchFamily="34" charset="0"/>
+                <a:ea typeface="Tahoma" panose="020B0604030504040204" pitchFamily="34" charset="0"/>
+                <a:cs typeface="Tahoma" panose="020B0604030504040204" pitchFamily="34" charset="0"/>
+              </a:rPr>
+              <a:t>SERVEURS D’IMPRESSION</a:t>
+            </a:r>
+          </a:p>
+        </p:txBody>
+      </p:sp>
+      <p:sp>
+        <p:nvSpPr>
+          <p:cNvPr id="10" name="ZoneTexte 9"/>
+          <p:cNvSpPr txBox="1"/>
+          <p:nvPr/>
+        </p:nvSpPr>
+        <p:spPr>
+          <a:xfrm>
+            <a:off x="7220273" y="2350150"/>
+            <a:ext cx="4608512" cy="369332"/>
+          </a:xfrm>
+          <a:prstGeom prst="rect">
+            <a:avLst/>
+          </a:prstGeom>
+          <a:noFill/>
+          <a:ln>
+            <a:solidFill>
+              <a:schemeClr val="bg2"/>
+            </a:solidFill>
+          </a:ln>
+        </p:spPr>
+        <p:txBody>
+          <a:bodyPr wrap="square" rtlCol="0" anchor="ctr" anchorCtr="1">
+            <a:spAutoFit/>
+          </a:bodyPr>
+          <a:lstStyle/>
+          <a:p>
+            <a:pPr algn="ctr"/>
+            <a:r>
+              <a:rPr lang="fr-CH" dirty="0">
+                <a:latin typeface="Tahoma" panose="020B0604030504040204" pitchFamily="34" charset="0"/>
+                <a:ea typeface="Tahoma" panose="020B0604030504040204" pitchFamily="34" charset="0"/>
+                <a:cs typeface="Tahoma" panose="020B0604030504040204" pitchFamily="34" charset="0"/>
+              </a:rPr>
+              <a:t>SERVEUR IMPRESSION</a:t>
+            </a:r>
+          </a:p>
+        </p:txBody>
+      </p:sp>
+      <p:sp>
+        <p:nvSpPr>
+          <p:cNvPr id="6" name="ZoneTexte 5"/>
+          <p:cNvSpPr txBox="1"/>
+          <p:nvPr/>
+        </p:nvSpPr>
+        <p:spPr>
+          <a:xfrm>
+            <a:off x="261764" y="2350150"/>
+            <a:ext cx="4582244" cy="369332"/>
+          </a:xfrm>
+          <a:prstGeom prst="rect">
+            <a:avLst/>
+          </a:prstGeom>
+          <a:noFill/>
+          <a:ln>
+            <a:solidFill>
+              <a:schemeClr val="bg2"/>
+            </a:solidFill>
+          </a:ln>
+        </p:spPr>
+        <p:txBody>
+          <a:bodyPr wrap="square" rtlCol="0" anchor="ctr" anchorCtr="1">
+            <a:spAutoFit/>
+          </a:bodyPr>
+          <a:lstStyle/>
+          <a:p>
+            <a:pPr algn="ctr"/>
+            <a:r>
+              <a:rPr lang="fr-CH" dirty="0">
+                <a:latin typeface="Tahoma" panose="020B0604030504040204" pitchFamily="34" charset="0"/>
+                <a:ea typeface="Tahoma" panose="020B0604030504040204" pitchFamily="34" charset="0"/>
+                <a:cs typeface="Tahoma" panose="020B0604030504040204" pitchFamily="34" charset="0"/>
+              </a:rPr>
+              <a:t>IMPRIMANTE RÉSEAU STANDARD</a:t>
+            </a:r>
+          </a:p>
+        </p:txBody>
+      </p:sp>
+      <p:sp>
+        <p:nvSpPr>
+          <p:cNvPr id="7" name="ZoneTexte 6">
+            <a:extLst>
+              <a:ext uri="{FF2B5EF4-FFF2-40B4-BE49-F238E27FC236}">
+                <a16:creationId xmlns:a16="http://schemas.microsoft.com/office/drawing/2014/main" id="{84828FFD-F527-4365-97E1-65E888A6C578}"/>
+              </a:ext>
+            </a:extLst>
+          </p:cNvPr>
+          <p:cNvSpPr txBox="1"/>
+          <p:nvPr/>
+        </p:nvSpPr>
+        <p:spPr>
+          <a:xfrm>
+            <a:off x="7220272" y="3068960"/>
+            <a:ext cx="4608513" cy="1569660"/>
+          </a:xfrm>
+          <a:prstGeom prst="rect">
+            <a:avLst/>
+          </a:prstGeom>
+          <a:noFill/>
+          <a:ln>
+            <a:solidFill>
+              <a:schemeClr val="bg2"/>
+            </a:solidFill>
+          </a:ln>
+        </p:spPr>
+        <p:txBody>
+          <a:bodyPr wrap="square" rtlCol="0" anchor="ctr" anchorCtr="1">
+            <a:spAutoFit/>
+          </a:bodyPr>
+          <a:lstStyle/>
+          <a:p>
+            <a:pPr algn="r"/>
+            <a:r>
+              <a:rPr lang="fr-CH" sz="2400" dirty="0">
+                <a:latin typeface="Tahoma" panose="020B0604030504040204" pitchFamily="34" charset="0"/>
+                <a:ea typeface="Tahoma" panose="020B0604030504040204" pitchFamily="34" charset="0"/>
+                <a:cs typeface="Tahoma" panose="020B0604030504040204" pitchFamily="34" charset="0"/>
+              </a:rPr>
+              <a:t>Serveur qui connecte une ou plusieurs imprimantes à un ou plusieurs utilisateurs sur même réseau</a:t>
+            </a:r>
+          </a:p>
+        </p:txBody>
+      </p:sp>
+      <p:sp>
+        <p:nvSpPr>
+          <p:cNvPr id="9" name="ZoneTexte 8">
+            <a:extLst>
+              <a:ext uri="{FF2B5EF4-FFF2-40B4-BE49-F238E27FC236}">
+                <a16:creationId xmlns:a16="http://schemas.microsoft.com/office/drawing/2014/main" id="{92D32FE1-891A-4488-9EE0-000EF80AF297}"/>
+              </a:ext>
+            </a:extLst>
+          </p:cNvPr>
+          <p:cNvSpPr txBox="1"/>
+          <p:nvPr/>
+        </p:nvSpPr>
+        <p:spPr>
+          <a:xfrm>
+            <a:off x="261764" y="2984357"/>
+            <a:ext cx="5256584" cy="2308324"/>
+          </a:xfrm>
+          <a:prstGeom prst="rect">
+            <a:avLst/>
+          </a:prstGeom>
+          <a:noFill/>
+          <a:ln>
+            <a:solidFill>
+              <a:schemeClr val="bg2"/>
+            </a:solidFill>
+          </a:ln>
+        </p:spPr>
+        <p:txBody>
+          <a:bodyPr wrap="square" rtlCol="0" anchor="ctr" anchorCtr="1">
+            <a:spAutoFit/>
+          </a:bodyPr>
+          <a:lstStyle/>
+          <a:p>
+            <a:r>
+              <a:rPr lang="fr-CH" sz="2400" dirty="0">
+                <a:latin typeface="Tahoma" panose="020B0604030504040204" pitchFamily="34" charset="0"/>
+                <a:ea typeface="Tahoma" panose="020B0604030504040204" pitchFamily="34" charset="0"/>
+                <a:cs typeface="Tahoma" panose="020B0604030504040204" pitchFamily="34" charset="0"/>
+              </a:rPr>
+              <a:t>Connectée directement sur le réseau. Accessible par tous les ordinateurs reliés à ce réseau. imprimante standard se branche en USB. Certaines imprimantes joignent le réseau à l’aide du sans fil.</a:t>
+            </a:r>
+          </a:p>
+        </p:txBody>
+      </p:sp>
+    </p:spTree>
+    <p:extLst>
+      <p:ext uri="{BB962C8B-B14F-4D97-AF65-F5344CB8AC3E}">
+        <p14:creationId xmlns:p14="http://schemas.microsoft.com/office/powerpoint/2010/main" val="3290548540"/>
+      </p:ext>
+    </p:extLst>
+  </p:cSld>
+  <p:clrMapOvr>
+    <a:masterClrMapping/>
+  </p:clrMapOvr>
+  <mc:AlternateContent xmlns:mc="http://schemas.openxmlformats.org/markup-compatibility/2006" xmlns:p14="http://schemas.microsoft.com/office/powerpoint/2010/main">
+    <mc:Choice Requires="p14">
+      <p:transition spd="med" p14:dur="700">
+        <p:fade/>
+      </p:transition>
+    </mc:Choice>
+    <mc:Fallback xmlns="">
+      <p:transition spd="med">
+        <p:fade/>
+      </p:transition>
+    </mc:Fallback>
+  </mc:AlternateContent>
+</p:sld>
+</file>
+
 <file path=ppt/slides/slide2.xml><?xml version="1.0" encoding="utf-8"?>
 <p:sld xmlns:a="http://schemas.openxmlformats.org/drawingml/2006/main" xmlns:r="http://schemas.openxmlformats.org/officeDocument/2006/relationships" xmlns:p="http://schemas.openxmlformats.org/presentationml/2006/main">
   <p:cSld>
@@ -6129,7 +6547,7 @@
         </p:nvSpPr>
         <p:spPr>
           <a:xfrm>
-            <a:off x="2205980" y="836712"/>
+            <a:off x="2208211" y="694817"/>
             <a:ext cx="7772401" cy="875928"/>
           </a:xfrm>
           <a:prstGeom prst="rect">
@@ -6231,8 +6649,8 @@
         </p:nvSpPr>
         <p:spPr>
           <a:xfrm>
-            <a:off x="261764" y="2132856"/>
-            <a:ext cx="4968552" cy="523220"/>
+            <a:off x="261764" y="1922570"/>
+            <a:ext cx="11761441" cy="523220"/>
           </a:xfrm>
           <a:prstGeom prst="rect">
             <a:avLst/>
@@ -6264,14 +6682,20 @@
       </p:sp>
       <p:sp>
         <p:nvSpPr>
-          <p:cNvPr id="6" name="ZoneTexte 5"/>
+          <p:cNvPr id="7" name="ZoneTexte 6">
+            <a:extLst>
+              <a:ext uri="{FF2B5EF4-FFF2-40B4-BE49-F238E27FC236}">
+                <a16:creationId xmlns:a16="http://schemas.microsoft.com/office/drawing/2014/main" id="{1B5AF021-9BC8-4F93-B8DF-F81CDF37A060}"/>
+              </a:ext>
+            </a:extLst>
+          </p:cNvPr>
           <p:cNvSpPr txBox="1"/>
           <p:nvPr/>
         </p:nvSpPr>
         <p:spPr>
           <a:xfrm>
-            <a:off x="8902724" y="2132856"/>
-            <a:ext cx="2448272" cy="954107"/>
+            <a:off x="261763" y="2668270"/>
+            <a:ext cx="5472609" cy="3416320"/>
           </a:xfrm>
           <a:prstGeom prst="rect">
             <a:avLst/>
@@ -6289,18 +6713,100 @@
           </a:bodyPr>
           <a:lstStyle/>
           <a:p>
-            <a:pPr algn="ctr"/>
-            <a:r>
-              <a:rPr lang="fr-CH" sz="2800" dirty="0">
+            <a:r>
+              <a:rPr lang="fr-CH" sz="2400" dirty="0">
                 <a:latin typeface="Tahoma" panose="020B0604030504040204" pitchFamily="34" charset="0"/>
                 <a:ea typeface="Tahoma" panose="020B0604030504040204" pitchFamily="34" charset="0"/>
                 <a:cs typeface="Tahoma" panose="020B0604030504040204" pitchFamily="34" charset="0"/>
               </a:rPr>
-              <a:t>PARTAGE AVANCÉ</a:t>
-            </a:r>
-          </a:p>
-        </p:txBody>
-      </p:sp>
+              <a:t>Il en existe 3 types : </a:t>
+            </a:r>
+          </a:p>
+          <a:p>
+            <a:pPr marL="342900" indent="-342900">
+              <a:buFontTx/>
+              <a:buChar char="-"/>
+            </a:pPr>
+            <a:r>
+              <a:rPr lang="fr-CH" sz="2400" dirty="0">
+                <a:latin typeface="Tahoma" panose="020B0604030504040204" pitchFamily="34" charset="0"/>
+                <a:ea typeface="Tahoma" panose="020B0604030504040204" pitchFamily="34" charset="0"/>
+                <a:cs typeface="Tahoma" panose="020B0604030504040204" pitchFamily="34" charset="0"/>
+              </a:rPr>
+              <a:t>Contrôle Total : Liberté totale, modifier dossier, transférer, supprimer etc..</a:t>
+            </a:r>
+          </a:p>
+          <a:p>
+            <a:pPr marL="342900" indent="-342900">
+              <a:buFontTx/>
+              <a:buChar char="-"/>
+            </a:pPr>
+            <a:r>
+              <a:rPr lang="fr-CH" sz="2400" dirty="0">
+                <a:latin typeface="Tahoma" panose="020B0604030504040204" pitchFamily="34" charset="0"/>
+                <a:ea typeface="Tahoma" panose="020B0604030504040204" pitchFamily="34" charset="0"/>
+                <a:cs typeface="Tahoma" panose="020B0604030504040204" pitchFamily="34" charset="0"/>
+              </a:rPr>
+              <a:t>Modification : Liberté restreinte. Lire et écrire seulement</a:t>
+            </a:r>
+          </a:p>
+          <a:p>
+            <a:pPr marL="342900" indent="-342900">
+              <a:buFontTx/>
+              <a:buChar char="-"/>
+            </a:pPr>
+            <a:r>
+              <a:rPr lang="fr-CH" sz="2400" dirty="0">
+                <a:latin typeface="Tahoma" panose="020B0604030504040204" pitchFamily="34" charset="0"/>
+                <a:ea typeface="Tahoma" panose="020B0604030504040204" pitchFamily="34" charset="0"/>
+                <a:cs typeface="Tahoma" panose="020B0604030504040204" pitchFamily="34" charset="0"/>
+              </a:rPr>
+              <a:t>Lecture : Pas de liberté. Afficher seulement le contenu. </a:t>
+            </a:r>
+          </a:p>
+          <a:p>
+            <a:pPr marL="342900" indent="-342900">
+              <a:buFontTx/>
+              <a:buChar char="-"/>
+            </a:pPr>
+            <a:endParaRPr lang="fr-CH" sz="2400" dirty="0">
+              <a:latin typeface="Tahoma" panose="020B0604030504040204" pitchFamily="34" charset="0"/>
+              <a:ea typeface="Tahoma" panose="020B0604030504040204" pitchFamily="34" charset="0"/>
+              <a:cs typeface="Tahoma" panose="020B0604030504040204" pitchFamily="34" charset="0"/>
+            </a:endParaRPr>
+          </a:p>
+        </p:txBody>
+      </p:sp>
+      <p:pic>
+        <p:nvPicPr>
+          <p:cNvPr id="3" name="Image 2">
+            <a:extLst>
+              <a:ext uri="{FF2B5EF4-FFF2-40B4-BE49-F238E27FC236}">
+                <a16:creationId xmlns:a16="http://schemas.microsoft.com/office/drawing/2014/main" id="{2C212905-EAD8-4063-81D0-19A74EA14547}"/>
+              </a:ext>
+            </a:extLst>
+          </p:cNvPr>
+          <p:cNvPicPr>
+            <a:picLocks noChangeAspect="1"/>
+          </p:cNvPicPr>
+          <p:nvPr/>
+        </p:nvPicPr>
+        <p:blipFill>
+          <a:blip r:embed="rId3"/>
+          <a:stretch>
+            <a:fillRect/>
+          </a:stretch>
+        </p:blipFill>
+        <p:spPr>
+          <a:xfrm>
+            <a:off x="8069554" y="2210178"/>
+            <a:ext cx="3203451" cy="3953005"/>
+          </a:xfrm>
+          <a:prstGeom prst="rect">
+            <a:avLst/>
+          </a:prstGeom>
+        </p:spPr>
+      </p:pic>
     </p:spTree>
     <p:extLst>
       <p:ext uri="{BB962C8B-B14F-4D97-AF65-F5344CB8AC3E}">
@@ -6327,6 +6833,286 @@
 </file>
 
 <file path=ppt/slides/slide6.xml><?xml version="1.0" encoding="utf-8"?>
+<p:sld xmlns:a="http://schemas.openxmlformats.org/drawingml/2006/main" xmlns:r="http://schemas.openxmlformats.org/officeDocument/2006/relationships" xmlns:p="http://schemas.openxmlformats.org/presentationml/2006/main">
+  <p:cSld>
+    <p:bg>
+      <p:bgPr>
+        <a:solidFill>
+          <a:srgbClr val="34473D"/>
+        </a:solidFill>
+        <a:effectLst/>
+      </p:bgPr>
+    </p:bg>
+    <p:spTree>
+      <p:nvGrpSpPr>
+        <p:cNvPr id="1" name=""/>
+        <p:cNvGrpSpPr/>
+        <p:nvPr/>
+      </p:nvGrpSpPr>
+      <p:grpSpPr>
+        <a:xfrm>
+          <a:off x="0" y="0"/>
+          <a:ext cx="0" cy="0"/>
+          <a:chOff x="0" y="0"/>
+          <a:chExt cx="0" cy="0"/>
+        </a:xfrm>
+      </p:grpSpPr>
+      <p:sp>
+        <p:nvSpPr>
+          <p:cNvPr id="5" name="Titre 12"/>
+          <p:cNvSpPr txBox="1">
+            <a:spLocks/>
+          </p:cNvSpPr>
+          <p:nvPr/>
+        </p:nvSpPr>
+        <p:spPr>
+          <a:xfrm>
+            <a:off x="2208211" y="548680"/>
+            <a:ext cx="7772401" cy="875928"/>
+          </a:xfrm>
+          <a:prstGeom prst="rect">
+            <a:avLst/>
+          </a:prstGeom>
+          <a:ln>
+            <a:noFill/>
+          </a:ln>
+        </p:spPr>
+        <p:txBody>
+          <a:bodyPr vert="horz" lIns="91440" tIns="45720" rIns="91440" bIns="45720" rtlCol="0" anchor="ctr">
+            <a:noAutofit/>
+          </a:bodyPr>
+          <a:lstStyle>
+            <a:lvl1pPr algn="l" defTabSz="914400" rtl="0" eaLnBrk="1" latinLnBrk="0" hangingPunct="1">
+              <a:lnSpc>
+                <a:spcPct val="90000"/>
+              </a:lnSpc>
+              <a:spcBef>
+                <a:spcPct val="0"/>
+              </a:spcBef>
+              <a:buNone/>
+              <a:defRPr sz="3600" b="1" kern="1200" cap="none" spc="0" baseline="0">
+                <a:ln w="9525">
+                  <a:noFill/>
+                  <a:prstDash val="solid"/>
+                </a:ln>
+                <a:solidFill>
+                  <a:schemeClr val="accent5"/>
+                </a:solidFill>
+                <a:effectLst/>
+                <a:latin typeface="+mj-lt"/>
+                <a:ea typeface="+mj-ea"/>
+                <a:cs typeface="+mj-cs"/>
+              </a:defRPr>
+            </a:lvl1pPr>
+          </a:lstStyle>
+          <a:p>
+            <a:pPr algn="ctr"/>
+            <a:r>
+              <a:rPr lang="fr-FR" sz="6600" dirty="0">
+                <a:solidFill>
+                  <a:srgbClr val="87A896"/>
+                </a:solidFill>
+                <a:latin typeface="Tahoma" panose="020B0604030504040204" pitchFamily="34" charset="0"/>
+                <a:ea typeface="Tahoma" panose="020B0604030504040204" pitchFamily="34" charset="0"/>
+                <a:cs typeface="Tahoma" panose="020B0604030504040204" pitchFamily="34" charset="0"/>
+              </a:rPr>
+              <a:t>EXPLICATIONS DES PARTAGES</a:t>
+            </a:r>
+          </a:p>
+        </p:txBody>
+      </p:sp>
+      <p:sp>
+        <p:nvSpPr>
+          <p:cNvPr id="8" name="Titre 12"/>
+          <p:cNvSpPr>
+            <a:spLocks noGrp="1"/>
+          </p:cNvSpPr>
+          <p:nvPr>
+            <p:ph type="title"/>
+          </p:nvPr>
+        </p:nvSpPr>
+        <p:spPr>
+          <a:xfrm>
+            <a:off x="8974732" y="6453336"/>
+            <a:ext cx="3048473" cy="216024"/>
+          </a:xfrm>
+          <a:solidFill>
+            <a:srgbClr val="B6CABF"/>
+          </a:solidFill>
+        </p:spPr>
+        <p:txBody>
+          <a:bodyPr rtlCol="0" anchor="ctr">
+            <a:noAutofit/>
+          </a:bodyPr>
+          <a:lstStyle/>
+          <a:p>
+            <a:pPr algn="ctr" rtl="0"/>
+            <a:r>
+              <a:rPr lang="fr-FR" sz="1800" dirty="0">
+                <a:solidFill>
+                  <a:srgbClr val="87A896"/>
+                </a:solidFill>
+                <a:latin typeface="Tahoma" panose="020B0604030504040204" pitchFamily="34" charset="0"/>
+                <a:ea typeface="Tahoma" panose="020B0604030504040204" pitchFamily="34" charset="0"/>
+                <a:cs typeface="Tahoma" panose="020B0604030504040204" pitchFamily="34" charset="0"/>
+              </a:rPr>
+              <a:t>SERVEURS DE FICHIERS</a:t>
+            </a:r>
+          </a:p>
+        </p:txBody>
+      </p:sp>
+      <p:sp>
+        <p:nvSpPr>
+          <p:cNvPr id="9" name="ZoneTexte 8">
+            <a:extLst>
+              <a:ext uri="{FF2B5EF4-FFF2-40B4-BE49-F238E27FC236}">
+                <a16:creationId xmlns:a16="http://schemas.microsoft.com/office/drawing/2014/main" id="{C8117F79-68BD-4428-A5E9-20A442E8086E}"/>
+              </a:ext>
+            </a:extLst>
+          </p:cNvPr>
+          <p:cNvSpPr txBox="1"/>
+          <p:nvPr/>
+        </p:nvSpPr>
+        <p:spPr>
+          <a:xfrm>
+            <a:off x="261764" y="1844824"/>
+            <a:ext cx="11761441" cy="523220"/>
+          </a:xfrm>
+          <a:prstGeom prst="rect">
+            <a:avLst/>
+          </a:prstGeom>
+          <a:noFill/>
+          <a:ln>
+            <a:solidFill>
+              <a:schemeClr val="bg2"/>
+            </a:solidFill>
+          </a:ln>
+        </p:spPr>
+        <p:txBody>
+          <a:bodyPr wrap="square" rtlCol="0" anchor="ctr" anchorCtr="1">
+            <a:spAutoFit/>
+          </a:bodyPr>
+          <a:lstStyle/>
+          <a:p>
+            <a:pPr algn="ctr"/>
+            <a:r>
+              <a:rPr lang="fr-CH" sz="2800" dirty="0">
+                <a:latin typeface="Tahoma" panose="020B0604030504040204" pitchFamily="34" charset="0"/>
+                <a:ea typeface="Tahoma" panose="020B0604030504040204" pitchFamily="34" charset="0"/>
+                <a:cs typeface="Tahoma" panose="020B0604030504040204" pitchFamily="34" charset="0"/>
+              </a:rPr>
+              <a:t>PARTAGE AVANCÉ</a:t>
+            </a:r>
+          </a:p>
+        </p:txBody>
+      </p:sp>
+      <p:pic>
+        <p:nvPicPr>
+          <p:cNvPr id="3" name="Image 2">
+            <a:extLst>
+              <a:ext uri="{FF2B5EF4-FFF2-40B4-BE49-F238E27FC236}">
+                <a16:creationId xmlns:a16="http://schemas.microsoft.com/office/drawing/2014/main" id="{217FE6C8-D702-419F-9CC4-809704F1257F}"/>
+              </a:ext>
+            </a:extLst>
+          </p:cNvPr>
+          <p:cNvPicPr>
+            <a:picLocks noChangeAspect="1"/>
+          </p:cNvPicPr>
+          <p:nvPr/>
+        </p:nvPicPr>
+        <p:blipFill>
+          <a:blip r:embed="rId3"/>
+          <a:stretch>
+            <a:fillRect/>
+          </a:stretch>
+        </p:blipFill>
+        <p:spPr>
+          <a:xfrm>
+            <a:off x="6179910" y="3284984"/>
+            <a:ext cx="5589644" cy="1519152"/>
+          </a:xfrm>
+          <a:prstGeom prst="rect">
+            <a:avLst/>
+          </a:prstGeom>
+        </p:spPr>
+      </p:pic>
+      <p:sp>
+        <p:nvSpPr>
+          <p:cNvPr id="12" name="ZoneTexte 11">
+            <a:extLst>
+              <a:ext uri="{FF2B5EF4-FFF2-40B4-BE49-F238E27FC236}">
+                <a16:creationId xmlns:a16="http://schemas.microsoft.com/office/drawing/2014/main" id="{C060D9CE-5EFB-4EE2-A9B6-F68E164C7549}"/>
+              </a:ext>
+            </a:extLst>
+          </p:cNvPr>
+          <p:cNvSpPr txBox="1"/>
+          <p:nvPr/>
+        </p:nvSpPr>
+        <p:spPr>
+          <a:xfrm>
+            <a:off x="283772" y="2603594"/>
+            <a:ext cx="5472609" cy="1200329"/>
+          </a:xfrm>
+          <a:prstGeom prst="rect">
+            <a:avLst/>
+          </a:prstGeom>
+          <a:noFill/>
+          <a:ln>
+            <a:solidFill>
+              <a:schemeClr val="bg2"/>
+            </a:solidFill>
+          </a:ln>
+        </p:spPr>
+        <p:txBody>
+          <a:bodyPr wrap="square" rtlCol="0" anchor="ctr" anchorCtr="1">
+            <a:spAutoFit/>
+          </a:bodyPr>
+          <a:lstStyle/>
+          <a:p>
+            <a:r>
+              <a:rPr lang="fr-CH" sz="2400" dirty="0">
+                <a:latin typeface="Tahoma" panose="020B0604030504040204" pitchFamily="34" charset="0"/>
+                <a:ea typeface="Tahoma" panose="020B0604030504040204" pitchFamily="34" charset="0"/>
+                <a:cs typeface="Tahoma" panose="020B0604030504040204" pitchFamily="34" charset="0"/>
+              </a:rPr>
+              <a:t>- Fonctionnalité disponible uniquement chez Windows.</a:t>
+            </a:r>
+          </a:p>
+          <a:p>
+            <a:endParaRPr lang="fr-CH" sz="2400" dirty="0">
+              <a:latin typeface="Tahoma" panose="020B0604030504040204" pitchFamily="34" charset="0"/>
+              <a:ea typeface="Tahoma" panose="020B0604030504040204" pitchFamily="34" charset="0"/>
+              <a:cs typeface="Tahoma" panose="020B0604030504040204" pitchFamily="34" charset="0"/>
+            </a:endParaRPr>
+          </a:p>
+        </p:txBody>
+      </p:sp>
+    </p:spTree>
+    <p:extLst>
+      <p:ext uri="{BB962C8B-B14F-4D97-AF65-F5344CB8AC3E}">
+        <p14:creationId xmlns:p14="http://schemas.microsoft.com/office/powerpoint/2010/main" val="2067384210"/>
+      </p:ext>
+    </p:extLst>
+  </p:cSld>
+  <p:clrMapOvr>
+    <a:masterClrMapping/>
+  </p:clrMapOvr>
+  <mc:AlternateContent xmlns:mc="http://schemas.openxmlformats.org/markup-compatibility/2006" xmlns:p14="http://schemas.microsoft.com/office/powerpoint/2010/main">
+    <mc:Choice Requires="p14">
+      <p:transition spd="med" p14:dur="700">
+        <p:fade/>
+      </p:transition>
+    </mc:Choice>
+    <mc:Fallback xmlns="">
+      <p:transition spd="med">
+        <p:fade/>
+      </p:transition>
+    </mc:Fallback>
+  </mc:AlternateContent>
+</p:sld>
+</file>
+
+<file path=ppt/slides/slide7.xml><?xml version="1.0" encoding="utf-8"?>
 <p:sld xmlns:a="http://schemas.openxmlformats.org/drawingml/2006/main" xmlns:r="http://schemas.openxmlformats.org/officeDocument/2006/relationships" xmlns:p="http://schemas.openxmlformats.org/presentationml/2006/main">
   <p:cSld>
     <p:bg>
@@ -6604,7 +7390,7 @@
 </p:sld>
 </file>
 
-<file path=ppt/slides/slide7.xml><?xml version="1.0" encoding="utf-8"?>
+<file path=ppt/slides/slide8.xml><?xml version="1.0" encoding="utf-8"?>
 <p:sld xmlns:a="http://schemas.openxmlformats.org/drawingml/2006/main" xmlns:r="http://schemas.openxmlformats.org/officeDocument/2006/relationships" xmlns:p="http://schemas.openxmlformats.org/presentationml/2006/main">
   <p:cSld>
     <p:bg>
@@ -6888,93 +7674,6 @@
 </p:sld>
 </file>
 
-<file path=ppt/slides/slide8.xml><?xml version="1.0" encoding="utf-8"?>
-<p:sld xmlns:a="http://schemas.openxmlformats.org/drawingml/2006/main" xmlns:r="http://schemas.openxmlformats.org/officeDocument/2006/relationships" xmlns:p="http://schemas.openxmlformats.org/presentationml/2006/main">
-  <p:cSld>
-    <p:bg>
-      <p:bgPr>
-        <a:solidFill>
-          <a:srgbClr val="34473D"/>
-        </a:solidFill>
-        <a:effectLst/>
-      </p:bgPr>
-    </p:bg>
-    <p:spTree>
-      <p:nvGrpSpPr>
-        <p:cNvPr id="1" name=""/>
-        <p:cNvGrpSpPr/>
-        <p:nvPr/>
-      </p:nvGrpSpPr>
-      <p:grpSpPr>
-        <a:xfrm>
-          <a:off x="0" y="0"/>
-          <a:ext cx="0" cy="0"/>
-          <a:chOff x="0" y="0"/>
-          <a:chExt cx="0" cy="0"/>
-        </a:xfrm>
-      </p:grpSpPr>
-      <p:sp>
-        <p:nvSpPr>
-          <p:cNvPr id="13" name="Titre 12"/>
-          <p:cNvSpPr>
-            <a:spLocks noGrp="1"/>
-          </p:cNvSpPr>
-          <p:nvPr>
-            <p:ph type="title"/>
-          </p:nvPr>
-        </p:nvSpPr>
-        <p:spPr>
-          <a:xfrm>
-            <a:off x="1485900" y="1988840"/>
-            <a:ext cx="9601201" cy="2514600"/>
-          </a:xfrm>
-        </p:spPr>
-        <p:txBody>
-          <a:bodyPr rtlCol="0" anchor="ctr">
-            <a:noAutofit/>
-          </a:bodyPr>
-          <a:lstStyle/>
-          <a:p>
-            <a:pPr algn="ctr" rtl="0"/>
-            <a:r>
-              <a:rPr lang="fr-FR" sz="6600" dirty="0">
-                <a:solidFill>
-                  <a:srgbClr val="87A896"/>
-                </a:solidFill>
-                <a:latin typeface="Tahoma" panose="020B0604030504040204" pitchFamily="34" charset="0"/>
-                <a:ea typeface="Tahoma" panose="020B0604030504040204" pitchFamily="34" charset="0"/>
-                <a:cs typeface="Tahoma" panose="020B0604030504040204" pitchFamily="34" charset="0"/>
-              </a:rPr>
-              <a:t>SERVEURS D’IMPRESSION</a:t>
-            </a:r>
-          </a:p>
-        </p:txBody>
-      </p:sp>
-    </p:spTree>
-    <p:extLst>
-      <p:ext uri="{BB962C8B-B14F-4D97-AF65-F5344CB8AC3E}">
-        <p14:creationId xmlns:p14="http://schemas.microsoft.com/office/powerpoint/2010/main" val="2589682945"/>
-      </p:ext>
-    </p:extLst>
-  </p:cSld>
-  <p:clrMapOvr>
-    <a:masterClrMapping/>
-  </p:clrMapOvr>
-  <mc:AlternateContent xmlns:mc="http://schemas.openxmlformats.org/markup-compatibility/2006" xmlns:p14="http://schemas.microsoft.com/office/powerpoint/2010/main">
-    <mc:Choice Requires="p14">
-      <p:transition spd="med" p14:dur="700">
-        <p:fade/>
-      </p:transition>
-    </mc:Choice>
-    <mc:Fallback xmlns="">
-      <p:transition spd="med">
-        <p:fade/>
-      </p:transition>
-    </mc:Fallback>
-  </mc:AlternateContent>
-</p:sld>
-</file>
-
 <file path=ppt/slides/slide9.xml><?xml version="1.0" encoding="utf-8"?>
 <p:sld xmlns:a="http://schemas.openxmlformats.org/drawingml/2006/main" xmlns:r="http://schemas.openxmlformats.org/officeDocument/2006/relationships" xmlns:p="http://schemas.openxmlformats.org/presentationml/2006/main">
   <p:cSld>
@@ -7002,97 +7701,19 @@
       </p:grpSpPr>
       <p:sp>
         <p:nvSpPr>
-          <p:cNvPr id="5" name="Titre 12"/>
-          <p:cNvSpPr txBox="1">
-            <a:spLocks/>
-          </p:cNvSpPr>
-          <p:nvPr/>
+          <p:cNvPr id="13" name="Titre 12"/>
+          <p:cNvSpPr>
+            <a:spLocks noGrp="1"/>
+          </p:cNvSpPr>
+          <p:nvPr>
+            <p:ph type="title"/>
+          </p:nvPr>
         </p:nvSpPr>
         <p:spPr>
           <a:xfrm>
-            <a:off x="549796" y="1124744"/>
-            <a:ext cx="11159008" cy="875928"/>
+            <a:off x="1485900" y="1988840"/>
+            <a:ext cx="9601201" cy="2514600"/>
           </a:xfrm>
-          <a:prstGeom prst="rect">
-            <a:avLst/>
-          </a:prstGeom>
-          <a:ln>
-            <a:noFill/>
-          </a:ln>
-        </p:spPr>
-        <p:txBody>
-          <a:bodyPr vert="horz" lIns="91440" tIns="45720" rIns="91440" bIns="45720" rtlCol="0" anchor="ctr">
-            <a:noAutofit/>
-          </a:bodyPr>
-          <a:lstStyle>
-            <a:lvl1pPr algn="l" defTabSz="914400" rtl="0" eaLnBrk="1" latinLnBrk="0" hangingPunct="1">
-              <a:lnSpc>
-                <a:spcPct val="90000"/>
-              </a:lnSpc>
-              <a:spcBef>
-                <a:spcPct val="0"/>
-              </a:spcBef>
-              <a:buNone/>
-              <a:defRPr sz="3600" b="1" kern="1200" cap="none" spc="0" baseline="0">
-                <a:ln w="9525">
-                  <a:noFill/>
-                  <a:prstDash val="solid"/>
-                </a:ln>
-                <a:solidFill>
-                  <a:schemeClr val="accent5"/>
-                </a:solidFill>
-                <a:effectLst/>
-                <a:latin typeface="+mj-lt"/>
-                <a:ea typeface="+mj-ea"/>
-                <a:cs typeface="+mj-cs"/>
-              </a:defRPr>
-            </a:lvl1pPr>
-          </a:lstStyle>
-          <a:p>
-            <a:pPr algn="ctr"/>
-            <a:r>
-              <a:rPr lang="fr-CH" sz="4800" cap="all" dirty="0">
-                <a:solidFill>
-                  <a:srgbClr val="87A896"/>
-                </a:solidFill>
-                <a:latin typeface="Tahoma" panose="020B0604030504040204" pitchFamily="34" charset="0"/>
-                <a:ea typeface="Tahoma" panose="020B0604030504040204" pitchFamily="34" charset="0"/>
-                <a:cs typeface="Tahoma" panose="020B0604030504040204" pitchFamily="34" charset="0"/>
-              </a:rPr>
-              <a:t>Différence serveur impression et imprimante réseau standard</a:t>
-            </a:r>
-          </a:p>
-          <a:p>
-            <a:pPr algn="ctr"/>
-            <a:endParaRPr lang="fr-FR" sz="4800" cap="all" dirty="0">
-              <a:solidFill>
-                <a:srgbClr val="87A896"/>
-              </a:solidFill>
-              <a:latin typeface="Tahoma" panose="020B0604030504040204" pitchFamily="34" charset="0"/>
-              <a:ea typeface="Tahoma" panose="020B0604030504040204" pitchFamily="34" charset="0"/>
-              <a:cs typeface="Tahoma" panose="020B0604030504040204" pitchFamily="34" charset="0"/>
-            </a:endParaRPr>
-          </a:p>
-        </p:txBody>
-      </p:sp>
-      <p:sp>
-        <p:nvSpPr>
-          <p:cNvPr id="8" name="Titre 12"/>
-          <p:cNvSpPr>
-            <a:spLocks noGrp="1"/>
-          </p:cNvSpPr>
-          <p:nvPr>
-            <p:ph type="title"/>
-          </p:nvPr>
-        </p:nvSpPr>
-        <p:spPr>
-          <a:xfrm>
-            <a:off x="8758708" y="6453336"/>
-            <a:ext cx="3264497" cy="216024"/>
-          </a:xfrm>
-          <a:solidFill>
-            <a:srgbClr val="B6CABF"/>
-          </a:solidFill>
         </p:spPr>
         <p:txBody>
           <a:bodyPr rtlCol="0" anchor="ctr">
@@ -7102,7 +7723,7 @@
           <a:p>
             <a:pPr algn="ctr" rtl="0"/>
             <a:r>
-              <a:rPr lang="fr-FR" sz="1800" dirty="0">
+              <a:rPr lang="fr-FR" sz="6600" dirty="0">
                 <a:solidFill>
                   <a:srgbClr val="87A896"/>
                 </a:solidFill>
@@ -7115,88 +7736,10 @@
           </a:p>
         </p:txBody>
       </p:sp>
-      <p:sp>
-        <p:nvSpPr>
-          <p:cNvPr id="10" name="ZoneTexte 9"/>
-          <p:cNvSpPr txBox="1"/>
-          <p:nvPr/>
-        </p:nvSpPr>
-        <p:spPr>
-          <a:xfrm>
-            <a:off x="5086300" y="3068960"/>
-            <a:ext cx="6552728" cy="369332"/>
-          </a:xfrm>
-          <a:prstGeom prst="rect">
-            <a:avLst/>
-          </a:prstGeom>
-          <a:noFill/>
-          <a:ln>
-            <a:solidFill>
-              <a:schemeClr val="bg2"/>
-            </a:solidFill>
-          </a:ln>
-        </p:spPr>
-        <p:txBody>
-          <a:bodyPr wrap="square" rtlCol="0" anchor="ctr" anchorCtr="1">
-            <a:spAutoFit/>
-          </a:bodyPr>
-          <a:lstStyle/>
-          <a:p>
-            <a:pPr algn="ctr"/>
-            <a:r>
-              <a:rPr lang="fr-CH" dirty="0">
-                <a:latin typeface="Tahoma" panose="020B0604030504040204" pitchFamily="34" charset="0"/>
-                <a:ea typeface="Tahoma" panose="020B0604030504040204" pitchFamily="34" charset="0"/>
-                <a:cs typeface="Tahoma" panose="020B0604030504040204" pitchFamily="34" charset="0"/>
-              </a:rPr>
-              <a:t>SERVEUR IMPRESSION</a:t>
-            </a:r>
-          </a:p>
-        </p:txBody>
-      </p:sp>
-      <p:sp>
-        <p:nvSpPr>
-          <p:cNvPr id="6" name="ZoneTexte 5"/>
-          <p:cNvSpPr txBox="1"/>
-          <p:nvPr/>
-        </p:nvSpPr>
-        <p:spPr>
-          <a:xfrm>
-            <a:off x="981844" y="2492896"/>
-            <a:ext cx="6552728" cy="369332"/>
-          </a:xfrm>
-          <a:prstGeom prst="rect">
-            <a:avLst/>
-          </a:prstGeom>
-          <a:noFill/>
-          <a:ln>
-            <a:solidFill>
-              <a:schemeClr val="bg2"/>
-            </a:solidFill>
-          </a:ln>
-        </p:spPr>
-        <p:txBody>
-          <a:bodyPr wrap="square" rtlCol="0" anchor="ctr" anchorCtr="1">
-            <a:spAutoFit/>
-          </a:bodyPr>
-          <a:lstStyle/>
-          <a:p>
-            <a:pPr algn="ctr"/>
-            <a:r>
-              <a:rPr lang="fr-CH" dirty="0">
-                <a:latin typeface="Tahoma" panose="020B0604030504040204" pitchFamily="34" charset="0"/>
-                <a:ea typeface="Tahoma" panose="020B0604030504040204" pitchFamily="34" charset="0"/>
-                <a:cs typeface="Tahoma" panose="020B0604030504040204" pitchFamily="34" charset="0"/>
-              </a:rPr>
-              <a:t>IMPRIMANTE RÉSEAU STANDARD</a:t>
-            </a:r>
-          </a:p>
-        </p:txBody>
-      </p:sp>
     </p:spTree>
     <p:extLst>
       <p:ext uri="{BB962C8B-B14F-4D97-AF65-F5344CB8AC3E}">
-        <p14:creationId xmlns:p14="http://schemas.microsoft.com/office/powerpoint/2010/main" val="3290548540"/>
+        <p14:creationId xmlns:p14="http://schemas.microsoft.com/office/powerpoint/2010/main" val="2589682945"/>
       </p:ext>
     </p:extLst>
   </p:cSld>
@@ -8069,12 +8612,14 @@
 </file>
 
 <file path=customXml/item1.xml><?xml version="1.0" encoding="utf-8"?>
-<?mso-contentType ?>
-<FormTemplates xmlns="http://schemas.microsoft.com/sharepoint/v3/contenttype/forms">
-  <Display>DocumentLibraryForm</Display>
-  <Edit>DocumentLibraryForm</Edit>
-  <New>DocumentLibraryForm</New>
-</FormTemplates>
+<p:properties xmlns:p="http://schemas.microsoft.com/office/2006/metadata/properties" xmlns:xsi="http://www.w3.org/2001/XMLSchema-instance" xmlns:pc="http://schemas.microsoft.com/office/infopath/2007/PartnerControls">
+  <documentManagement>
+    <VSO_x0020_item_x0020_id xmlns="40262f94-9f35-4ac3-9a90-690165a166b7" xsi:nil="true"/>
+    <Assetid_x0020_ xmlns="40262f94-9f35-4ac3-9a90-690165a166b7" xsi:nil="true"/>
+    <Item_x0020_Details xmlns="40262f94-9f35-4ac3-9a90-690165a166b7" xsi:nil="true"/>
+    <Template_x0020_details xmlns="40262f94-9f35-4ac3-9a90-690165a166b7" xsi:nil="true"/>
+  </documentManagement>
+</p:properties>
 </file>
 
 <file path=customXml/item2.xml><?xml version="1.0" encoding="utf-8"?>
@@ -8259,20 +8804,27 @@
 </file>
 
 <file path=customXml/item3.xml><?xml version="1.0" encoding="utf-8"?>
-<p:properties xmlns:p="http://schemas.microsoft.com/office/2006/metadata/properties" xmlns:xsi="http://www.w3.org/2001/XMLSchema-instance" xmlns:pc="http://schemas.microsoft.com/office/infopath/2007/PartnerControls">
-  <documentManagement>
-    <VSO_x0020_item_x0020_id xmlns="40262f94-9f35-4ac3-9a90-690165a166b7" xsi:nil="true"/>
-    <Assetid_x0020_ xmlns="40262f94-9f35-4ac3-9a90-690165a166b7" xsi:nil="true"/>
-    <Item_x0020_Details xmlns="40262f94-9f35-4ac3-9a90-690165a166b7" xsi:nil="true"/>
-    <Template_x0020_details xmlns="40262f94-9f35-4ac3-9a90-690165a166b7" xsi:nil="true"/>
-  </documentManagement>
-</p:properties>
+<?mso-contentType ?>
+<FormTemplates xmlns="http://schemas.microsoft.com/sharepoint/v3/contenttype/forms">
+  <Display>DocumentLibraryForm</Display>
+  <Edit>DocumentLibraryForm</Edit>
+  <New>DocumentLibraryForm</New>
+</FormTemplates>
 </file>
 
 <file path=customXml/itemProps1.xml><?xml version="1.0" encoding="utf-8"?>
-<ds:datastoreItem xmlns:ds="http://schemas.openxmlformats.org/officeDocument/2006/customXml" ds:itemID="{0875BD71-4A33-4FB7-88CA-777C4D9E6EE5}">
+<ds:datastoreItem xmlns:ds="http://schemas.openxmlformats.org/officeDocument/2006/customXml" ds:itemID="{3049C11C-71DC-49B6-ACD8-27E3AE088D14}">
   <ds:schemaRefs>
-    <ds:schemaRef ds:uri="http://schemas.microsoft.com/sharepoint/v3/contenttype/forms"/>
+    <ds:schemaRef ds:uri="http://purl.org/dc/terms/"/>
+    <ds:schemaRef ds:uri="http://schemas.openxmlformats.org/package/2006/metadata/core-properties"/>
+    <ds:schemaRef ds:uri="http://purl.org/dc/dcmitype/"/>
+    <ds:schemaRef ds:uri="http://schemas.microsoft.com/office/infopath/2007/PartnerControls"/>
+    <ds:schemaRef ds:uri="http://purl.org/dc/elements/1.1/"/>
+    <ds:schemaRef ds:uri="http://schemas.microsoft.com/office/2006/metadata/properties"/>
+    <ds:schemaRef ds:uri="http://schemas.microsoft.com/office/2006/documentManagement/types"/>
+    <ds:schemaRef ds:uri="40262f94-9f35-4ac3-9a90-690165a166b7"/>
+    <ds:schemaRef ds:uri="a4f35948-e619-41b3-aa29-22878b09cfd2"/>
+    <ds:schemaRef ds:uri="http://www.w3.org/XML/1998/namespace"/>
   </ds:schemaRefs>
 </ds:datastoreItem>
 </file>
@@ -8297,18 +8849,9 @@
 </file>
 
 <file path=customXml/itemProps3.xml><?xml version="1.0" encoding="utf-8"?>
-<ds:datastoreItem xmlns:ds="http://schemas.openxmlformats.org/officeDocument/2006/customXml" ds:itemID="{3049C11C-71DC-49B6-ACD8-27E3AE088D14}">
+<ds:datastoreItem xmlns:ds="http://schemas.openxmlformats.org/officeDocument/2006/customXml" ds:itemID="{0875BD71-4A33-4FB7-88CA-777C4D9E6EE5}">
   <ds:schemaRefs>
-    <ds:schemaRef ds:uri="http://purl.org/dc/terms/"/>
-    <ds:schemaRef ds:uri="http://schemas.openxmlformats.org/package/2006/metadata/core-properties"/>
-    <ds:schemaRef ds:uri="http://purl.org/dc/dcmitype/"/>
-    <ds:schemaRef ds:uri="http://schemas.microsoft.com/office/infopath/2007/PartnerControls"/>
-    <ds:schemaRef ds:uri="http://purl.org/dc/elements/1.1/"/>
-    <ds:schemaRef ds:uri="http://schemas.microsoft.com/office/2006/metadata/properties"/>
-    <ds:schemaRef ds:uri="http://schemas.microsoft.com/office/2006/documentManagement/types"/>
-    <ds:schemaRef ds:uri="40262f94-9f35-4ac3-9a90-690165a166b7"/>
-    <ds:schemaRef ds:uri="a4f35948-e619-41b3-aa29-22878b09cfd2"/>
-    <ds:schemaRef ds:uri="http://www.w3.org/XML/1998/namespace"/>
+    <ds:schemaRef ds:uri="http://schemas.microsoft.com/sharepoint/v3/contenttype/forms"/>
   </ds:schemaRefs>
 </ds:datastoreItem>
 </file>
</xml_diff>

<commit_message>
rajouter tout le reste
</commit_message>
<xml_diff>
--- a/SERVEUR ET FICHIERS D’IMPRESSION.pptx
+++ b/SERVEUR ET FICHIERS D’IMPRESSION.pptx
@@ -330,7 +330,7 @@
             <a:pPr rtl="0"/>
             <a:fld id="{1BF5C993-8495-4216-89A4-42CD5FDDBACA}" type="datetime1">
               <a:rPr lang="fr-FR" smtClean="0"/>
-              <a:t>27/04/2022</a:t>
+              <a:t>11/05/2022</a:t>
             </a:fld>
             <a:endParaRPr lang="fr-FR" dirty="0"/>
           </a:p>
@@ -500,7 +500,7 @@
             <a:pPr rtl="0"/>
             <a:fld id="{2C0862E7-FD40-4D3D-ACE4-67E006776546}" type="datetime1">
               <a:rPr lang="fr-FR" noProof="0" smtClean="0"/>
-              <a:t>27/04/2022</a:t>
+              <a:t>11/05/2022</a:t>
             </a:fld>
             <a:endParaRPr lang="fr-FR" noProof="0" dirty="0"/>
           </a:p>
@@ -1888,7 +1888,7 @@
             <a:fld id="{B88C40BB-4737-4D39-9F3C-F0B9A14C804A}" type="datetime1">
               <a:rPr lang="fr-FR" smtClean="0"/>
               <a:pPr/>
-              <a:t>27/04/2022</a:t>
+              <a:t>11/05/2022</a:t>
             </a:fld>
             <a:endParaRPr lang="fr-FR" dirty="0"/>
           </a:p>
@@ -2081,7 +2081,7 @@
             <a:fld id="{B88C40BB-4737-4D39-9F3C-F0B9A14C804A}" type="datetime1">
               <a:rPr lang="fr-FR" smtClean="0"/>
               <a:pPr/>
-              <a:t>27/04/2022</a:t>
+              <a:t>11/05/2022</a:t>
             </a:fld>
             <a:endParaRPr lang="fr-FR" dirty="0"/>
           </a:p>
@@ -2284,7 +2284,7 @@
             <a:fld id="{B88C40BB-4737-4D39-9F3C-F0B9A14C804A}" type="datetime1">
               <a:rPr lang="fr-FR" smtClean="0"/>
               <a:pPr/>
-              <a:t>27/04/2022</a:t>
+              <a:t>11/05/2022</a:t>
             </a:fld>
             <a:endParaRPr lang="fr-FR" dirty="0"/>
           </a:p>
@@ -2478,7 +2478,7 @@
             <a:fld id="{B88C40BB-4737-4D39-9F3C-F0B9A14C804A}" type="datetime1">
               <a:rPr lang="fr-FR" smtClean="0"/>
               <a:pPr/>
-              <a:t>27/04/2022</a:t>
+              <a:t>11/05/2022</a:t>
             </a:fld>
             <a:endParaRPr lang="fr-FR" dirty="0"/>
           </a:p>
@@ -2749,7 +2749,7 @@
             <a:fld id="{B88C40BB-4737-4D39-9F3C-F0B9A14C804A}" type="datetime1">
               <a:rPr lang="fr-FR" smtClean="0"/>
               <a:pPr/>
-              <a:t>27/04/2022</a:t>
+              <a:t>11/05/2022</a:t>
             </a:fld>
             <a:endParaRPr lang="fr-FR" dirty="0"/>
           </a:p>
@@ -3105,7 +3105,7 @@
             <a:fld id="{B88C40BB-4737-4D39-9F3C-F0B9A14C804A}" type="datetime1">
               <a:rPr lang="fr-FR" smtClean="0"/>
               <a:pPr/>
-              <a:t>27/04/2022</a:t>
+              <a:t>11/05/2022</a:t>
             </a:fld>
             <a:endParaRPr lang="fr-FR" dirty="0"/>
           </a:p>
@@ -3697,7 +3697,7 @@
             <a:fld id="{B88C40BB-4737-4D39-9F3C-F0B9A14C804A}" type="datetime1">
               <a:rPr lang="fr-FR" smtClean="0"/>
               <a:pPr/>
-              <a:t>27/04/2022</a:t>
+              <a:t>11/05/2022</a:t>
             </a:fld>
             <a:endParaRPr lang="fr-FR" dirty="0"/>
           </a:p>
@@ -3960,7 +3960,7 @@
             <a:fld id="{B88C40BB-4737-4D39-9F3C-F0B9A14C804A}" type="datetime1">
               <a:rPr lang="fr-FR" smtClean="0"/>
               <a:pPr/>
-              <a:t>27/04/2022</a:t>
+              <a:t>11/05/2022</a:t>
             </a:fld>
             <a:endParaRPr lang="fr-FR" dirty="0"/>
           </a:p>
@@ -4069,7 +4069,7 @@
             <a:fld id="{B88C40BB-4737-4D39-9F3C-F0B9A14C804A}" type="datetime1">
               <a:rPr lang="fr-FR" smtClean="0"/>
               <a:pPr/>
-              <a:t>27/04/2022</a:t>
+              <a:t>11/05/2022</a:t>
             </a:fld>
             <a:endParaRPr lang="fr-FR" dirty="0"/>
           </a:p>
@@ -4379,7 +4379,7 @@
             <a:fld id="{B88C40BB-4737-4D39-9F3C-F0B9A14C804A}" type="datetime1">
               <a:rPr lang="fr-FR" smtClean="0"/>
               <a:pPr/>
-              <a:t>27/04/2022</a:t>
+              <a:t>11/05/2022</a:t>
             </a:fld>
             <a:endParaRPr lang="fr-FR" dirty="0"/>
           </a:p>
@@ -4680,7 +4680,7 @@
             <a:fld id="{B88C40BB-4737-4D39-9F3C-F0B9A14C804A}" type="datetime1">
               <a:rPr lang="fr-FR" smtClean="0"/>
               <a:pPr/>
-              <a:t>27/04/2022</a:t>
+              <a:t>11/05/2022</a:t>
             </a:fld>
             <a:endParaRPr lang="fr-FR" dirty="0"/>
           </a:p>
@@ -5049,7 +5049,7 @@
             <a:fld id="{B88C40BB-4737-4D39-9F3C-F0B9A14C804A}" type="datetime1">
               <a:rPr lang="fr-FR" smtClean="0"/>
               <a:pPr/>
-              <a:t>27/04/2022</a:t>
+              <a:t>11/05/2022</a:t>
             </a:fld>
             <a:endParaRPr lang="fr-FR" dirty="0"/>
           </a:p>
@@ -5558,13 +5558,13 @@
   <p:clrMapOvr>
     <a:masterClrMapping/>
   </p:clrMapOvr>
-  <mc:AlternateContent xmlns:mc="http://schemas.openxmlformats.org/markup-compatibility/2006">
-    <mc:Choice xmlns:p14="http://schemas.microsoft.com/office/powerpoint/2010/main" Requires="p14">
+  <mc:AlternateContent xmlns:mc="http://schemas.openxmlformats.org/markup-compatibility/2006" xmlns:p14="http://schemas.microsoft.com/office/powerpoint/2010/main">
+    <mc:Choice Requires="p14">
       <p:transition spd="med" p14:dur="700">
         <p:fade/>
       </p:transition>
     </mc:Choice>
-    <mc:Fallback>
+    <mc:Fallback xmlns="">
       <p:transition spd="med">
         <p:fade/>
       </p:transition>
@@ -6275,13 +6275,13 @@
   <p:clrMapOvr>
     <a:masterClrMapping/>
   </p:clrMapOvr>
-  <mc:AlternateContent xmlns:mc="http://schemas.openxmlformats.org/markup-compatibility/2006">
-    <mc:Choice xmlns:p14="http://schemas.microsoft.com/office/powerpoint/2010/main" Requires="p14">
+  <mc:AlternateContent xmlns:mc="http://schemas.openxmlformats.org/markup-compatibility/2006" xmlns:p14="http://schemas.microsoft.com/office/powerpoint/2010/main">
+    <mc:Choice Requires="p14">
       <p:transition spd="med" p14:dur="700">
         <p:fade/>
       </p:transition>
     </mc:Choice>
-    <mc:Fallback>
+    <mc:Fallback xmlns="">
       <p:transition spd="med">
         <p:fade/>
       </p:transition>
@@ -8820,12 +8820,14 @@
 </file>
 
 <file path=customXml/item1.xml><?xml version="1.0" encoding="utf-8"?>
-<?mso-contentType ?>
-<FormTemplates xmlns="http://schemas.microsoft.com/sharepoint/v3/contenttype/forms">
-  <Display>DocumentLibraryForm</Display>
-  <Edit>DocumentLibraryForm</Edit>
-  <New>DocumentLibraryForm</New>
-</FormTemplates>
+<p:properties xmlns:p="http://schemas.microsoft.com/office/2006/metadata/properties" xmlns:xsi="http://www.w3.org/2001/XMLSchema-instance" xmlns:pc="http://schemas.microsoft.com/office/infopath/2007/PartnerControls">
+  <documentManagement>
+    <VSO_x0020_item_x0020_id xmlns="40262f94-9f35-4ac3-9a90-690165a166b7" xsi:nil="true"/>
+    <Assetid_x0020_ xmlns="40262f94-9f35-4ac3-9a90-690165a166b7" xsi:nil="true"/>
+    <Item_x0020_Details xmlns="40262f94-9f35-4ac3-9a90-690165a166b7" xsi:nil="true"/>
+    <Template_x0020_details xmlns="40262f94-9f35-4ac3-9a90-690165a166b7" xsi:nil="true"/>
+  </documentManagement>
+</p:properties>
 </file>
 
 <file path=customXml/item2.xml><?xml version="1.0" encoding="utf-8"?>
@@ -9010,20 +9012,27 @@
 </file>
 
 <file path=customXml/item3.xml><?xml version="1.0" encoding="utf-8"?>
-<p:properties xmlns:p="http://schemas.microsoft.com/office/2006/metadata/properties" xmlns:xsi="http://www.w3.org/2001/XMLSchema-instance" xmlns:pc="http://schemas.microsoft.com/office/infopath/2007/PartnerControls">
-  <documentManagement>
-    <VSO_x0020_item_x0020_id xmlns="40262f94-9f35-4ac3-9a90-690165a166b7" xsi:nil="true"/>
-    <Assetid_x0020_ xmlns="40262f94-9f35-4ac3-9a90-690165a166b7" xsi:nil="true"/>
-    <Item_x0020_Details xmlns="40262f94-9f35-4ac3-9a90-690165a166b7" xsi:nil="true"/>
-    <Template_x0020_details xmlns="40262f94-9f35-4ac3-9a90-690165a166b7" xsi:nil="true"/>
-  </documentManagement>
-</p:properties>
+<?mso-contentType ?>
+<FormTemplates xmlns="http://schemas.microsoft.com/sharepoint/v3/contenttype/forms">
+  <Display>DocumentLibraryForm</Display>
+  <Edit>DocumentLibraryForm</Edit>
+  <New>DocumentLibraryForm</New>
+</FormTemplates>
 </file>
 
 <file path=customXml/itemProps1.xml><?xml version="1.0" encoding="utf-8"?>
-<ds:datastoreItem xmlns:ds="http://schemas.openxmlformats.org/officeDocument/2006/customXml" ds:itemID="{0875BD71-4A33-4FB7-88CA-777C4D9E6EE5}">
+<ds:datastoreItem xmlns:ds="http://schemas.openxmlformats.org/officeDocument/2006/customXml" ds:itemID="{3049C11C-71DC-49B6-ACD8-27E3AE088D14}">
   <ds:schemaRefs>
-    <ds:schemaRef ds:uri="http://schemas.microsoft.com/sharepoint/v3/contenttype/forms"/>
+    <ds:schemaRef ds:uri="http://purl.org/dc/terms/"/>
+    <ds:schemaRef ds:uri="http://schemas.openxmlformats.org/package/2006/metadata/core-properties"/>
+    <ds:schemaRef ds:uri="http://purl.org/dc/dcmitype/"/>
+    <ds:schemaRef ds:uri="http://schemas.microsoft.com/office/infopath/2007/PartnerControls"/>
+    <ds:schemaRef ds:uri="http://purl.org/dc/elements/1.1/"/>
+    <ds:schemaRef ds:uri="http://schemas.microsoft.com/office/2006/metadata/properties"/>
+    <ds:schemaRef ds:uri="http://schemas.microsoft.com/office/2006/documentManagement/types"/>
+    <ds:schemaRef ds:uri="40262f94-9f35-4ac3-9a90-690165a166b7"/>
+    <ds:schemaRef ds:uri="a4f35948-e619-41b3-aa29-22878b09cfd2"/>
+    <ds:schemaRef ds:uri="http://www.w3.org/XML/1998/namespace"/>
   </ds:schemaRefs>
 </ds:datastoreItem>
 </file>
@@ -9048,18 +9057,9 @@
 </file>
 
 <file path=customXml/itemProps3.xml><?xml version="1.0" encoding="utf-8"?>
-<ds:datastoreItem xmlns:ds="http://schemas.openxmlformats.org/officeDocument/2006/customXml" ds:itemID="{3049C11C-71DC-49B6-ACD8-27E3AE088D14}">
+<ds:datastoreItem xmlns:ds="http://schemas.openxmlformats.org/officeDocument/2006/customXml" ds:itemID="{0875BD71-4A33-4FB7-88CA-777C4D9E6EE5}">
   <ds:schemaRefs>
-    <ds:schemaRef ds:uri="http://purl.org/dc/terms/"/>
-    <ds:schemaRef ds:uri="http://schemas.openxmlformats.org/package/2006/metadata/core-properties"/>
-    <ds:schemaRef ds:uri="http://purl.org/dc/dcmitype/"/>
-    <ds:schemaRef ds:uri="http://schemas.microsoft.com/office/infopath/2007/PartnerControls"/>
-    <ds:schemaRef ds:uri="http://purl.org/dc/elements/1.1/"/>
-    <ds:schemaRef ds:uri="http://schemas.microsoft.com/office/2006/metadata/properties"/>
-    <ds:schemaRef ds:uri="http://schemas.microsoft.com/office/2006/documentManagement/types"/>
-    <ds:schemaRef ds:uri="40262f94-9f35-4ac3-9a90-690165a166b7"/>
-    <ds:schemaRef ds:uri="a4f35948-e619-41b3-aa29-22878b09cfd2"/>
-    <ds:schemaRef ds:uri="http://www.w3.org/XML/1998/namespace"/>
+    <ds:schemaRef ds:uri="http://schemas.microsoft.com/sharepoint/v3/contenttype/forms"/>
   </ds:schemaRefs>
 </ds:datastoreItem>
 </file>
</xml_diff>